<commit_message>
short presentation made even shorter
</commit_message>
<xml_diff>
--- a/Kubernetes & microservices as an easy way to build scalable solutions - short.pptx
+++ b/Kubernetes & microservices as an easy way to build scalable solutions - short.pptx
@@ -303,7 +303,7 @@
           <a:p>
             <a:fld id="{77CA6E54-A760-DF45-ADAF-8E0CFDCE3127}" type="datetimeFigureOut">
               <a:rPr lang="en-GB" smtClean="0"/>
-              <a:t>09/12/2018</a:t>
+              <a:t>10/12/2018</a:t>
             </a:fld>
             <a:endParaRPr lang="en-GB"/>
           </a:p>
@@ -468,7 +468,7 @@
           <a:p>
             <a:fld id="{13E03326-EF21-3E49-8E0E-7A83B840037B}" type="datetimeFigureOut">
               <a:rPr lang="nb-NO" smtClean="0"/>
-              <a:t>09.12.2018</a:t>
+              <a:t>10.12.2018</a:t>
             </a:fld>
             <a:endParaRPr lang="nb-NO"/>
           </a:p>
@@ -1714,7 +1714,7 @@
           <a:bodyPr/>
           <a:lstStyle/>
           <a:p>
-            <a:endParaRPr lang="en-US"/>
+            <a:endParaRPr lang="en-US" dirty="0"/>
           </a:p>
         </p:txBody>
       </p:sp>
@@ -5577,11 +5577,11 @@
   <p:clrMapOvr>
     <a:masterClrMapping/>
   </p:clrMapOvr>
-  <mc:AlternateContent xmlns:mc="http://schemas.openxmlformats.org/markup-compatibility/2006">
-    <mc:Choice xmlns:p14="http://schemas.microsoft.com/office/powerpoint/2010/main" Requires="p14">
+  <mc:AlternateContent xmlns:mc="http://schemas.openxmlformats.org/markup-compatibility/2006" xmlns:p14="http://schemas.microsoft.com/office/powerpoint/2010/main">
+    <mc:Choice Requires="p14">
       <p:transition spd="slow" p14:dur="2000" advTm="904"/>
     </mc:Choice>
-    <mc:Fallback>
+    <mc:Fallback xmlns="">
       <p:transition spd="slow" advTm="904"/>
     </mc:Fallback>
   </mc:AlternateContent>
@@ -9532,11 +9532,11 @@
   <p:clrMapOvr>
     <a:masterClrMapping/>
   </p:clrMapOvr>
-  <mc:AlternateContent xmlns:mc="http://schemas.openxmlformats.org/markup-compatibility/2006">
-    <mc:Choice xmlns:p14="http://schemas.microsoft.com/office/powerpoint/2010/main" Requires="p14">
+  <mc:AlternateContent xmlns:mc="http://schemas.openxmlformats.org/markup-compatibility/2006" xmlns:p14="http://schemas.microsoft.com/office/powerpoint/2010/main">
+    <mc:Choice Requires="p14">
       <p:transition spd="slow" p14:dur="2000" advTm="18148"/>
     </mc:Choice>
-    <mc:Fallback>
+    <mc:Fallback xmlns="">
       <p:transition spd="slow" advTm="18148"/>
     </mc:Fallback>
   </mc:AlternateContent>
@@ -11188,9 +11188,46 @@
           <a:p>
             <a:endParaRPr lang="en-US" dirty="0"/>
           </a:p>
-          <a:p>
-            <a:r>
-              <a:rPr lang="en-US" dirty="0"/>
+        </p:txBody>
+      </p:sp>
+      <p:sp>
+        <p:nvSpPr>
+          <p:cNvPr id="4" name="Rectangle 3">
+            <a:extLst>
+              <a:ext uri="{FF2B5EF4-FFF2-40B4-BE49-F238E27FC236}">
+                <a16:creationId xmlns:a16="http://schemas.microsoft.com/office/drawing/2014/main" id="{E3FC2BC6-98B0-4C03-A6D5-D428E7B84524}"/>
+              </a:ext>
+            </a:extLst>
+          </p:cNvPr>
+          <p:cNvSpPr/>
+          <p:nvPr/>
+        </p:nvSpPr>
+        <p:spPr>
+          <a:xfrm>
+            <a:off x="611981" y="4698958"/>
+            <a:ext cx="3950569" cy="461665"/>
+          </a:xfrm>
+          <a:prstGeom prst="rect">
+            <a:avLst/>
+          </a:prstGeom>
+        </p:spPr>
+        <p:txBody>
+          <a:bodyPr wrap="none">
+            <a:spAutoFit/>
+          </a:bodyPr>
+          <a:lstStyle/>
+          <a:p>
+            <a:pPr marL="342900" indent="-342900">
+              <a:buFont typeface="Arial" panose="020B0604020202020204" pitchFamily="34" charset="0"/>
+              <a:buChar char="•"/>
+            </a:pPr>
+            <a:r>
+              <a:rPr lang="en-US" sz="2400" dirty="0">
+                <a:solidFill>
+                  <a:schemeClr val="bg1"/>
+                </a:solidFill>
+                <a:latin typeface="Open Sans"/>
+              </a:rPr>
               <a:t>Kubernetes is the answer.</a:t>
             </a:r>
           </a:p>
@@ -11206,6 +11243,84 @@
   <p:clrMapOvr>
     <a:masterClrMapping/>
   </p:clrMapOvr>
+  <p:timing>
+    <p:tnLst>
+      <p:par>
+        <p:cTn id="1" dur="indefinite" restart="never" nodeType="tmRoot">
+          <p:childTnLst>
+            <p:seq concurrent="1" nextAc="seek">
+              <p:cTn id="2" dur="indefinite" nodeType="mainSeq">
+                <p:childTnLst>
+                  <p:par>
+                    <p:cTn id="3" fill="hold">
+                      <p:stCondLst>
+                        <p:cond delay="indefinite"/>
+                      </p:stCondLst>
+                      <p:childTnLst>
+                        <p:par>
+                          <p:cTn id="4" fill="hold">
+                            <p:stCondLst>
+                              <p:cond delay="0"/>
+                            </p:stCondLst>
+                            <p:childTnLst>
+                              <p:par>
+                                <p:cTn id="5" presetID="1" presetClass="entr" presetSubtype="0" fill="hold" grpId="0" nodeType="clickEffect">
+                                  <p:stCondLst>
+                                    <p:cond delay="0"/>
+                                  </p:stCondLst>
+                                  <p:childTnLst>
+                                    <p:set>
+                                      <p:cBhvr>
+                                        <p:cTn id="6" dur="1" fill="hold">
+                                          <p:stCondLst>
+                                            <p:cond delay="0"/>
+                                          </p:stCondLst>
+                                        </p:cTn>
+                                        <p:tgtEl>
+                                          <p:spTgt spid="4"/>
+                                        </p:tgtEl>
+                                        <p:attrNameLst>
+                                          <p:attrName>style.visibility</p:attrName>
+                                        </p:attrNameLst>
+                                      </p:cBhvr>
+                                      <p:to>
+                                        <p:strVal val="visible"/>
+                                      </p:to>
+                                    </p:set>
+                                  </p:childTnLst>
+                                </p:cTn>
+                              </p:par>
+                            </p:childTnLst>
+                          </p:cTn>
+                        </p:par>
+                      </p:childTnLst>
+                    </p:cTn>
+                  </p:par>
+                </p:childTnLst>
+              </p:cTn>
+              <p:prevCondLst>
+                <p:cond evt="onPrev" delay="0">
+                  <p:tgtEl>
+                    <p:sldTgt/>
+                  </p:tgtEl>
+                </p:cond>
+              </p:prevCondLst>
+              <p:nextCondLst>
+                <p:cond evt="onNext" delay="0">
+                  <p:tgtEl>
+                    <p:sldTgt/>
+                  </p:tgtEl>
+                </p:cond>
+              </p:nextCondLst>
+            </p:seq>
+          </p:childTnLst>
+        </p:cTn>
+      </p:par>
+    </p:tnLst>
+    <p:bldLst>
+      <p:bldP spid="4" grpId="0"/>
+    </p:bldLst>
+  </p:timing>
 </p:sld>
 </file>
 
@@ -12581,11 +12696,11 @@
   <p:clrMapOvr>
     <a:masterClrMapping/>
   </p:clrMapOvr>
-  <mc:AlternateContent xmlns:mc="http://schemas.openxmlformats.org/markup-compatibility/2006">
-    <mc:Choice xmlns:p14="http://schemas.microsoft.com/office/powerpoint/2010/main" Requires="p14">
+  <mc:AlternateContent xmlns:mc="http://schemas.openxmlformats.org/markup-compatibility/2006" xmlns:p14="http://schemas.microsoft.com/office/powerpoint/2010/main">
+    <mc:Choice Requires="p14">
       <p:transition spd="slow" p14:dur="2000" advTm="2224"/>
     </mc:Choice>
-    <mc:Fallback>
+    <mc:Fallback xmlns="">
       <p:transition spd="slow" advTm="2224"/>
     </mc:Fallback>
   </mc:AlternateContent>
@@ -14840,11 +14955,11 @@
   <p:clrMapOvr>
     <a:masterClrMapping/>
   </p:clrMapOvr>
-  <mc:AlternateContent xmlns:mc="http://schemas.openxmlformats.org/markup-compatibility/2006">
-    <mc:Choice xmlns:p14="http://schemas.microsoft.com/office/powerpoint/2010/main" Requires="p14">
+  <mc:AlternateContent xmlns:mc="http://schemas.openxmlformats.org/markup-compatibility/2006" xmlns:p14="http://schemas.microsoft.com/office/powerpoint/2010/main">
+    <mc:Choice Requires="p14">
       <p:transition spd="slow" p14:dur="2000" advTm="3341"/>
     </mc:Choice>
-    <mc:Fallback>
+    <mc:Fallback xmlns="">
       <p:transition spd="slow" advTm="3341"/>
     </mc:Fallback>
   </mc:AlternateContent>
@@ -16470,6 +16585,39 @@
 </file>
 
 <file path=customXml/item1.xml><?xml version="1.0" encoding="utf-8"?>
+<p:properties xmlns:p="http://schemas.microsoft.com/office/2006/metadata/properties" xmlns:xsi="http://www.w3.org/2001/XMLSchema-instance" xmlns:pc="http://schemas.microsoft.com/office/infopath/2007/PartnerControls">
+  <documentManagement>
+    <SharedWithUsers xmlns="c45d460a-f8dc-498a-9991-b7ab1f141a2f">
+      <UserInfo>
+        <DisplayName>Hilde Landsem</DisplayName>
+        <AccountId>60</AccountId>
+        <AccountType/>
+      </UserInfo>
+      <UserInfo>
+        <DisplayName>Minxian Le</DisplayName>
+        <AccountId>25</AccountId>
+        <AccountType/>
+      </UserInfo>
+      <UserInfo>
+        <DisplayName>Henrik Ryman</DisplayName>
+        <AccountId>6</AccountId>
+        <AccountType/>
+      </UserInfo>
+    </SharedWithUsers>
+  </documentManagement>
+</p:properties>
+</file>
+
+<file path=customXml/item2.xml><?xml version="1.0" encoding="utf-8"?>
+<?mso-contentType ?>
+<FormTemplates xmlns="http://schemas.microsoft.com/sharepoint/v3/contenttype/forms">
+  <Display>DocumentLibraryForm</Display>
+  <Edit>DocumentLibraryForm</Edit>
+  <New>DocumentLibraryForm</New>
+</FormTemplates>
+</file>
+
+<file path=customXml/item3.xml><?xml version="1.0" encoding="utf-8"?>
 <ct:contentTypeSchema xmlns:ct="http://schemas.microsoft.com/office/2006/metadata/contentType" xmlns:ma="http://schemas.microsoft.com/office/2006/metadata/properties/metaAttributes" ct:_="" ma:_="" ma:contentTypeName="Document" ma:contentTypeID="0x010100D080C9EFFDA9C34C92EB0A434115C3DF" ma:contentTypeVersion="7" ma:contentTypeDescription="Create a new document." ma:contentTypeScope="" ma:versionID="02725bd29e95338f3f05d60a0f576914">
   <xsd:schema xmlns:xsd="http://www.w3.org/2001/XMLSchema" xmlns:xs="http://www.w3.org/2001/XMLSchema" xmlns:p="http://schemas.microsoft.com/office/2006/metadata/properties" xmlns:ns2="c45d460a-f8dc-498a-9991-b7ab1f141a2f" xmlns:ns3="6ba8cf58-a5a0-4977-a82c-114eb7b1ce68" targetNamespace="http://schemas.microsoft.com/office/2006/metadata/properties" ma:root="true" ma:fieldsID="603f036cc186f0e147e1f79ded5f1aad" ns2:_="" ns3:_="">
     <xsd:import namespace="c45d460a-f8dc-498a-9991-b7ab1f141a2f"/>
@@ -16652,40 +16800,32 @@
 </ct:contentTypeSchema>
 </file>
 
-<file path=customXml/item2.xml><?xml version="1.0" encoding="utf-8"?>
-<?mso-contentType ?>
-<FormTemplates xmlns="http://schemas.microsoft.com/sharepoint/v3/contenttype/forms">
-  <Display>DocumentLibraryForm</Display>
-  <Edit>DocumentLibraryForm</Edit>
-  <New>DocumentLibraryForm</New>
-</FormTemplates>
+<file path=customXml/itemProps1.xml><?xml version="1.0" encoding="utf-8"?>
+<ds:datastoreItem xmlns:ds="http://schemas.openxmlformats.org/officeDocument/2006/customXml" ds:itemID="{D44D4DDB-9DCF-4941-AFA3-6B70145AFE8E}">
+  <ds:schemaRefs>
+    <ds:schemaRef ds:uri="http://purl.org/dc/elements/1.1/"/>
+    <ds:schemaRef ds:uri="http://schemas.microsoft.com/office/2006/metadata/properties"/>
+    <ds:schemaRef ds:uri="c45d460a-f8dc-498a-9991-b7ab1f141a2f"/>
+    <ds:schemaRef ds:uri="http://purl.org/dc/terms/"/>
+    <ds:schemaRef ds:uri="http://schemas.openxmlformats.org/package/2006/metadata/core-properties"/>
+    <ds:schemaRef ds:uri="http://schemas.microsoft.com/office/infopath/2007/PartnerControls"/>
+    <ds:schemaRef ds:uri="http://schemas.microsoft.com/office/2006/documentManagement/types"/>
+    <ds:schemaRef ds:uri="6ba8cf58-a5a0-4977-a82c-114eb7b1ce68"/>
+    <ds:schemaRef ds:uri="http://www.w3.org/XML/1998/namespace"/>
+    <ds:schemaRef ds:uri="http://purl.org/dc/dcmitype/"/>
+  </ds:schemaRefs>
+</ds:datastoreItem>
 </file>
 
-<file path=customXml/item3.xml><?xml version="1.0" encoding="utf-8"?>
-<p:properties xmlns:p="http://schemas.microsoft.com/office/2006/metadata/properties" xmlns:xsi="http://www.w3.org/2001/XMLSchema-instance" xmlns:pc="http://schemas.microsoft.com/office/infopath/2007/PartnerControls">
-  <documentManagement>
-    <SharedWithUsers xmlns="c45d460a-f8dc-498a-9991-b7ab1f141a2f">
-      <UserInfo>
-        <DisplayName>Hilde Landsem</DisplayName>
-        <AccountId>60</AccountId>
-        <AccountType/>
-      </UserInfo>
-      <UserInfo>
-        <DisplayName>Minxian Le</DisplayName>
-        <AccountId>25</AccountId>
-        <AccountType/>
-      </UserInfo>
-      <UserInfo>
-        <DisplayName>Henrik Ryman</DisplayName>
-        <AccountId>6</AccountId>
-        <AccountType/>
-      </UserInfo>
-    </SharedWithUsers>
-  </documentManagement>
-</p:properties>
+<file path=customXml/itemProps2.xml><?xml version="1.0" encoding="utf-8"?>
+<ds:datastoreItem xmlns:ds="http://schemas.openxmlformats.org/officeDocument/2006/customXml" ds:itemID="{282B43AD-BEB8-4408-B964-6699055BDD23}">
+  <ds:schemaRefs>
+    <ds:schemaRef ds:uri="http://schemas.microsoft.com/sharepoint/v3/contenttype/forms"/>
+  </ds:schemaRefs>
+</ds:datastoreItem>
 </file>
 
-<file path=customXml/itemProps1.xml><?xml version="1.0" encoding="utf-8"?>
+<file path=customXml/itemProps3.xml><?xml version="1.0" encoding="utf-8"?>
 <ds:datastoreItem xmlns:ds="http://schemas.openxmlformats.org/officeDocument/2006/customXml" ds:itemID="{6452CB65-D9C8-4B41-BBBD-190780AF43AC}">
   <ds:schemaRefs>
     <ds:schemaRef ds:uri="http://schemas.microsoft.com/office/2006/metadata/contentType"/>
@@ -16702,29 +16842,4 @@
     <ds:schemaRef ds:uri="http://schemas.microsoft.com/internal/obd"/>
   </ds:schemaRefs>
 </ds:datastoreItem>
-</file>
-
-<file path=customXml/itemProps2.xml><?xml version="1.0" encoding="utf-8"?>
-<ds:datastoreItem xmlns:ds="http://schemas.openxmlformats.org/officeDocument/2006/customXml" ds:itemID="{282B43AD-BEB8-4408-B964-6699055BDD23}">
-  <ds:schemaRefs>
-    <ds:schemaRef ds:uri="http://schemas.microsoft.com/sharepoint/v3/contenttype/forms"/>
-  </ds:schemaRefs>
-</ds:datastoreItem>
-</file>
-
-<file path=customXml/itemProps3.xml><?xml version="1.0" encoding="utf-8"?>
-<ds:datastoreItem xmlns:ds="http://schemas.openxmlformats.org/officeDocument/2006/customXml" ds:itemID="{D44D4DDB-9DCF-4941-AFA3-6B70145AFE8E}">
-  <ds:schemaRefs>
-    <ds:schemaRef ds:uri="http://purl.org/dc/elements/1.1/"/>
-    <ds:schemaRef ds:uri="http://schemas.microsoft.com/office/2006/metadata/properties"/>
-    <ds:schemaRef ds:uri="c45d460a-f8dc-498a-9991-b7ab1f141a2f"/>
-    <ds:schemaRef ds:uri="http://purl.org/dc/terms/"/>
-    <ds:schemaRef ds:uri="http://schemas.openxmlformats.org/package/2006/metadata/core-properties"/>
-    <ds:schemaRef ds:uri="http://schemas.microsoft.com/office/infopath/2007/PartnerControls"/>
-    <ds:schemaRef ds:uri="http://schemas.microsoft.com/office/2006/documentManagement/types"/>
-    <ds:schemaRef ds:uri="6ba8cf58-a5a0-4977-a82c-114eb7b1ce68"/>
-    <ds:schemaRef ds:uri="http://www.w3.org/XML/1998/namespace"/>
-    <ds:schemaRef ds:uri="http://purl.org/dc/dcmitype/"/>
-  </ds:schemaRefs>
-</ds:datastoreItem>
 </file>
</xml_diff>

<commit_message>
made short presentation a bit better
</commit_message>
<xml_diff>
--- a/Kubernetes & microservices as an easy way to build scalable solutions - short.pptx
+++ b/Kubernetes & microservices as an easy way to build scalable solutions - short.pptx
@@ -5,10 +5,10 @@
     <p:sldMasterId id="2147483648" r:id="rId4"/>
   </p:sldMasterIdLst>
   <p:notesMasterIdLst>
-    <p:notesMasterId r:id="rId43"/>
+    <p:notesMasterId r:id="rId40"/>
   </p:notesMasterIdLst>
   <p:handoutMasterIdLst>
-    <p:handoutMasterId r:id="rId44"/>
+    <p:handoutMasterId r:id="rId41"/>
   </p:handoutMasterIdLst>
   <p:sldIdLst>
     <p:sldId id="311" r:id="rId5"/>
@@ -20,35 +20,32 @@
     <p:sldId id="477" r:id="rId11"/>
     <p:sldId id="472" r:id="rId12"/>
     <p:sldId id="473" r:id="rId13"/>
-    <p:sldId id="476" r:id="rId14"/>
-    <p:sldId id="478" r:id="rId15"/>
-    <p:sldId id="475" r:id="rId16"/>
-    <p:sldId id="481" r:id="rId17"/>
-    <p:sldId id="518" r:id="rId18"/>
-    <p:sldId id="480" r:id="rId19"/>
-    <p:sldId id="482" r:id="rId20"/>
-    <p:sldId id="492" r:id="rId21"/>
-    <p:sldId id="494" r:id="rId22"/>
-    <p:sldId id="521" r:id="rId23"/>
-    <p:sldId id="519" r:id="rId24"/>
-    <p:sldId id="522" r:id="rId25"/>
-    <p:sldId id="490" r:id="rId26"/>
-    <p:sldId id="495" r:id="rId27"/>
-    <p:sldId id="474" r:id="rId28"/>
-    <p:sldId id="485" r:id="rId29"/>
-    <p:sldId id="496" r:id="rId30"/>
-    <p:sldId id="511" r:id="rId31"/>
-    <p:sldId id="486" r:id="rId32"/>
-    <p:sldId id="466" r:id="rId33"/>
-    <p:sldId id="469" r:id="rId34"/>
-    <p:sldId id="470" r:id="rId35"/>
-    <p:sldId id="467" r:id="rId36"/>
-    <p:sldId id="468" r:id="rId37"/>
-    <p:sldId id="479" r:id="rId38"/>
-    <p:sldId id="487" r:id="rId39"/>
-    <p:sldId id="322" r:id="rId40"/>
-    <p:sldId id="306" r:id="rId41"/>
-    <p:sldId id="462" r:id="rId42"/>
+    <p:sldId id="478" r:id="rId14"/>
+    <p:sldId id="475" r:id="rId15"/>
+    <p:sldId id="481" r:id="rId16"/>
+    <p:sldId id="518" r:id="rId17"/>
+    <p:sldId id="480" r:id="rId18"/>
+    <p:sldId id="482" r:id="rId19"/>
+    <p:sldId id="492" r:id="rId20"/>
+    <p:sldId id="494" r:id="rId21"/>
+    <p:sldId id="521" r:id="rId22"/>
+    <p:sldId id="490" r:id="rId23"/>
+    <p:sldId id="495" r:id="rId24"/>
+    <p:sldId id="474" r:id="rId25"/>
+    <p:sldId id="485" r:id="rId26"/>
+    <p:sldId id="496" r:id="rId27"/>
+    <p:sldId id="511" r:id="rId28"/>
+    <p:sldId id="486" r:id="rId29"/>
+    <p:sldId id="466" r:id="rId30"/>
+    <p:sldId id="469" r:id="rId31"/>
+    <p:sldId id="470" r:id="rId32"/>
+    <p:sldId id="467" r:id="rId33"/>
+    <p:sldId id="468" r:id="rId34"/>
+    <p:sldId id="479" r:id="rId35"/>
+    <p:sldId id="487" r:id="rId36"/>
+    <p:sldId id="322" r:id="rId37"/>
+    <p:sldId id="306" r:id="rId38"/>
+    <p:sldId id="462" r:id="rId39"/>
   </p:sldIdLst>
   <p:sldSz cx="12192000" cy="6858000"/>
   <p:notesSz cx="6858000" cy="9144000"/>
@@ -161,7 +158,6 @@
             <p14:sldId id="477"/>
             <p14:sldId id="472"/>
             <p14:sldId id="473"/>
-            <p14:sldId id="476"/>
             <p14:sldId id="478"/>
             <p14:sldId id="475"/>
             <p14:sldId id="481"/>
@@ -171,8 +167,6 @@
             <p14:sldId id="492"/>
             <p14:sldId id="494"/>
             <p14:sldId id="521"/>
-            <p14:sldId id="519"/>
-            <p14:sldId id="522"/>
             <p14:sldId id="490"/>
             <p14:sldId id="495"/>
             <p14:sldId id="474"/>
@@ -864,7 +858,7 @@
           <a:lstStyle/>
           <a:p>
             <a:r>
-              <a:rPr lang="en-US" sz="1200" b="0" i="0" kern="1200" dirty="0">
+              <a:rPr lang="en-US" sz="1200" b="0" i="0" kern="1200" dirty="0" err="1">
                 <a:solidFill>
                   <a:schemeClr val="tx1"/>
                 </a:solidFill>
@@ -873,10 +867,10 @@
                 <a:ea typeface="+mn-ea"/>
                 <a:cs typeface="+mn-cs"/>
               </a:rPr>
-              <a:t>The Horizontal Pod </a:t>
-            </a:r>
-            <a:r>
-              <a:rPr lang="en-US" sz="1200" b="0" i="0" kern="1200" dirty="0" err="1">
+              <a:t>Ilustrations</a:t>
+            </a:r>
+            <a:r>
+              <a:rPr lang="en-US" sz="1200" b="0" i="0" kern="1200" dirty="0">
                 <a:solidFill>
                   <a:schemeClr val="tx1"/>
                 </a:solidFill>
@@ -885,8 +879,32 @@
                 <a:ea typeface="+mn-ea"/>
                 <a:cs typeface="+mn-cs"/>
               </a:rPr>
-              <a:t>Autoscaler</a:t>
-            </a:r>
+              <a:t> are good. We should quite easily described what is going on.</a:t>
+            </a:r>
+          </a:p>
+          <a:p>
+            <a:endParaRPr lang="en-US" sz="1200" b="0" i="0" kern="1200" dirty="0">
+              <a:solidFill>
+                <a:schemeClr val="tx1"/>
+              </a:solidFill>
+              <a:effectLst/>
+              <a:latin typeface="+mn-lt"/>
+              <a:ea typeface="+mn-ea"/>
+              <a:cs typeface="+mn-cs"/>
+            </a:endParaRPr>
+          </a:p>
+          <a:p>
+            <a:endParaRPr lang="en-US" sz="1200" b="0" i="0" kern="1200" dirty="0">
+              <a:solidFill>
+                <a:schemeClr val="tx1"/>
+              </a:solidFill>
+              <a:effectLst/>
+              <a:latin typeface="+mn-lt"/>
+              <a:ea typeface="+mn-ea"/>
+              <a:cs typeface="+mn-cs"/>
+            </a:endParaRPr>
+          </a:p>
+          <a:p>
             <a:r>
               <a:rPr lang="en-US" sz="1200" b="0" i="0" kern="1200" dirty="0">
                 <a:solidFill>
@@ -897,145 +915,7 @@
                 <a:ea typeface="+mn-ea"/>
                 <a:cs typeface="+mn-cs"/>
               </a:rPr>
-              <a:t> is implemented as a control loop, with a period controlled by the controller manager’s --horizontal-pod-</a:t>
-            </a:r>
-            <a:r>
-              <a:rPr lang="en-US" sz="1200" b="0" i="0" kern="1200" dirty="0" err="1">
-                <a:solidFill>
-                  <a:schemeClr val="tx1"/>
-                </a:solidFill>
-                <a:effectLst/>
-                <a:latin typeface="+mn-lt"/>
-                <a:ea typeface="+mn-ea"/>
-                <a:cs typeface="+mn-cs"/>
-              </a:rPr>
-              <a:t>autoscaler</a:t>
-            </a:r>
-            <a:r>
-              <a:rPr lang="en-US" sz="1200" b="0" i="0" kern="1200" dirty="0">
-                <a:solidFill>
-                  <a:schemeClr val="tx1"/>
-                </a:solidFill>
-                <a:effectLst/>
-                <a:latin typeface="+mn-lt"/>
-                <a:ea typeface="+mn-ea"/>
-                <a:cs typeface="+mn-cs"/>
-              </a:rPr>
-              <a:t>-sync-period flag (with a default value of 30 seconds).</a:t>
-            </a:r>
-          </a:p>
-          <a:p>
-            <a:r>
-              <a:rPr lang="en-US" sz="1200" b="0" i="0" kern="1200" dirty="0">
-                <a:solidFill>
-                  <a:schemeClr val="tx1"/>
-                </a:solidFill>
-                <a:effectLst/>
-                <a:latin typeface="+mn-lt"/>
-                <a:ea typeface="+mn-ea"/>
-                <a:cs typeface="+mn-cs"/>
-              </a:rPr>
-              <a:t>During each period, the controller manager queries the resource utilization against the metrics specified in each </a:t>
-            </a:r>
-            <a:r>
-              <a:rPr lang="en-US" sz="1200" b="0" i="0" kern="1200" dirty="0" err="1">
-                <a:solidFill>
-                  <a:schemeClr val="tx1"/>
-                </a:solidFill>
-                <a:effectLst/>
-                <a:latin typeface="+mn-lt"/>
-                <a:ea typeface="+mn-ea"/>
-                <a:cs typeface="+mn-cs"/>
-              </a:rPr>
-              <a:t>HorizontalPodAutoscaler</a:t>
-            </a:r>
-            <a:r>
-              <a:rPr lang="en-US" sz="1200" b="0" i="0" kern="1200" dirty="0">
-                <a:solidFill>
-                  <a:schemeClr val="tx1"/>
-                </a:solidFill>
-                <a:effectLst/>
-                <a:latin typeface="+mn-lt"/>
-                <a:ea typeface="+mn-ea"/>
-                <a:cs typeface="+mn-cs"/>
-              </a:rPr>
-              <a:t> definition. The controller manager obtains the metrics from either the resource metrics API (for per-pod resource metrics), or the custom metrics API (for all other metrics).</a:t>
-            </a:r>
-          </a:p>
-          <a:p>
-            <a:r>
-              <a:rPr lang="en-US" sz="1200" b="0" i="0" kern="1200" dirty="0">
-                <a:solidFill>
-                  <a:schemeClr val="tx1"/>
-                </a:solidFill>
-                <a:effectLst/>
-                <a:latin typeface="+mn-lt"/>
-                <a:ea typeface="+mn-ea"/>
-                <a:cs typeface="+mn-cs"/>
-              </a:rPr>
-              <a:t>For per-pod resource metrics (like CPU), the controller fetches the metrics from the resource metrics API for each pod targeted by the </a:t>
-            </a:r>
-            <a:r>
-              <a:rPr lang="en-US" sz="1200" b="0" i="0" kern="1200" dirty="0" err="1">
-                <a:solidFill>
-                  <a:schemeClr val="tx1"/>
-                </a:solidFill>
-                <a:effectLst/>
-                <a:latin typeface="+mn-lt"/>
-                <a:ea typeface="+mn-ea"/>
-                <a:cs typeface="+mn-cs"/>
-              </a:rPr>
-              <a:t>HorizontalPodAutoscaler</a:t>
-            </a:r>
-            <a:r>
-              <a:rPr lang="en-US" sz="1200" b="0" i="0" kern="1200" dirty="0">
-                <a:solidFill>
-                  <a:schemeClr val="tx1"/>
-                </a:solidFill>
-                <a:effectLst/>
-                <a:latin typeface="+mn-lt"/>
-                <a:ea typeface="+mn-ea"/>
-                <a:cs typeface="+mn-cs"/>
-              </a:rPr>
-              <a:t>. Then, if a target utilization value is set, the controller calculates the utilization value as a percentage of the equivalent resource request on the containers in each pod. If a target raw value is set, the raw metric values are used directly. The controller then takes the mean of the utilization or the raw value (depending on the type of target specified) across all targeted pods, and produces a ratio used to scale the number of desired replicas.</a:t>
-            </a:r>
-          </a:p>
-          <a:p>
-            <a:r>
-              <a:rPr lang="en-US" sz="1200" b="0" i="0" kern="1200" dirty="0">
-                <a:solidFill>
-                  <a:schemeClr val="tx1"/>
-                </a:solidFill>
-                <a:effectLst/>
-                <a:latin typeface="+mn-lt"/>
-                <a:ea typeface="+mn-ea"/>
-                <a:cs typeface="+mn-cs"/>
-              </a:rPr>
-              <a:t>Please note that if some of the pod’s containers do not have the relevant resource request set, CPU utilization for the pod will not be defined and the </a:t>
-            </a:r>
-            <a:r>
-              <a:rPr lang="en-US" sz="1200" b="0" i="0" kern="1200" dirty="0" err="1">
-                <a:solidFill>
-                  <a:schemeClr val="tx1"/>
-                </a:solidFill>
-                <a:effectLst/>
-                <a:latin typeface="+mn-lt"/>
-                <a:ea typeface="+mn-ea"/>
-                <a:cs typeface="+mn-cs"/>
-              </a:rPr>
-              <a:t>autoscaler</a:t>
-            </a:r>
-            <a:r>
-              <a:rPr lang="en-US" sz="1200" b="0" i="0" kern="1200" dirty="0">
-                <a:solidFill>
-                  <a:schemeClr val="tx1"/>
-                </a:solidFill>
-                <a:effectLst/>
-                <a:latin typeface="+mn-lt"/>
-                <a:ea typeface="+mn-ea"/>
-                <a:cs typeface="+mn-cs"/>
-              </a:rPr>
-              <a:t> will not take any action for that metric. See the </a:t>
+              <a:t>Scaling out a Deployment will ensure new Pods are created and scheduled to Nodes with available resources. Scaling in will reduce the number of Pods to the new desired state. Kubernetes also supports </a:t>
             </a:r>
             <a:r>
               <a:rPr lang="en-US" sz="1200" b="0" i="0" u="sng" kern="1200" dirty="0">
@@ -1048,7 +928,7 @@
                 <a:cs typeface="+mn-cs"/>
                 <a:hlinkClick r:id="rId3"/>
               </a:rPr>
-              <a:t>autoscaling algorithm design document</a:t>
+              <a:t>autoscaling </a:t>
             </a:r>
             <a:r>
               <a:rPr lang="en-US" sz="1200" b="0" i="0" kern="1200" dirty="0">
@@ -1060,7 +940,7 @@
                 <a:ea typeface="+mn-ea"/>
                 <a:cs typeface="+mn-cs"/>
               </a:rPr>
-              <a:t> for further details about how the autoscaling algorithm works.</a:t>
+              <a:t>of Pods, but it is outside of the scope of this tutorial. Scaling to zero is also possible, and it will terminate all Pods of the specified Deployment.</a:t>
             </a:r>
           </a:p>
           <a:p>
@@ -1074,12 +954,12 @@
                 <a:ea typeface="+mn-ea"/>
                 <a:cs typeface="+mn-cs"/>
               </a:rPr>
-              <a:t>For per-pod custom metrics, the controller functions similarly to per-pod resource metrics, except that it works with raw values, not utilization values.</a:t>
-            </a:r>
-          </a:p>
-          <a:p>
-            <a:r>
-              <a:rPr lang="en-US" sz="1200" b="0" i="0" kern="1200" dirty="0">
+              <a:t>Running multiple instances of an application will require a way to distribute the traffic to all of them. Services have an integrated load-balancer that will distribute network traffic to all Pods of an exposed Deployment. Services will monitor continuously the running Pods using endpoints, to ensure the traffic is sent only to available Pods.</a:t>
+            </a:r>
+          </a:p>
+          <a:p>
+            <a:r>
+              <a:rPr lang="en-US" sz="1200" b="0" i="1" kern="1200" dirty="0">
                 <a:solidFill>
                   <a:schemeClr val="tx1"/>
                 </a:solidFill>
@@ -1088,10 +968,22 @@
                 <a:ea typeface="+mn-ea"/>
                 <a:cs typeface="+mn-cs"/>
               </a:rPr>
-              <a:t>For object metrics, a single metric is fetched (which describes the object in question), and compared to the target value, to produce a ratio as above.</a:t>
-            </a:r>
-          </a:p>
-          <a:p>
+              <a:t>Scaling is accomplished by changing the number of replicas in a Deployment.</a:t>
+            </a:r>
+            <a:endParaRPr lang="en-US" sz="1200" b="0" i="0" kern="1200" dirty="0">
+              <a:solidFill>
+                <a:schemeClr val="tx1"/>
+              </a:solidFill>
+              <a:effectLst/>
+              <a:latin typeface="+mn-lt"/>
+              <a:ea typeface="+mn-ea"/>
+              <a:cs typeface="+mn-cs"/>
+            </a:endParaRPr>
+          </a:p>
+          <a:p>
+            <a:br>
+              <a:rPr lang="en-US" dirty="0"/>
+            </a:br>
             <a:r>
               <a:rPr lang="en-US" sz="1200" b="0" i="0" kern="1200" dirty="0">
                 <a:solidFill>
@@ -1102,315 +994,7 @@
                 <a:ea typeface="+mn-ea"/>
                 <a:cs typeface="+mn-cs"/>
               </a:rPr>
-              <a:t>The </a:t>
-            </a:r>
-            <a:r>
-              <a:rPr lang="en-US" sz="1200" b="0" i="0" kern="1200" dirty="0" err="1">
-                <a:solidFill>
-                  <a:schemeClr val="tx1"/>
-                </a:solidFill>
-                <a:effectLst/>
-                <a:latin typeface="+mn-lt"/>
-                <a:ea typeface="+mn-ea"/>
-                <a:cs typeface="+mn-cs"/>
-              </a:rPr>
-              <a:t>HorizontalPodAutoscaler</a:t>
-            </a:r>
-            <a:r>
-              <a:rPr lang="en-US" sz="1200" b="0" i="0" kern="1200" dirty="0">
-                <a:solidFill>
-                  <a:schemeClr val="tx1"/>
-                </a:solidFill>
-                <a:effectLst/>
-                <a:latin typeface="+mn-lt"/>
-                <a:ea typeface="+mn-ea"/>
-                <a:cs typeface="+mn-cs"/>
-              </a:rPr>
-              <a:t> controller can fetch metrics in two different ways: direct </a:t>
-            </a:r>
-            <a:r>
-              <a:rPr lang="en-US" sz="1200" b="0" i="0" kern="1200" dirty="0" err="1">
-                <a:solidFill>
-                  <a:schemeClr val="tx1"/>
-                </a:solidFill>
-                <a:effectLst/>
-                <a:latin typeface="+mn-lt"/>
-                <a:ea typeface="+mn-ea"/>
-                <a:cs typeface="+mn-cs"/>
-              </a:rPr>
-              <a:t>Heapster</a:t>
-            </a:r>
-            <a:r>
-              <a:rPr lang="en-US" sz="1200" b="0" i="0" kern="1200" dirty="0">
-                <a:solidFill>
-                  <a:schemeClr val="tx1"/>
-                </a:solidFill>
-                <a:effectLst/>
-                <a:latin typeface="+mn-lt"/>
-                <a:ea typeface="+mn-ea"/>
-                <a:cs typeface="+mn-cs"/>
-              </a:rPr>
-              <a:t> access, and REST client access.</a:t>
-            </a:r>
-          </a:p>
-          <a:p>
-            <a:r>
-              <a:rPr lang="en-US" sz="1200" b="0" i="0" kern="1200" dirty="0">
-                <a:solidFill>
-                  <a:schemeClr val="tx1"/>
-                </a:solidFill>
-                <a:effectLst/>
-                <a:latin typeface="+mn-lt"/>
-                <a:ea typeface="+mn-ea"/>
-                <a:cs typeface="+mn-cs"/>
-              </a:rPr>
-              <a:t>When using direct </a:t>
-            </a:r>
-            <a:r>
-              <a:rPr lang="en-US" sz="1200" b="0" i="0" kern="1200" dirty="0" err="1">
-                <a:solidFill>
-                  <a:schemeClr val="tx1"/>
-                </a:solidFill>
-                <a:effectLst/>
-                <a:latin typeface="+mn-lt"/>
-                <a:ea typeface="+mn-ea"/>
-                <a:cs typeface="+mn-cs"/>
-              </a:rPr>
-              <a:t>Heapster</a:t>
-            </a:r>
-            <a:r>
-              <a:rPr lang="en-US" sz="1200" b="0" i="0" kern="1200" dirty="0">
-                <a:solidFill>
-                  <a:schemeClr val="tx1"/>
-                </a:solidFill>
-                <a:effectLst/>
-                <a:latin typeface="+mn-lt"/>
-                <a:ea typeface="+mn-ea"/>
-                <a:cs typeface="+mn-cs"/>
-              </a:rPr>
-              <a:t> access, the </a:t>
-            </a:r>
-            <a:r>
-              <a:rPr lang="en-US" sz="1200" b="0" i="0" kern="1200" dirty="0" err="1">
-                <a:solidFill>
-                  <a:schemeClr val="tx1"/>
-                </a:solidFill>
-                <a:effectLst/>
-                <a:latin typeface="+mn-lt"/>
-                <a:ea typeface="+mn-ea"/>
-                <a:cs typeface="+mn-cs"/>
-              </a:rPr>
-              <a:t>HorizontalPodAutoscaler</a:t>
-            </a:r>
-            <a:r>
-              <a:rPr lang="en-US" sz="1200" b="0" i="0" kern="1200" dirty="0">
-                <a:solidFill>
-                  <a:schemeClr val="tx1"/>
-                </a:solidFill>
-                <a:effectLst/>
-                <a:latin typeface="+mn-lt"/>
-                <a:ea typeface="+mn-ea"/>
-                <a:cs typeface="+mn-cs"/>
-              </a:rPr>
-              <a:t> queries </a:t>
-            </a:r>
-            <a:r>
-              <a:rPr lang="en-US" sz="1200" b="0" i="0" kern="1200" dirty="0" err="1">
-                <a:solidFill>
-                  <a:schemeClr val="tx1"/>
-                </a:solidFill>
-                <a:effectLst/>
-                <a:latin typeface="+mn-lt"/>
-                <a:ea typeface="+mn-ea"/>
-                <a:cs typeface="+mn-cs"/>
-              </a:rPr>
-              <a:t>Heapster</a:t>
-            </a:r>
-            <a:r>
-              <a:rPr lang="en-US" sz="1200" b="0" i="0" kern="1200" dirty="0">
-                <a:solidFill>
-                  <a:schemeClr val="tx1"/>
-                </a:solidFill>
-                <a:effectLst/>
-                <a:latin typeface="+mn-lt"/>
-                <a:ea typeface="+mn-ea"/>
-                <a:cs typeface="+mn-cs"/>
-              </a:rPr>
-              <a:t> directly through the API server’s service proxy </a:t>
-            </a:r>
-            <a:r>
-              <a:rPr lang="en-US" sz="1200" b="0" i="0" kern="1200" dirty="0" err="1">
-                <a:solidFill>
-                  <a:schemeClr val="tx1"/>
-                </a:solidFill>
-                <a:effectLst/>
-                <a:latin typeface="+mn-lt"/>
-                <a:ea typeface="+mn-ea"/>
-                <a:cs typeface="+mn-cs"/>
-              </a:rPr>
-              <a:t>subresource</a:t>
-            </a:r>
-            <a:r>
-              <a:rPr lang="en-US" sz="1200" b="0" i="0" kern="1200" dirty="0">
-                <a:solidFill>
-                  <a:schemeClr val="tx1"/>
-                </a:solidFill>
-                <a:effectLst/>
-                <a:latin typeface="+mn-lt"/>
-                <a:ea typeface="+mn-ea"/>
-                <a:cs typeface="+mn-cs"/>
-              </a:rPr>
-              <a:t>. </a:t>
-            </a:r>
-            <a:r>
-              <a:rPr lang="en-US" sz="1200" b="0" i="0" kern="1200" dirty="0" err="1">
-                <a:solidFill>
-                  <a:schemeClr val="tx1"/>
-                </a:solidFill>
-                <a:effectLst/>
-                <a:latin typeface="+mn-lt"/>
-                <a:ea typeface="+mn-ea"/>
-                <a:cs typeface="+mn-cs"/>
-              </a:rPr>
-              <a:t>Heapster</a:t>
-            </a:r>
-            <a:r>
-              <a:rPr lang="en-US" sz="1200" b="0" i="0" kern="1200" dirty="0">
-                <a:solidFill>
-                  <a:schemeClr val="tx1"/>
-                </a:solidFill>
-                <a:effectLst/>
-                <a:latin typeface="+mn-lt"/>
-                <a:ea typeface="+mn-ea"/>
-                <a:cs typeface="+mn-cs"/>
-              </a:rPr>
-              <a:t> needs to be deployed on the cluster and running in the </a:t>
-            </a:r>
-            <a:r>
-              <a:rPr lang="en-US" sz="1200" b="0" i="0" kern="1200" dirty="0" err="1">
-                <a:solidFill>
-                  <a:schemeClr val="tx1"/>
-                </a:solidFill>
-                <a:effectLst/>
-                <a:latin typeface="+mn-lt"/>
-                <a:ea typeface="+mn-ea"/>
-                <a:cs typeface="+mn-cs"/>
-              </a:rPr>
-              <a:t>kube</a:t>
-            </a:r>
-            <a:r>
-              <a:rPr lang="en-US" sz="1200" b="0" i="0" kern="1200" dirty="0">
-                <a:solidFill>
-                  <a:schemeClr val="tx1"/>
-                </a:solidFill>
-                <a:effectLst/>
-                <a:latin typeface="+mn-lt"/>
-                <a:ea typeface="+mn-ea"/>
-                <a:cs typeface="+mn-cs"/>
-              </a:rPr>
-              <a:t>-system namespace.</a:t>
-            </a:r>
-          </a:p>
-          <a:p>
-            <a:r>
-              <a:rPr lang="en-US" sz="1200" b="0" i="0" kern="1200" dirty="0">
-                <a:solidFill>
-                  <a:schemeClr val="tx1"/>
-                </a:solidFill>
-                <a:effectLst/>
-                <a:latin typeface="+mn-lt"/>
-                <a:ea typeface="+mn-ea"/>
-                <a:cs typeface="+mn-cs"/>
-              </a:rPr>
-              <a:t>See </a:t>
-            </a:r>
-            <a:r>
-              <a:rPr lang="en-US" sz="1200" b="0" i="0" u="sng" kern="1200" dirty="0">
-                <a:solidFill>
-                  <a:schemeClr val="tx1"/>
-                </a:solidFill>
-                <a:effectLst/>
-                <a:latin typeface="+mn-lt"/>
-                <a:ea typeface="+mn-ea"/>
-                <a:cs typeface="+mn-cs"/>
-                <a:hlinkClick r:id="rId4"/>
-              </a:rPr>
-              <a:t>Support for custom metrics</a:t>
-            </a:r>
-            <a:r>
-              <a:rPr lang="en-US" sz="1200" b="0" i="0" kern="1200" dirty="0">
-                <a:solidFill>
-                  <a:schemeClr val="tx1"/>
-                </a:solidFill>
-                <a:effectLst/>
-                <a:latin typeface="+mn-lt"/>
-                <a:ea typeface="+mn-ea"/>
-                <a:cs typeface="+mn-cs"/>
-              </a:rPr>
-              <a:t> for more details on REST client access.</a:t>
-            </a:r>
-          </a:p>
-          <a:p>
-            <a:r>
-              <a:rPr lang="en-US" sz="1200" b="0" i="0" kern="1200" dirty="0">
-                <a:solidFill>
-                  <a:schemeClr val="tx1"/>
-                </a:solidFill>
-                <a:effectLst/>
-                <a:latin typeface="+mn-lt"/>
-                <a:ea typeface="+mn-ea"/>
-                <a:cs typeface="+mn-cs"/>
-              </a:rPr>
-              <a:t>The </a:t>
-            </a:r>
-            <a:r>
-              <a:rPr lang="en-US" sz="1200" b="0" i="0" kern="1200" dirty="0" err="1">
-                <a:solidFill>
-                  <a:schemeClr val="tx1"/>
-                </a:solidFill>
-                <a:effectLst/>
-                <a:latin typeface="+mn-lt"/>
-                <a:ea typeface="+mn-ea"/>
-                <a:cs typeface="+mn-cs"/>
-              </a:rPr>
-              <a:t>autoscaler</a:t>
-            </a:r>
-            <a:r>
-              <a:rPr lang="en-US" sz="1200" b="0" i="0" kern="1200" dirty="0">
-                <a:solidFill>
-                  <a:schemeClr val="tx1"/>
-                </a:solidFill>
-                <a:effectLst/>
-                <a:latin typeface="+mn-lt"/>
-                <a:ea typeface="+mn-ea"/>
-                <a:cs typeface="+mn-cs"/>
-              </a:rPr>
-              <a:t> accesses corresponding replication controller, deployment or replica set by scale sub-resource. Scale is an interface that allows you to dynamically set the number of replicas and examine each of their current states. More details on scale sub-resource can be found </a:t>
-            </a:r>
-            <a:r>
-              <a:rPr lang="en-US" sz="1200" b="0" i="0" u="sng" kern="1200" dirty="0">
-                <a:solidFill>
-                  <a:schemeClr val="tx1"/>
-                </a:solidFill>
-                <a:effectLst/>
-                <a:latin typeface="+mn-lt"/>
-                <a:ea typeface="+mn-ea"/>
-                <a:cs typeface="+mn-cs"/>
-                <a:hlinkClick r:id="rId5"/>
-              </a:rPr>
-              <a:t>here</a:t>
-            </a:r>
-            <a:r>
-              <a:rPr lang="en-US" sz="1200" b="0" i="0" kern="1200" dirty="0">
-                <a:solidFill>
-                  <a:schemeClr val="tx1"/>
-                </a:solidFill>
-                <a:effectLst/>
-                <a:latin typeface="+mn-lt"/>
-                <a:ea typeface="+mn-ea"/>
-                <a:cs typeface="+mn-cs"/>
-              </a:rPr>
-              <a:t>.</a:t>
+              <a:t>Once you have multiple instances of an Application running, you would be able to do Rolling updates without downtime. We'll cover that in the next module. Now, let's go to the online terminal and scale our application.</a:t>
             </a:r>
           </a:p>
           <a:p>
@@ -1435,7 +1019,7 @@
           <a:p>
             <a:fld id="{5C4893B0-BD2B-0F4A-85E1-401D62D67B75}" type="slidenum">
               <a:rPr lang="nb-NO" smtClean="0"/>
-              <a:t>33</a:t>
+              <a:t>27</a:t>
             </a:fld>
             <a:endParaRPr lang="nb-NO"/>
           </a:p>
@@ -1444,7 +1028,7 @@
     </p:spTree>
     <p:extLst>
       <p:ext uri="{BB962C8B-B14F-4D97-AF65-F5344CB8AC3E}">
-        <p14:creationId xmlns:p14="http://schemas.microsoft.com/office/powerpoint/2010/main" val="3665958238"/>
+        <p14:creationId xmlns:p14="http://schemas.microsoft.com/office/powerpoint/2010/main" val="2701792365"/>
       </p:ext>
     </p:extLst>
   </p:cSld>
@@ -1499,17 +1083,553 @@
           <a:lstStyle/>
           <a:p>
             <a:r>
-              <a:rPr lang="en-US" dirty="0"/>
-              <a:t>How to scale number of nodes?</a:t>
-            </a:r>
-          </a:p>
-          <a:p>
-            <a:endParaRPr lang="en-US" dirty="0"/>
-          </a:p>
-          <a:p>
-            <a:r>
-              <a:rPr lang="en-US" dirty="0"/>
-              <a:t>Maybe something about managed container service? Why we do not use it?</a:t>
+              <a:rPr lang="en-US" sz="1200" b="0" i="0" kern="1200" dirty="0">
+                <a:solidFill>
+                  <a:schemeClr val="tx1"/>
+                </a:solidFill>
+                <a:effectLst/>
+                <a:latin typeface="+mn-lt"/>
+                <a:ea typeface="+mn-ea"/>
+                <a:cs typeface="+mn-cs"/>
+              </a:rPr>
+              <a:t>The Horizontal Pod </a:t>
+            </a:r>
+            <a:r>
+              <a:rPr lang="en-US" sz="1200" b="0" i="0" kern="1200" dirty="0" err="1">
+                <a:solidFill>
+                  <a:schemeClr val="tx1"/>
+                </a:solidFill>
+                <a:effectLst/>
+                <a:latin typeface="+mn-lt"/>
+                <a:ea typeface="+mn-ea"/>
+                <a:cs typeface="+mn-cs"/>
+              </a:rPr>
+              <a:t>Autoscaler</a:t>
+            </a:r>
+            <a:r>
+              <a:rPr lang="en-US" sz="1200" b="0" i="0" kern="1200" dirty="0">
+                <a:solidFill>
+                  <a:schemeClr val="tx1"/>
+                </a:solidFill>
+                <a:effectLst/>
+                <a:latin typeface="+mn-lt"/>
+                <a:ea typeface="+mn-ea"/>
+                <a:cs typeface="+mn-cs"/>
+              </a:rPr>
+              <a:t> is implemented as a control loop, with a period controlled by the controller manager’s --horizontal-pod-</a:t>
+            </a:r>
+            <a:r>
+              <a:rPr lang="en-US" sz="1200" b="0" i="0" kern="1200" dirty="0" err="1">
+                <a:solidFill>
+                  <a:schemeClr val="tx1"/>
+                </a:solidFill>
+                <a:effectLst/>
+                <a:latin typeface="+mn-lt"/>
+                <a:ea typeface="+mn-ea"/>
+                <a:cs typeface="+mn-cs"/>
+              </a:rPr>
+              <a:t>autoscaler</a:t>
+            </a:r>
+            <a:r>
+              <a:rPr lang="en-US" sz="1200" b="0" i="0" kern="1200" dirty="0">
+                <a:solidFill>
+                  <a:schemeClr val="tx1"/>
+                </a:solidFill>
+                <a:effectLst/>
+                <a:latin typeface="+mn-lt"/>
+                <a:ea typeface="+mn-ea"/>
+                <a:cs typeface="+mn-cs"/>
+              </a:rPr>
+              <a:t>-sync-period flag (with a default value of 30 seconds).</a:t>
+            </a:r>
+          </a:p>
+          <a:p>
+            <a:r>
+              <a:rPr lang="en-US" sz="1200" b="0" i="0" kern="1200" dirty="0">
+                <a:solidFill>
+                  <a:schemeClr val="tx1"/>
+                </a:solidFill>
+                <a:effectLst/>
+                <a:latin typeface="+mn-lt"/>
+                <a:ea typeface="+mn-ea"/>
+                <a:cs typeface="+mn-cs"/>
+              </a:rPr>
+              <a:t>During each period, the controller manager queries the resource utilization against the metrics specified in each </a:t>
+            </a:r>
+            <a:r>
+              <a:rPr lang="en-US" sz="1200" b="0" i="0" kern="1200" dirty="0" err="1">
+                <a:solidFill>
+                  <a:schemeClr val="tx1"/>
+                </a:solidFill>
+                <a:effectLst/>
+                <a:latin typeface="+mn-lt"/>
+                <a:ea typeface="+mn-ea"/>
+                <a:cs typeface="+mn-cs"/>
+              </a:rPr>
+              <a:t>HorizontalPodAutoscaler</a:t>
+            </a:r>
+            <a:r>
+              <a:rPr lang="en-US" sz="1200" b="0" i="0" kern="1200" dirty="0">
+                <a:solidFill>
+                  <a:schemeClr val="tx1"/>
+                </a:solidFill>
+                <a:effectLst/>
+                <a:latin typeface="+mn-lt"/>
+                <a:ea typeface="+mn-ea"/>
+                <a:cs typeface="+mn-cs"/>
+              </a:rPr>
+              <a:t> definition. The controller manager obtains the metrics from either the resource metrics API (for per-pod resource metrics), or the custom metrics API (for all other metrics).</a:t>
+            </a:r>
+          </a:p>
+          <a:p>
+            <a:r>
+              <a:rPr lang="en-US" sz="1200" b="0" i="0" kern="1200" dirty="0">
+                <a:solidFill>
+                  <a:schemeClr val="tx1"/>
+                </a:solidFill>
+                <a:effectLst/>
+                <a:latin typeface="+mn-lt"/>
+                <a:ea typeface="+mn-ea"/>
+                <a:cs typeface="+mn-cs"/>
+              </a:rPr>
+              <a:t>For per-pod resource metrics (like CPU), the controller fetches the metrics from the resource metrics API for each pod targeted by the </a:t>
+            </a:r>
+            <a:r>
+              <a:rPr lang="en-US" sz="1200" b="0" i="0" kern="1200" dirty="0" err="1">
+                <a:solidFill>
+                  <a:schemeClr val="tx1"/>
+                </a:solidFill>
+                <a:effectLst/>
+                <a:latin typeface="+mn-lt"/>
+                <a:ea typeface="+mn-ea"/>
+                <a:cs typeface="+mn-cs"/>
+              </a:rPr>
+              <a:t>HorizontalPodAutoscaler</a:t>
+            </a:r>
+            <a:r>
+              <a:rPr lang="en-US" sz="1200" b="0" i="0" kern="1200" dirty="0">
+                <a:solidFill>
+                  <a:schemeClr val="tx1"/>
+                </a:solidFill>
+                <a:effectLst/>
+                <a:latin typeface="+mn-lt"/>
+                <a:ea typeface="+mn-ea"/>
+                <a:cs typeface="+mn-cs"/>
+              </a:rPr>
+              <a:t>. Then, if a target utilization value is set, the controller calculates the utilization value as a percentage of the equivalent resource request on the containers in each pod. If a target raw value is set, the raw metric values are used directly. The controller then takes the mean of the utilization or the raw value (depending on the type of target specified) across all targeted pods, and produces a ratio used to scale the number of desired replicas.</a:t>
+            </a:r>
+          </a:p>
+          <a:p>
+            <a:r>
+              <a:rPr lang="en-US" sz="1200" b="0" i="0" kern="1200" dirty="0">
+                <a:solidFill>
+                  <a:schemeClr val="tx1"/>
+                </a:solidFill>
+                <a:effectLst/>
+                <a:latin typeface="+mn-lt"/>
+                <a:ea typeface="+mn-ea"/>
+                <a:cs typeface="+mn-cs"/>
+              </a:rPr>
+              <a:t>Please note that if some of the pod’s containers do not have the relevant resource request set, CPU utilization for the pod will not be defined and the </a:t>
+            </a:r>
+            <a:r>
+              <a:rPr lang="en-US" sz="1200" b="0" i="0" kern="1200" dirty="0" err="1">
+                <a:solidFill>
+                  <a:schemeClr val="tx1"/>
+                </a:solidFill>
+                <a:effectLst/>
+                <a:latin typeface="+mn-lt"/>
+                <a:ea typeface="+mn-ea"/>
+                <a:cs typeface="+mn-cs"/>
+              </a:rPr>
+              <a:t>autoscaler</a:t>
+            </a:r>
+            <a:r>
+              <a:rPr lang="en-US" sz="1200" b="0" i="0" kern="1200" dirty="0">
+                <a:solidFill>
+                  <a:schemeClr val="tx1"/>
+                </a:solidFill>
+                <a:effectLst/>
+                <a:latin typeface="+mn-lt"/>
+                <a:ea typeface="+mn-ea"/>
+                <a:cs typeface="+mn-cs"/>
+              </a:rPr>
+              <a:t> will not take any action for that metric. See the </a:t>
+            </a:r>
+            <a:r>
+              <a:rPr lang="en-US" sz="1200" b="0" i="0" u="sng" kern="1200" dirty="0">
+                <a:solidFill>
+                  <a:schemeClr val="tx1"/>
+                </a:solidFill>
+                <a:effectLst/>
+                <a:latin typeface="+mn-lt"/>
+                <a:ea typeface="+mn-ea"/>
+                <a:cs typeface="+mn-cs"/>
+                <a:hlinkClick r:id="rId3"/>
+              </a:rPr>
+              <a:t>autoscaling algorithm design document</a:t>
+            </a:r>
+            <a:r>
+              <a:rPr lang="en-US" sz="1200" b="0" i="0" kern="1200" dirty="0">
+                <a:solidFill>
+                  <a:schemeClr val="tx1"/>
+                </a:solidFill>
+                <a:effectLst/>
+                <a:latin typeface="+mn-lt"/>
+                <a:ea typeface="+mn-ea"/>
+                <a:cs typeface="+mn-cs"/>
+              </a:rPr>
+              <a:t> for further details about how the autoscaling algorithm works.</a:t>
+            </a:r>
+          </a:p>
+          <a:p>
+            <a:r>
+              <a:rPr lang="en-US" sz="1200" b="0" i="0" kern="1200" dirty="0">
+                <a:solidFill>
+                  <a:schemeClr val="tx1"/>
+                </a:solidFill>
+                <a:effectLst/>
+                <a:latin typeface="+mn-lt"/>
+                <a:ea typeface="+mn-ea"/>
+                <a:cs typeface="+mn-cs"/>
+              </a:rPr>
+              <a:t>For per-pod custom metrics, the controller functions similarly to per-pod resource metrics, except that it works with raw values, not utilization values.</a:t>
+            </a:r>
+          </a:p>
+          <a:p>
+            <a:r>
+              <a:rPr lang="en-US" sz="1200" b="0" i="0" kern="1200" dirty="0">
+                <a:solidFill>
+                  <a:schemeClr val="tx1"/>
+                </a:solidFill>
+                <a:effectLst/>
+                <a:latin typeface="+mn-lt"/>
+                <a:ea typeface="+mn-ea"/>
+                <a:cs typeface="+mn-cs"/>
+              </a:rPr>
+              <a:t>For object metrics, a single metric is fetched (which describes the object in question), and compared to the target value, to produce a ratio as above.</a:t>
+            </a:r>
+          </a:p>
+          <a:p>
+            <a:r>
+              <a:rPr lang="en-US" sz="1200" b="0" i="0" kern="1200" dirty="0">
+                <a:solidFill>
+                  <a:schemeClr val="tx1"/>
+                </a:solidFill>
+                <a:effectLst/>
+                <a:latin typeface="+mn-lt"/>
+                <a:ea typeface="+mn-ea"/>
+                <a:cs typeface="+mn-cs"/>
+              </a:rPr>
+              <a:t>The </a:t>
+            </a:r>
+            <a:r>
+              <a:rPr lang="en-US" sz="1200" b="0" i="0" kern="1200" dirty="0" err="1">
+                <a:solidFill>
+                  <a:schemeClr val="tx1"/>
+                </a:solidFill>
+                <a:effectLst/>
+                <a:latin typeface="+mn-lt"/>
+                <a:ea typeface="+mn-ea"/>
+                <a:cs typeface="+mn-cs"/>
+              </a:rPr>
+              <a:t>HorizontalPodAutoscaler</a:t>
+            </a:r>
+            <a:r>
+              <a:rPr lang="en-US" sz="1200" b="0" i="0" kern="1200" dirty="0">
+                <a:solidFill>
+                  <a:schemeClr val="tx1"/>
+                </a:solidFill>
+                <a:effectLst/>
+                <a:latin typeface="+mn-lt"/>
+                <a:ea typeface="+mn-ea"/>
+                <a:cs typeface="+mn-cs"/>
+              </a:rPr>
+              <a:t> controller can fetch metrics in two different ways: direct </a:t>
+            </a:r>
+            <a:r>
+              <a:rPr lang="en-US" sz="1200" b="0" i="0" kern="1200" dirty="0" err="1">
+                <a:solidFill>
+                  <a:schemeClr val="tx1"/>
+                </a:solidFill>
+                <a:effectLst/>
+                <a:latin typeface="+mn-lt"/>
+                <a:ea typeface="+mn-ea"/>
+                <a:cs typeface="+mn-cs"/>
+              </a:rPr>
+              <a:t>Heapster</a:t>
+            </a:r>
+            <a:r>
+              <a:rPr lang="en-US" sz="1200" b="0" i="0" kern="1200" dirty="0">
+                <a:solidFill>
+                  <a:schemeClr val="tx1"/>
+                </a:solidFill>
+                <a:effectLst/>
+                <a:latin typeface="+mn-lt"/>
+                <a:ea typeface="+mn-ea"/>
+                <a:cs typeface="+mn-cs"/>
+              </a:rPr>
+              <a:t> access, and REST client access.</a:t>
+            </a:r>
+          </a:p>
+          <a:p>
+            <a:r>
+              <a:rPr lang="en-US" sz="1200" b="0" i="0" kern="1200" dirty="0">
+                <a:solidFill>
+                  <a:schemeClr val="tx1"/>
+                </a:solidFill>
+                <a:effectLst/>
+                <a:latin typeface="+mn-lt"/>
+                <a:ea typeface="+mn-ea"/>
+                <a:cs typeface="+mn-cs"/>
+              </a:rPr>
+              <a:t>When using direct </a:t>
+            </a:r>
+            <a:r>
+              <a:rPr lang="en-US" sz="1200" b="0" i="0" kern="1200" dirty="0" err="1">
+                <a:solidFill>
+                  <a:schemeClr val="tx1"/>
+                </a:solidFill>
+                <a:effectLst/>
+                <a:latin typeface="+mn-lt"/>
+                <a:ea typeface="+mn-ea"/>
+                <a:cs typeface="+mn-cs"/>
+              </a:rPr>
+              <a:t>Heapster</a:t>
+            </a:r>
+            <a:r>
+              <a:rPr lang="en-US" sz="1200" b="0" i="0" kern="1200" dirty="0">
+                <a:solidFill>
+                  <a:schemeClr val="tx1"/>
+                </a:solidFill>
+                <a:effectLst/>
+                <a:latin typeface="+mn-lt"/>
+                <a:ea typeface="+mn-ea"/>
+                <a:cs typeface="+mn-cs"/>
+              </a:rPr>
+              <a:t> access, the </a:t>
+            </a:r>
+            <a:r>
+              <a:rPr lang="en-US" sz="1200" b="0" i="0" kern="1200" dirty="0" err="1">
+                <a:solidFill>
+                  <a:schemeClr val="tx1"/>
+                </a:solidFill>
+                <a:effectLst/>
+                <a:latin typeface="+mn-lt"/>
+                <a:ea typeface="+mn-ea"/>
+                <a:cs typeface="+mn-cs"/>
+              </a:rPr>
+              <a:t>HorizontalPodAutoscaler</a:t>
+            </a:r>
+            <a:r>
+              <a:rPr lang="en-US" sz="1200" b="0" i="0" kern="1200" dirty="0">
+                <a:solidFill>
+                  <a:schemeClr val="tx1"/>
+                </a:solidFill>
+                <a:effectLst/>
+                <a:latin typeface="+mn-lt"/>
+                <a:ea typeface="+mn-ea"/>
+                <a:cs typeface="+mn-cs"/>
+              </a:rPr>
+              <a:t> queries </a:t>
+            </a:r>
+            <a:r>
+              <a:rPr lang="en-US" sz="1200" b="0" i="0" kern="1200" dirty="0" err="1">
+                <a:solidFill>
+                  <a:schemeClr val="tx1"/>
+                </a:solidFill>
+                <a:effectLst/>
+                <a:latin typeface="+mn-lt"/>
+                <a:ea typeface="+mn-ea"/>
+                <a:cs typeface="+mn-cs"/>
+              </a:rPr>
+              <a:t>Heapster</a:t>
+            </a:r>
+            <a:r>
+              <a:rPr lang="en-US" sz="1200" b="0" i="0" kern="1200" dirty="0">
+                <a:solidFill>
+                  <a:schemeClr val="tx1"/>
+                </a:solidFill>
+                <a:effectLst/>
+                <a:latin typeface="+mn-lt"/>
+                <a:ea typeface="+mn-ea"/>
+                <a:cs typeface="+mn-cs"/>
+              </a:rPr>
+              <a:t> directly through the API server’s service proxy </a:t>
+            </a:r>
+            <a:r>
+              <a:rPr lang="en-US" sz="1200" b="0" i="0" kern="1200" dirty="0" err="1">
+                <a:solidFill>
+                  <a:schemeClr val="tx1"/>
+                </a:solidFill>
+                <a:effectLst/>
+                <a:latin typeface="+mn-lt"/>
+                <a:ea typeface="+mn-ea"/>
+                <a:cs typeface="+mn-cs"/>
+              </a:rPr>
+              <a:t>subresource</a:t>
+            </a:r>
+            <a:r>
+              <a:rPr lang="en-US" sz="1200" b="0" i="0" kern="1200" dirty="0">
+                <a:solidFill>
+                  <a:schemeClr val="tx1"/>
+                </a:solidFill>
+                <a:effectLst/>
+                <a:latin typeface="+mn-lt"/>
+                <a:ea typeface="+mn-ea"/>
+                <a:cs typeface="+mn-cs"/>
+              </a:rPr>
+              <a:t>. </a:t>
+            </a:r>
+            <a:r>
+              <a:rPr lang="en-US" sz="1200" b="0" i="0" kern="1200" dirty="0" err="1">
+                <a:solidFill>
+                  <a:schemeClr val="tx1"/>
+                </a:solidFill>
+                <a:effectLst/>
+                <a:latin typeface="+mn-lt"/>
+                <a:ea typeface="+mn-ea"/>
+                <a:cs typeface="+mn-cs"/>
+              </a:rPr>
+              <a:t>Heapster</a:t>
+            </a:r>
+            <a:r>
+              <a:rPr lang="en-US" sz="1200" b="0" i="0" kern="1200" dirty="0">
+                <a:solidFill>
+                  <a:schemeClr val="tx1"/>
+                </a:solidFill>
+                <a:effectLst/>
+                <a:latin typeface="+mn-lt"/>
+                <a:ea typeface="+mn-ea"/>
+                <a:cs typeface="+mn-cs"/>
+              </a:rPr>
+              <a:t> needs to be deployed on the cluster and running in the </a:t>
+            </a:r>
+            <a:r>
+              <a:rPr lang="en-US" sz="1200" b="0" i="0" kern="1200" dirty="0" err="1">
+                <a:solidFill>
+                  <a:schemeClr val="tx1"/>
+                </a:solidFill>
+                <a:effectLst/>
+                <a:latin typeface="+mn-lt"/>
+                <a:ea typeface="+mn-ea"/>
+                <a:cs typeface="+mn-cs"/>
+              </a:rPr>
+              <a:t>kube</a:t>
+            </a:r>
+            <a:r>
+              <a:rPr lang="en-US" sz="1200" b="0" i="0" kern="1200" dirty="0">
+                <a:solidFill>
+                  <a:schemeClr val="tx1"/>
+                </a:solidFill>
+                <a:effectLst/>
+                <a:latin typeface="+mn-lt"/>
+                <a:ea typeface="+mn-ea"/>
+                <a:cs typeface="+mn-cs"/>
+              </a:rPr>
+              <a:t>-system namespace.</a:t>
+            </a:r>
+          </a:p>
+          <a:p>
+            <a:r>
+              <a:rPr lang="en-US" sz="1200" b="0" i="0" kern="1200" dirty="0">
+                <a:solidFill>
+                  <a:schemeClr val="tx1"/>
+                </a:solidFill>
+                <a:effectLst/>
+                <a:latin typeface="+mn-lt"/>
+                <a:ea typeface="+mn-ea"/>
+                <a:cs typeface="+mn-cs"/>
+              </a:rPr>
+              <a:t>See </a:t>
+            </a:r>
+            <a:r>
+              <a:rPr lang="en-US" sz="1200" b="0" i="0" u="sng" kern="1200" dirty="0">
+                <a:solidFill>
+                  <a:schemeClr val="tx1"/>
+                </a:solidFill>
+                <a:effectLst/>
+                <a:latin typeface="+mn-lt"/>
+                <a:ea typeface="+mn-ea"/>
+                <a:cs typeface="+mn-cs"/>
+                <a:hlinkClick r:id="rId4"/>
+              </a:rPr>
+              <a:t>Support for custom metrics</a:t>
+            </a:r>
+            <a:r>
+              <a:rPr lang="en-US" sz="1200" b="0" i="0" kern="1200" dirty="0">
+                <a:solidFill>
+                  <a:schemeClr val="tx1"/>
+                </a:solidFill>
+                <a:effectLst/>
+                <a:latin typeface="+mn-lt"/>
+                <a:ea typeface="+mn-ea"/>
+                <a:cs typeface="+mn-cs"/>
+              </a:rPr>
+              <a:t> for more details on REST client access.</a:t>
+            </a:r>
+          </a:p>
+          <a:p>
+            <a:r>
+              <a:rPr lang="en-US" sz="1200" b="0" i="0" kern="1200" dirty="0">
+                <a:solidFill>
+                  <a:schemeClr val="tx1"/>
+                </a:solidFill>
+                <a:effectLst/>
+                <a:latin typeface="+mn-lt"/>
+                <a:ea typeface="+mn-ea"/>
+                <a:cs typeface="+mn-cs"/>
+              </a:rPr>
+              <a:t>The </a:t>
+            </a:r>
+            <a:r>
+              <a:rPr lang="en-US" sz="1200" b="0" i="0" kern="1200" dirty="0" err="1">
+                <a:solidFill>
+                  <a:schemeClr val="tx1"/>
+                </a:solidFill>
+                <a:effectLst/>
+                <a:latin typeface="+mn-lt"/>
+                <a:ea typeface="+mn-ea"/>
+                <a:cs typeface="+mn-cs"/>
+              </a:rPr>
+              <a:t>autoscaler</a:t>
+            </a:r>
+            <a:r>
+              <a:rPr lang="en-US" sz="1200" b="0" i="0" kern="1200" dirty="0">
+                <a:solidFill>
+                  <a:schemeClr val="tx1"/>
+                </a:solidFill>
+                <a:effectLst/>
+                <a:latin typeface="+mn-lt"/>
+                <a:ea typeface="+mn-ea"/>
+                <a:cs typeface="+mn-cs"/>
+              </a:rPr>
+              <a:t> accesses corresponding replication controller, deployment or replica set by scale sub-resource. Scale is an interface that allows you to dynamically set the number of replicas and examine each of their current states. More details on scale sub-resource can be found </a:t>
+            </a:r>
+            <a:r>
+              <a:rPr lang="en-US" sz="1200" b="0" i="0" u="sng" kern="1200" dirty="0">
+                <a:solidFill>
+                  <a:schemeClr val="tx1"/>
+                </a:solidFill>
+                <a:effectLst/>
+                <a:latin typeface="+mn-lt"/>
+                <a:ea typeface="+mn-ea"/>
+                <a:cs typeface="+mn-cs"/>
+                <a:hlinkClick r:id="rId5"/>
+              </a:rPr>
+              <a:t>here</a:t>
+            </a:r>
+            <a:r>
+              <a:rPr lang="en-US" sz="1200" b="0" i="0" kern="1200" dirty="0">
+                <a:solidFill>
+                  <a:schemeClr val="tx1"/>
+                </a:solidFill>
+                <a:effectLst/>
+                <a:latin typeface="+mn-lt"/>
+                <a:ea typeface="+mn-ea"/>
+                <a:cs typeface="+mn-cs"/>
+              </a:rPr>
+              <a:t>.</a:t>
             </a:r>
           </a:p>
           <a:p>
@@ -1534,7 +1654,7 @@
           <a:p>
             <a:fld id="{5C4893B0-BD2B-0F4A-85E1-401D62D67B75}" type="slidenum">
               <a:rPr lang="nb-NO" smtClean="0"/>
-              <a:t>34</a:t>
+              <a:t>30</a:t>
             </a:fld>
             <a:endParaRPr lang="nb-NO"/>
           </a:p>
@@ -1543,7 +1663,7 @@
     </p:spTree>
     <p:extLst>
       <p:ext uri="{BB962C8B-B14F-4D97-AF65-F5344CB8AC3E}">
-        <p14:creationId xmlns:p14="http://schemas.microsoft.com/office/powerpoint/2010/main" val="3686686486"/>
+        <p14:creationId xmlns:p14="http://schemas.microsoft.com/office/powerpoint/2010/main" val="3665958238"/>
       </p:ext>
     </p:extLst>
   </p:cSld>
@@ -1599,38 +1719,20 @@
           <a:p>
             <a:r>
               <a:rPr lang="en-US" dirty="0"/>
-              <a:t>More of our project into it.</a:t>
-            </a:r>
+              <a:t>How to scale number of nodes?</a:t>
+            </a:r>
+          </a:p>
+          <a:p>
+            <a:endParaRPr lang="en-US" dirty="0"/>
           </a:p>
           <a:p>
             <a:r>
               <a:rPr lang="en-US" dirty="0"/>
-              <a:t>Expose some performance metrics / measurements from Prometheus.</a:t>
-            </a:r>
-          </a:p>
-          <a:p>
-            <a:r>
-              <a:rPr lang="en-US" dirty="0"/>
-              <a:t>Agile / lean startup model.</a:t>
-            </a:r>
-          </a:p>
-          <a:p>
-            <a:r>
-              <a:rPr lang="en-US" dirty="0"/>
-              <a:t>The way we are going that -&gt; more agile, code – then see.</a:t>
-            </a:r>
-          </a:p>
-          <a:p>
-            <a:r>
-              <a:rPr lang="en-US" dirty="0"/>
-              <a:t>Automated performance test for crucial operations (placing order).</a:t>
-            </a:r>
-          </a:p>
-          <a:p>
-            <a:r>
-              <a:rPr lang="en-US" dirty="0"/>
-              <a:t>Show the audience about possibilities – live performance, get some alarms, use Prometheus. Automatically scale based on Prom metrics.</a:t>
-            </a:r>
+              <a:t>Maybe something about managed container service? Why we do not use it?</a:t>
+            </a:r>
+          </a:p>
+          <a:p>
+            <a:endParaRPr lang="en-US" dirty="0"/>
           </a:p>
         </p:txBody>
       </p:sp>
@@ -1651,7 +1753,7 @@
           <a:p>
             <a:fld id="{5C4893B0-BD2B-0F4A-85E1-401D62D67B75}" type="slidenum">
               <a:rPr lang="nb-NO" smtClean="0"/>
-              <a:t>35</a:t>
+              <a:t>31</a:t>
             </a:fld>
             <a:endParaRPr lang="nb-NO"/>
           </a:p>
@@ -1660,7 +1762,7 @@
     </p:spTree>
     <p:extLst>
       <p:ext uri="{BB962C8B-B14F-4D97-AF65-F5344CB8AC3E}">
-        <p14:creationId xmlns:p14="http://schemas.microsoft.com/office/powerpoint/2010/main" val="2900627759"/>
+        <p14:creationId xmlns:p14="http://schemas.microsoft.com/office/powerpoint/2010/main" val="3686686486"/>
       </p:ext>
     </p:extLst>
   </p:cSld>
@@ -1714,7 +1816,40 @@
           <a:bodyPr/>
           <a:lstStyle/>
           <a:p>
-            <a:endParaRPr lang="en-US" dirty="0"/>
+            <a:r>
+              <a:rPr lang="en-US" dirty="0"/>
+              <a:t>More of our project into it.</a:t>
+            </a:r>
+          </a:p>
+          <a:p>
+            <a:r>
+              <a:rPr lang="en-US" dirty="0"/>
+              <a:t>Expose some performance metrics / measurements from Prometheus.</a:t>
+            </a:r>
+          </a:p>
+          <a:p>
+            <a:r>
+              <a:rPr lang="en-US" dirty="0"/>
+              <a:t>Agile / lean startup model.</a:t>
+            </a:r>
+          </a:p>
+          <a:p>
+            <a:r>
+              <a:rPr lang="en-US" dirty="0"/>
+              <a:t>The way we are going that -&gt; more agile, code – then see.</a:t>
+            </a:r>
+          </a:p>
+          <a:p>
+            <a:r>
+              <a:rPr lang="en-US" dirty="0"/>
+              <a:t>Automated performance test for crucial operations (placing order).</a:t>
+            </a:r>
+          </a:p>
+          <a:p>
+            <a:r>
+              <a:rPr lang="en-US" dirty="0"/>
+              <a:t>Show the audience about possibilities – live performance, get some alarms, use Prometheus. Automatically scale based on Prom metrics.</a:t>
+            </a:r>
           </a:p>
         </p:txBody>
       </p:sp>
@@ -1733,9 +1868,9 @@
           <a:bodyPr/>
           <a:lstStyle/>
           <a:p>
-            <a:fld id="{75AB1D4B-EC1E-4B6F-9D95-2E71D0A1936C}" type="slidenum">
+            <a:fld id="{5C4893B0-BD2B-0F4A-85E1-401D62D67B75}" type="slidenum">
               <a:rPr lang="nb-NO" smtClean="0"/>
-              <a:t>36</a:t>
+              <a:t>32</a:t>
             </a:fld>
             <a:endParaRPr lang="nb-NO"/>
           </a:p>
@@ -1744,7 +1879,7 @@
     </p:spTree>
     <p:extLst>
       <p:ext uri="{BB962C8B-B14F-4D97-AF65-F5344CB8AC3E}">
-        <p14:creationId xmlns:p14="http://schemas.microsoft.com/office/powerpoint/2010/main" val="249106395"/>
+        <p14:creationId xmlns:p14="http://schemas.microsoft.com/office/powerpoint/2010/main" val="2900627759"/>
       </p:ext>
     </p:extLst>
   </p:cSld>
@@ -1798,7 +1933,7 @@
           <a:bodyPr/>
           <a:lstStyle/>
           <a:p>
-            <a:endParaRPr lang="en-US"/>
+            <a:endParaRPr lang="en-US" dirty="0"/>
           </a:p>
         </p:txBody>
       </p:sp>
@@ -1819,7 +1954,7 @@
           <a:p>
             <a:fld id="{75AB1D4B-EC1E-4B6F-9D95-2E71D0A1936C}" type="slidenum">
               <a:rPr lang="nb-NO" smtClean="0"/>
-              <a:t>37</a:t>
+              <a:t>33</a:t>
             </a:fld>
             <a:endParaRPr lang="nb-NO"/>
           </a:p>
@@ -1828,7 +1963,7 @@
     </p:spTree>
     <p:extLst>
       <p:ext uri="{BB962C8B-B14F-4D97-AF65-F5344CB8AC3E}">
-        <p14:creationId xmlns:p14="http://schemas.microsoft.com/office/powerpoint/2010/main" val="698424348"/>
+        <p14:creationId xmlns:p14="http://schemas.microsoft.com/office/powerpoint/2010/main" val="249106395"/>
       </p:ext>
     </p:extLst>
   </p:cSld>
@@ -1882,7 +2017,7 @@
           <a:bodyPr/>
           <a:lstStyle/>
           <a:p>
-            <a:endParaRPr lang="en-US" dirty="0"/>
+            <a:endParaRPr lang="en-US"/>
           </a:p>
         </p:txBody>
       </p:sp>
@@ -1901,9 +2036,93 @@
           <a:bodyPr/>
           <a:lstStyle/>
           <a:p>
+            <a:fld id="{75AB1D4B-EC1E-4B6F-9D95-2E71D0A1936C}" type="slidenum">
+              <a:rPr lang="nb-NO" smtClean="0"/>
+              <a:t>34</a:t>
+            </a:fld>
+            <a:endParaRPr lang="nb-NO"/>
+          </a:p>
+        </p:txBody>
+      </p:sp>
+    </p:spTree>
+    <p:extLst>
+      <p:ext uri="{BB962C8B-B14F-4D97-AF65-F5344CB8AC3E}">
+        <p14:creationId xmlns:p14="http://schemas.microsoft.com/office/powerpoint/2010/main" val="698424348"/>
+      </p:ext>
+    </p:extLst>
+  </p:cSld>
+  <p:clrMapOvr>
+    <a:masterClrMapping/>
+  </p:clrMapOvr>
+</p:notes>
+</file>
+
+<file path=ppt/notesSlides/notesSlide16.xml><?xml version="1.0" encoding="utf-8"?>
+<p:notes xmlns:a="http://schemas.openxmlformats.org/drawingml/2006/main" xmlns:r="http://schemas.openxmlformats.org/officeDocument/2006/relationships" xmlns:p="http://schemas.openxmlformats.org/presentationml/2006/main">
+  <p:cSld>
+    <p:spTree>
+      <p:nvGrpSpPr>
+        <p:cNvPr id="1" name=""/>
+        <p:cNvGrpSpPr/>
+        <p:nvPr/>
+      </p:nvGrpSpPr>
+      <p:grpSpPr>
+        <a:xfrm>
+          <a:off x="0" y="0"/>
+          <a:ext cx="0" cy="0"/>
+          <a:chOff x="0" y="0"/>
+          <a:chExt cx="0" cy="0"/>
+        </a:xfrm>
+      </p:grpSpPr>
+      <p:sp>
+        <p:nvSpPr>
+          <p:cNvPr id="2" name="Slide Image Placeholder 1"/>
+          <p:cNvSpPr>
+            <a:spLocks noGrp="1" noRot="1" noChangeAspect="1"/>
+          </p:cNvSpPr>
+          <p:nvPr>
+            <p:ph type="sldImg"/>
+          </p:nvPr>
+        </p:nvSpPr>
+        <p:spPr/>
+      </p:sp>
+      <p:sp>
+        <p:nvSpPr>
+          <p:cNvPr id="3" name="Notes Placeholder 2"/>
+          <p:cNvSpPr>
+            <a:spLocks noGrp="1"/>
+          </p:cNvSpPr>
+          <p:nvPr>
+            <p:ph type="body" idx="1"/>
+          </p:nvPr>
+        </p:nvSpPr>
+        <p:spPr/>
+        <p:txBody>
+          <a:bodyPr/>
+          <a:lstStyle/>
+          <a:p>
+            <a:endParaRPr lang="en-US" dirty="0"/>
+          </a:p>
+        </p:txBody>
+      </p:sp>
+      <p:sp>
+        <p:nvSpPr>
+          <p:cNvPr id="4" name="Slide Number Placeholder 3"/>
+          <p:cNvSpPr>
+            <a:spLocks noGrp="1"/>
+          </p:cNvSpPr>
+          <p:nvPr>
+            <p:ph type="sldNum" sz="quarter" idx="10"/>
+          </p:nvPr>
+        </p:nvSpPr>
+        <p:spPr/>
+        <p:txBody>
+          <a:bodyPr/>
+          <a:lstStyle/>
+          <a:p>
             <a:fld id="{5C4893B0-BD2B-0F4A-85E1-401D62D67B75}" type="slidenum">
               <a:rPr lang="nb-NO" smtClean="0"/>
-              <a:t>38</a:t>
+              <a:t>35</a:t>
             </a:fld>
             <a:endParaRPr lang="nb-NO"/>
           </a:p>
@@ -2137,7 +2356,19 @@
           <a:bodyPr/>
           <a:lstStyle/>
           <a:p>
-            <a:endParaRPr lang="nb-NO" dirty="0"/>
+            <a:r>
+              <a:rPr lang="en-US" sz="1200" b="0" i="0" kern="1200" dirty="0">
+                <a:solidFill>
+                  <a:schemeClr val="tx1"/>
+                </a:solidFill>
+                <a:effectLst/>
+                <a:latin typeface="+mn-lt"/>
+                <a:ea typeface="+mn-ea"/>
+                <a:cs typeface="+mn-cs"/>
+              </a:rPr>
+              <a:t>For higher security, place a network DMZ in front of the application. The DMZ includes network virtual appliances (NVAs) that implement security functionality such as firewalls and packet inspection.</a:t>
+            </a:r>
+            <a:endParaRPr lang="en-US" dirty="0"/>
           </a:p>
         </p:txBody>
       </p:sp>
@@ -2148,7 +2379,7 @@
             <a:spLocks noGrp="1"/>
           </p:cNvSpPr>
           <p:nvPr>
-            <p:ph type="sldNum" sz="quarter" idx="10"/>
+            <p:ph type="sldNum" sz="quarter" idx="5"/>
           </p:nvPr>
         </p:nvSpPr>
         <p:spPr/>
@@ -2158,7 +2389,7 @@
           <a:p>
             <a:fld id="{5C4893B0-BD2B-0F4A-85E1-401D62D67B75}" type="slidenum">
               <a:rPr lang="nb-NO" smtClean="0"/>
-              <a:t>15</a:t>
+              <a:t>8</a:t>
             </a:fld>
             <a:endParaRPr lang="nb-NO"/>
           </a:p>
@@ -2167,7 +2398,7 @@
     </p:spTree>
     <p:extLst>
       <p:ext uri="{BB962C8B-B14F-4D97-AF65-F5344CB8AC3E}">
-        <p14:creationId xmlns:p14="http://schemas.microsoft.com/office/powerpoint/2010/main" val="899240939"/>
+        <p14:creationId xmlns:p14="http://schemas.microsoft.com/office/powerpoint/2010/main" val="3550334785"/>
       </p:ext>
     </p:extLst>
   </p:cSld>
@@ -2222,8 +2453,8 @@
           <a:lstStyle/>
           <a:p>
             <a:r>
-              <a:rPr lang="en-US" dirty="0"/>
-              <a:t>Network congestion is the reduced quality of service that occurs when a network node or link is carrying more data than it can handle. Typical effects include packet loss or the blocking of new connections.</a:t>
+              <a:rPr lang="nb-NO" dirty="0"/>
+              <a:t>N-Tier -&gt; still the bottleneck is DB</a:t>
             </a:r>
           </a:p>
         </p:txBody>
@@ -2245,7 +2476,7 @@
           <a:p>
             <a:fld id="{5C4893B0-BD2B-0F4A-85E1-401D62D67B75}" type="slidenum">
               <a:rPr lang="nb-NO" smtClean="0"/>
-              <a:t>16</a:t>
+              <a:t>14</a:t>
             </a:fld>
             <a:endParaRPr lang="nb-NO"/>
           </a:p>
@@ -2254,7 +2485,7 @@
     </p:spTree>
     <p:extLst>
       <p:ext uri="{BB962C8B-B14F-4D97-AF65-F5344CB8AC3E}">
-        <p14:creationId xmlns:p14="http://schemas.microsoft.com/office/powerpoint/2010/main" val="1950394512"/>
+        <p14:creationId xmlns:p14="http://schemas.microsoft.com/office/powerpoint/2010/main" val="899240939"/>
       </p:ext>
     </p:extLst>
   </p:cSld>
@@ -2310,13 +2541,7 @@
           <a:p>
             <a:r>
               <a:rPr lang="en-US" dirty="0"/>
-              <a:t>Cluttering is not a really good word here</a:t>
-            </a:r>
-          </a:p>
-          <a:p>
-            <a:r>
-              <a:rPr lang="en-US" dirty="0"/>
-              <a:t>https://en.wikipedia.org/wiki/Polyglot_(computing)</a:t>
+              <a:t>Network congestion is the reduced quality of service that occurs when a network node or link is carrying more data than it can handle. Typical effects include packet loss or the blocking of new connections.</a:t>
             </a:r>
           </a:p>
         </p:txBody>
@@ -2338,7 +2563,7 @@
           <a:p>
             <a:fld id="{5C4893B0-BD2B-0F4A-85E1-401D62D67B75}" type="slidenum">
               <a:rPr lang="nb-NO" smtClean="0"/>
-              <a:t>17</a:t>
+              <a:t>15</a:t>
             </a:fld>
             <a:endParaRPr lang="nb-NO"/>
           </a:p>
@@ -2347,7 +2572,7 @@
     </p:spTree>
     <p:extLst>
       <p:ext uri="{BB962C8B-B14F-4D97-AF65-F5344CB8AC3E}">
-        <p14:creationId xmlns:p14="http://schemas.microsoft.com/office/powerpoint/2010/main" val="320088049"/>
+        <p14:creationId xmlns:p14="http://schemas.microsoft.com/office/powerpoint/2010/main" val="1950394512"/>
       </p:ext>
     </p:extLst>
   </p:cSld>
@@ -2402,22 +2627,15 @@
           <a:lstStyle/>
           <a:p>
             <a:r>
-              <a:rPr lang="en-US" noProof="0" dirty="0"/>
-              <a:t>…Docker the l</a:t>
-            </a:r>
-            <a:r>
-              <a:rPr lang="en-US" sz="1200" b="0" i="0" kern="1200" noProof="0" dirty="0">
-                <a:solidFill>
-                  <a:schemeClr val="tx1"/>
-                </a:solidFill>
-                <a:effectLst/>
-                <a:latin typeface="+mn-lt"/>
-                <a:ea typeface="+mn-ea"/>
-                <a:cs typeface="+mn-cs"/>
-              </a:rPr>
-              <a:t>eading software container solution on the market</a:t>
-            </a:r>
-            <a:endParaRPr lang="en-US" noProof="0" dirty="0"/>
+              <a:rPr lang="en-US" dirty="0"/>
+              <a:t>Cluttering is not a really good word here</a:t>
+            </a:r>
+          </a:p>
+          <a:p>
+            <a:r>
+              <a:rPr lang="en-US" dirty="0"/>
+              <a:t>https://en.wikipedia.org/wiki/Polyglot_(computing)</a:t>
+            </a:r>
           </a:p>
         </p:txBody>
       </p:sp>
@@ -2438,7 +2656,7 @@
           <a:p>
             <a:fld id="{5C4893B0-BD2B-0F4A-85E1-401D62D67B75}" type="slidenum">
               <a:rPr lang="nb-NO" smtClean="0"/>
-              <a:t>19</a:t>
+              <a:t>16</a:t>
             </a:fld>
             <a:endParaRPr lang="nb-NO"/>
           </a:p>
@@ -2447,7 +2665,7 @@
     </p:spTree>
     <p:extLst>
       <p:ext uri="{BB962C8B-B14F-4D97-AF65-F5344CB8AC3E}">
-        <p14:creationId xmlns:p14="http://schemas.microsoft.com/office/powerpoint/2010/main" val="2391845161"/>
+        <p14:creationId xmlns:p14="http://schemas.microsoft.com/office/powerpoint/2010/main" val="320088049"/>
       </p:ext>
     </p:extLst>
   </p:cSld>
@@ -2502,9 +2720,22 @@
           <a:lstStyle/>
           <a:p>
             <a:r>
-              <a:rPr lang="en-US" dirty="0"/>
-              <a:t>From this page and onwards -&gt; Pawel</a:t>
-            </a:r>
+              <a:rPr lang="en-US" noProof="0" dirty="0"/>
+              <a:t>…Docker the l</a:t>
+            </a:r>
+            <a:r>
+              <a:rPr lang="en-US" sz="1200" b="0" i="0" kern="1200" noProof="0" dirty="0">
+                <a:solidFill>
+                  <a:schemeClr val="tx1"/>
+                </a:solidFill>
+                <a:effectLst/>
+                <a:latin typeface="+mn-lt"/>
+                <a:ea typeface="+mn-ea"/>
+                <a:cs typeface="+mn-cs"/>
+              </a:rPr>
+              <a:t>eading software container solution on the market</a:t>
+            </a:r>
+            <a:endParaRPr lang="en-US" noProof="0" dirty="0"/>
           </a:p>
         </p:txBody>
       </p:sp>
@@ -2525,7 +2756,7 @@
           <a:p>
             <a:fld id="{5C4893B0-BD2B-0F4A-85E1-401D62D67B75}" type="slidenum">
               <a:rPr lang="nb-NO" smtClean="0"/>
-              <a:t>24</a:t>
+              <a:t>18</a:t>
             </a:fld>
             <a:endParaRPr lang="nb-NO"/>
           </a:p>
@@ -2534,7 +2765,7 @@
     </p:spTree>
     <p:extLst>
       <p:ext uri="{BB962C8B-B14F-4D97-AF65-F5344CB8AC3E}">
-        <p14:creationId xmlns:p14="http://schemas.microsoft.com/office/powerpoint/2010/main" val="3228097651"/>
+        <p14:creationId xmlns:p14="http://schemas.microsoft.com/office/powerpoint/2010/main" val="2391845161"/>
       </p:ext>
     </p:extLst>
   </p:cSld>
@@ -2589,147 +2820,9 @@
           <a:lstStyle/>
           <a:p>
             <a:r>
-              <a:rPr lang="en-US" sz="1200" b="0" i="0" kern="1200" dirty="0" err="1">
-                <a:solidFill>
-                  <a:schemeClr val="tx1"/>
-                </a:solidFill>
-                <a:effectLst/>
-                <a:latin typeface="+mn-lt"/>
-                <a:ea typeface="+mn-ea"/>
-                <a:cs typeface="+mn-cs"/>
-              </a:rPr>
-              <a:t>Ilustrations</a:t>
-            </a:r>
-            <a:r>
-              <a:rPr lang="en-US" sz="1200" b="0" i="0" kern="1200" dirty="0">
-                <a:solidFill>
-                  <a:schemeClr val="tx1"/>
-                </a:solidFill>
-                <a:effectLst/>
-                <a:latin typeface="+mn-lt"/>
-                <a:ea typeface="+mn-ea"/>
-                <a:cs typeface="+mn-cs"/>
-              </a:rPr>
-              <a:t> are good. We should quite easily described what is going on.</a:t>
-            </a:r>
-          </a:p>
-          <a:p>
-            <a:endParaRPr lang="en-US" sz="1200" b="0" i="0" kern="1200" dirty="0">
-              <a:solidFill>
-                <a:schemeClr val="tx1"/>
-              </a:solidFill>
-              <a:effectLst/>
-              <a:latin typeface="+mn-lt"/>
-              <a:ea typeface="+mn-ea"/>
-              <a:cs typeface="+mn-cs"/>
-            </a:endParaRPr>
-          </a:p>
-          <a:p>
-            <a:endParaRPr lang="en-US" sz="1200" b="0" i="0" kern="1200" dirty="0">
-              <a:solidFill>
-                <a:schemeClr val="tx1"/>
-              </a:solidFill>
-              <a:effectLst/>
-              <a:latin typeface="+mn-lt"/>
-              <a:ea typeface="+mn-ea"/>
-              <a:cs typeface="+mn-cs"/>
-            </a:endParaRPr>
-          </a:p>
-          <a:p>
-            <a:r>
-              <a:rPr lang="en-US" sz="1200" b="0" i="0" kern="1200" dirty="0">
-                <a:solidFill>
-                  <a:schemeClr val="tx1"/>
-                </a:solidFill>
-                <a:effectLst/>
-                <a:latin typeface="+mn-lt"/>
-                <a:ea typeface="+mn-ea"/>
-                <a:cs typeface="+mn-cs"/>
-              </a:rPr>
-              <a:t>Scaling out a Deployment will ensure new Pods are created and scheduled to Nodes with available resources. Scaling in will reduce the number of Pods to the new desired state. Kubernetes also supports </a:t>
-            </a:r>
-            <a:r>
-              <a:rPr lang="en-US" sz="1200" b="0" i="0" u="sng" kern="1200" dirty="0">
-                <a:solidFill>
-                  <a:schemeClr val="tx1"/>
-                </a:solidFill>
-                <a:effectLst/>
-                <a:latin typeface="+mn-lt"/>
-                <a:ea typeface="+mn-ea"/>
-                <a:cs typeface="+mn-cs"/>
-                <a:hlinkClick r:id="rId3"/>
-              </a:rPr>
-              <a:t>autoscaling </a:t>
-            </a:r>
-            <a:r>
-              <a:rPr lang="en-US" sz="1200" b="0" i="0" kern="1200" dirty="0">
-                <a:solidFill>
-                  <a:schemeClr val="tx1"/>
-                </a:solidFill>
-                <a:effectLst/>
-                <a:latin typeface="+mn-lt"/>
-                <a:ea typeface="+mn-ea"/>
-                <a:cs typeface="+mn-cs"/>
-              </a:rPr>
-              <a:t>of Pods, but it is outside of the scope of this tutorial. Scaling to zero is also possible, and it will terminate all Pods of the specified Deployment.</a:t>
-            </a:r>
-          </a:p>
-          <a:p>
-            <a:r>
-              <a:rPr lang="en-US" sz="1200" b="0" i="0" kern="1200" dirty="0">
-                <a:solidFill>
-                  <a:schemeClr val="tx1"/>
-                </a:solidFill>
-                <a:effectLst/>
-                <a:latin typeface="+mn-lt"/>
-                <a:ea typeface="+mn-ea"/>
-                <a:cs typeface="+mn-cs"/>
-              </a:rPr>
-              <a:t>Running multiple instances of an application will require a way to distribute the traffic to all of them. Services have an integrated load-balancer that will distribute network traffic to all Pods of an exposed Deployment. Services will monitor continuously the running Pods using endpoints, to ensure the traffic is sent only to available Pods.</a:t>
-            </a:r>
-          </a:p>
-          <a:p>
-            <a:r>
-              <a:rPr lang="en-US" sz="1200" b="0" i="1" kern="1200" dirty="0">
-                <a:solidFill>
-                  <a:schemeClr val="tx1"/>
-                </a:solidFill>
-                <a:effectLst/>
-                <a:latin typeface="+mn-lt"/>
-                <a:ea typeface="+mn-ea"/>
-                <a:cs typeface="+mn-cs"/>
-              </a:rPr>
-              <a:t>Scaling is accomplished by changing the number of replicas in a Deployment.</a:t>
-            </a:r>
-            <a:endParaRPr lang="en-US" sz="1200" b="0" i="0" kern="1200" dirty="0">
-              <a:solidFill>
-                <a:schemeClr val="tx1"/>
-              </a:solidFill>
-              <a:effectLst/>
-              <a:latin typeface="+mn-lt"/>
-              <a:ea typeface="+mn-ea"/>
-              <a:cs typeface="+mn-cs"/>
-            </a:endParaRPr>
-          </a:p>
-          <a:p>
-            <a:br>
               <a:rPr lang="en-US" dirty="0"/>
-            </a:br>
-            <a:r>
-              <a:rPr lang="en-US" sz="1200" b="0" i="0" kern="1200" dirty="0">
-                <a:solidFill>
-                  <a:schemeClr val="tx1"/>
-                </a:solidFill>
-                <a:effectLst/>
-                <a:latin typeface="+mn-lt"/>
-                <a:ea typeface="+mn-ea"/>
-                <a:cs typeface="+mn-cs"/>
-              </a:rPr>
-              <a:t>Once you have multiple instances of an Application running, you would be able to do Rolling updates without downtime. We'll cover that in the next module. Now, let's go to the online terminal and scale our application.</a:t>
-            </a:r>
-          </a:p>
-          <a:p>
-            <a:endParaRPr lang="en-US" dirty="0"/>
+              <a:t>From this page and onwards -&gt; Pawel</a:t>
+            </a:r>
           </a:p>
         </p:txBody>
       </p:sp>
@@ -2750,7 +2843,7 @@
           <a:p>
             <a:fld id="{5C4893B0-BD2B-0F4A-85E1-401D62D67B75}" type="slidenum">
               <a:rPr lang="nb-NO" smtClean="0"/>
-              <a:t>30</a:t>
+              <a:t>21</a:t>
             </a:fld>
             <a:endParaRPr lang="nb-NO"/>
           </a:p>
@@ -2759,7 +2852,7 @@
     </p:spTree>
     <p:extLst>
       <p:ext uri="{BB962C8B-B14F-4D97-AF65-F5344CB8AC3E}">
-        <p14:creationId xmlns:p14="http://schemas.microsoft.com/office/powerpoint/2010/main" val="2701792365"/>
+        <p14:creationId xmlns:p14="http://schemas.microsoft.com/office/powerpoint/2010/main" val="3228097651"/>
       </p:ext>
     </p:extLst>
   </p:cSld>
@@ -5610,157 +5703,6 @@
           <p:cNvPr id="2" name="Title 1">
             <a:extLst>
               <a:ext uri="{FF2B5EF4-FFF2-40B4-BE49-F238E27FC236}">
-                <a16:creationId xmlns:a16="http://schemas.microsoft.com/office/drawing/2014/main" id="{4DF08D31-43B7-47F3-B19E-DDFC1FF1F0C1}"/>
-              </a:ext>
-            </a:extLst>
-          </p:cNvPr>
-          <p:cNvSpPr>
-            <a:spLocks noGrp="1"/>
-          </p:cNvSpPr>
-          <p:nvPr>
-            <p:ph type="title"/>
-          </p:nvPr>
-        </p:nvSpPr>
-        <p:spPr/>
-        <p:txBody>
-          <a:bodyPr/>
-          <a:lstStyle/>
-          <a:p>
-            <a:r>
-              <a:rPr lang="nb-NO" dirty="0"/>
-              <a:t>Scaling N-TIER ARCHITECTURE?</a:t>
-            </a:r>
-            <a:endParaRPr lang="en-US" dirty="0"/>
-          </a:p>
-        </p:txBody>
-      </p:sp>
-      <p:sp>
-        <p:nvSpPr>
-          <p:cNvPr id="4" name="AutoShape 2" descr="enter image description here">
-            <a:extLst>
-              <a:ext uri="{FF2B5EF4-FFF2-40B4-BE49-F238E27FC236}">
-                <a16:creationId xmlns:a16="http://schemas.microsoft.com/office/drawing/2014/main" id="{D7BA6151-4FC3-4C0A-8BB4-F381A1E8A704}"/>
-              </a:ext>
-            </a:extLst>
-          </p:cNvPr>
-          <p:cNvSpPr>
-            <a:spLocks noChangeAspect="1" noChangeArrowheads="1"/>
-          </p:cNvSpPr>
-          <p:nvPr/>
-        </p:nvSpPr>
-        <p:spPr bwMode="auto">
-          <a:xfrm>
-            <a:off x="10009762" y="3033409"/>
-            <a:ext cx="304800" cy="304800"/>
-          </a:xfrm>
-          <a:prstGeom prst="rect">
-            <a:avLst/>
-          </a:prstGeom>
-          <a:noFill/>
-          <a:extLst>
-            <a:ext uri="{909E8E84-426E-40DD-AFC4-6F175D3DCCD1}">
-              <a14:hiddenFill xmlns:a14="http://schemas.microsoft.com/office/drawing/2010/main">
-                <a:solidFill>
-                  <a:srgbClr val="FFFFFF"/>
-                </a:solidFill>
-              </a14:hiddenFill>
-            </a:ext>
-          </a:extLst>
-        </p:spPr>
-        <p:txBody>
-          <a:bodyPr vert="horz" wrap="square" lIns="91440" tIns="45720" rIns="91440" bIns="45720" numCol="1" anchor="t" anchorCtr="0" compatLnSpc="1">
-            <a:prstTxWarp prst="textNoShape">
-              <a:avLst/>
-            </a:prstTxWarp>
-          </a:bodyPr>
-          <a:lstStyle/>
-          <a:p>
-            <a:endParaRPr lang="en-US"/>
-          </a:p>
-        </p:txBody>
-      </p:sp>
-      <p:pic>
-        <p:nvPicPr>
-          <p:cNvPr id="15364" name="Picture 4" descr="enter image description here">
-            <a:extLst>
-              <a:ext uri="{FF2B5EF4-FFF2-40B4-BE49-F238E27FC236}">
-                <a16:creationId xmlns:a16="http://schemas.microsoft.com/office/drawing/2014/main" id="{26968BD0-53EE-480A-AF1B-0BD250B9B3AE}"/>
-              </a:ext>
-            </a:extLst>
-          </p:cNvPr>
-          <p:cNvPicPr>
-            <a:picLocks noChangeAspect="1" noChangeArrowheads="1"/>
-          </p:cNvPicPr>
-          <p:nvPr/>
-        </p:nvPicPr>
-        <p:blipFill>
-          <a:blip r:embed="rId2">
-            <a:extLst>
-              <a:ext uri="{28A0092B-C50C-407E-A947-70E740481C1C}">
-                <a14:useLocalDpi xmlns:a14="http://schemas.microsoft.com/office/drawing/2010/main" val="0"/>
-              </a:ext>
-            </a:extLst>
-          </a:blip>
-          <a:srcRect/>
-          <a:stretch>
-            <a:fillRect/>
-          </a:stretch>
-        </p:blipFill>
-        <p:spPr bwMode="auto">
-          <a:xfrm>
-            <a:off x="2750728" y="1596751"/>
-            <a:ext cx="5657850" cy="3895725"/>
-          </a:xfrm>
-          <a:prstGeom prst="rect">
-            <a:avLst/>
-          </a:prstGeom>
-          <a:noFill/>
-          <a:extLst>
-            <a:ext uri="{909E8E84-426E-40DD-AFC4-6F175D3DCCD1}">
-              <a14:hiddenFill xmlns:a14="http://schemas.microsoft.com/office/drawing/2010/main">
-                <a:solidFill>
-                  <a:srgbClr val="FFFFFF"/>
-                </a:solidFill>
-              </a14:hiddenFill>
-            </a:ext>
-          </a:extLst>
-        </p:spPr>
-      </p:pic>
-    </p:spTree>
-    <p:extLst>
-      <p:ext uri="{BB962C8B-B14F-4D97-AF65-F5344CB8AC3E}">
-        <p14:creationId xmlns:p14="http://schemas.microsoft.com/office/powerpoint/2010/main" val="1020001730"/>
-      </p:ext>
-    </p:extLst>
-  </p:cSld>
-  <p:clrMapOvr>
-    <a:masterClrMapping/>
-  </p:clrMapOvr>
-</p:sld>
-</file>
-
-<file path=ppt/slides/slide11.xml><?xml version="1.0" encoding="utf-8"?>
-<p:sld xmlns:a="http://schemas.openxmlformats.org/drawingml/2006/main" xmlns:r="http://schemas.openxmlformats.org/officeDocument/2006/relationships" xmlns:p="http://schemas.openxmlformats.org/presentationml/2006/main">
-  <p:cSld>
-    <p:spTree>
-      <p:nvGrpSpPr>
-        <p:cNvPr id="1" name=""/>
-        <p:cNvGrpSpPr/>
-        <p:nvPr/>
-      </p:nvGrpSpPr>
-      <p:grpSpPr>
-        <a:xfrm>
-          <a:off x="0" y="0"/>
-          <a:ext cx="0" cy="0"/>
-          <a:chOff x="0" y="0"/>
-          <a:chExt cx="0" cy="0"/>
-        </a:xfrm>
-      </p:grpSpPr>
-      <p:sp>
-        <p:nvSpPr>
-          <p:cNvPr id="2" name="Title 1">
-            <a:extLst>
-              <a:ext uri="{FF2B5EF4-FFF2-40B4-BE49-F238E27FC236}">
                 <a16:creationId xmlns:a16="http://schemas.microsoft.com/office/drawing/2014/main" id="{049B0E80-F1CF-4B00-A8E6-7F5BE2F43970}"/>
               </a:ext>
             </a:extLst>
@@ -5854,7 +5796,7 @@
 </p:sld>
 </file>
 
-<file path=ppt/slides/slide12.xml><?xml version="1.0" encoding="utf-8"?>
+<file path=ppt/slides/slide11.xml><?xml version="1.0" encoding="utf-8"?>
 <p:sld xmlns:a="http://schemas.openxmlformats.org/drawingml/2006/main" xmlns:r="http://schemas.openxmlformats.org/officeDocument/2006/relationships" xmlns:p="http://schemas.openxmlformats.org/presentationml/2006/main">
   <p:cSld>
     <p:spTree>
@@ -5945,7 +5887,7 @@
 </p:sld>
 </file>
 
-<file path=ppt/slides/slide13.xml><?xml version="1.0" encoding="utf-8"?>
+<file path=ppt/slides/slide12.xml><?xml version="1.0" encoding="utf-8"?>
 <p:sld xmlns:a="http://schemas.openxmlformats.org/drawingml/2006/main" xmlns:r="http://schemas.openxmlformats.org/officeDocument/2006/relationships" xmlns:p="http://schemas.openxmlformats.org/presentationml/2006/main">
   <p:cSld>
     <p:spTree>
@@ -6248,7 +6190,7 @@
 </p:sld>
 </file>
 
-<file path=ppt/slides/slide14.xml><?xml version="1.0" encoding="utf-8"?>
+<file path=ppt/slides/slide13.xml><?xml version="1.0" encoding="utf-8"?>
 <p:sld xmlns:a="http://schemas.openxmlformats.org/drawingml/2006/main" xmlns:r="http://schemas.openxmlformats.org/officeDocument/2006/relationships" xmlns:p="http://schemas.openxmlformats.org/presentationml/2006/main">
   <p:cSld>
     <p:spTree>
@@ -6658,7 +6600,7 @@
 </p:sld>
 </file>
 
-<file path=ppt/slides/slide15.xml><?xml version="1.0" encoding="utf-8"?>
+<file path=ppt/slides/slide14.xml><?xml version="1.0" encoding="utf-8"?>
 <p:sld xmlns:a="http://schemas.openxmlformats.org/drawingml/2006/main" xmlns:r="http://schemas.openxmlformats.org/officeDocument/2006/relationships" xmlns:p="http://schemas.openxmlformats.org/presentationml/2006/main">
   <p:cSld>
     <p:spTree>
@@ -6768,7 +6710,7 @@
         <p:spPr>
           <a:xfrm>
             <a:off x="1727200" y="5689084"/>
-            <a:ext cx="1953676" cy="369332"/>
+            <a:ext cx="1956689" cy="369332"/>
           </a:xfrm>
           <a:prstGeom prst="rect">
             <a:avLst/>
@@ -6785,7 +6727,7 @@
           <a:p>
             <a:r>
               <a:rPr lang="en-US" dirty="0"/>
-              <a:t>N-Tire architecture</a:t>
+              <a:t>N-Tier architecture</a:t>
             </a:r>
           </a:p>
         </p:txBody>
@@ -6823,7 +6765,7 @@
             <a:pPr algn="ctr"/>
             <a:r>
               <a:rPr lang="en-US" dirty="0"/>
-              <a:t>Microservice</a:t>
+              <a:t>Microservices</a:t>
             </a:r>
           </a:p>
         </p:txBody>
@@ -6832,6 +6774,250 @@
     <p:extLst>
       <p:ext uri="{BB962C8B-B14F-4D97-AF65-F5344CB8AC3E}">
         <p14:creationId xmlns:p14="http://schemas.microsoft.com/office/powerpoint/2010/main" val="2523369828"/>
+      </p:ext>
+    </p:extLst>
+  </p:cSld>
+  <p:clrMapOvr>
+    <a:masterClrMapping/>
+  </p:clrMapOvr>
+</p:sld>
+</file>
+
+<file path=ppt/slides/slide15.xml><?xml version="1.0" encoding="utf-8"?>
+<p:sld xmlns:a="http://schemas.openxmlformats.org/drawingml/2006/main" xmlns:r="http://schemas.openxmlformats.org/officeDocument/2006/relationships" xmlns:p="http://schemas.openxmlformats.org/presentationml/2006/main">
+  <p:cSld>
+    <p:spTree>
+      <p:nvGrpSpPr>
+        <p:cNvPr id="1" name=""/>
+        <p:cNvGrpSpPr/>
+        <p:nvPr/>
+      </p:nvGrpSpPr>
+      <p:grpSpPr>
+        <a:xfrm>
+          <a:off x="0" y="0"/>
+          <a:ext cx="0" cy="0"/>
+          <a:chOff x="0" y="0"/>
+          <a:chExt cx="0" cy="0"/>
+        </a:xfrm>
+      </p:grpSpPr>
+      <p:sp>
+        <p:nvSpPr>
+          <p:cNvPr id="2" name="Title 1">
+            <a:extLst>
+              <a:ext uri="{FF2B5EF4-FFF2-40B4-BE49-F238E27FC236}">
+                <a16:creationId xmlns:a16="http://schemas.microsoft.com/office/drawing/2014/main" id="{4DF08D31-43B7-47F3-B19E-DDFC1FF1F0C1}"/>
+              </a:ext>
+            </a:extLst>
+          </p:cNvPr>
+          <p:cNvSpPr>
+            <a:spLocks noGrp="1"/>
+          </p:cNvSpPr>
+          <p:nvPr>
+            <p:ph type="title"/>
+          </p:nvPr>
+        </p:nvSpPr>
+        <p:spPr/>
+        <p:txBody>
+          <a:bodyPr>
+            <a:normAutofit/>
+          </a:bodyPr>
+          <a:lstStyle/>
+          <a:p>
+            <a:r>
+              <a:rPr lang="nb-NO" dirty="0"/>
+              <a:t>Problems with microservices?</a:t>
+            </a:r>
+            <a:endParaRPr lang="en-US" dirty="0"/>
+          </a:p>
+        </p:txBody>
+      </p:sp>
+      <p:sp>
+        <p:nvSpPr>
+          <p:cNvPr id="3" name="TextBox 2">
+            <a:extLst>
+              <a:ext uri="{FF2B5EF4-FFF2-40B4-BE49-F238E27FC236}">
+                <a16:creationId xmlns:a16="http://schemas.microsoft.com/office/drawing/2014/main" id="{9D82E6F8-6394-4852-A7AF-92AB7C8A33A3}"/>
+              </a:ext>
+            </a:extLst>
+          </p:cNvPr>
+          <p:cNvSpPr txBox="1"/>
+          <p:nvPr/>
+        </p:nvSpPr>
+        <p:spPr>
+          <a:xfrm>
+            <a:off x="482884" y="1214292"/>
+            <a:ext cx="11394041" cy="5016758"/>
+          </a:xfrm>
+          <a:prstGeom prst="rect">
+            <a:avLst/>
+          </a:prstGeom>
+          <a:noFill/>
+        </p:spPr>
+        <p:txBody>
+          <a:bodyPr wrap="square" rtlCol="0">
+            <a:spAutoFit/>
+          </a:bodyPr>
+          <a:lstStyle/>
+          <a:p>
+            <a:pPr marL="285750" indent="-285750">
+              <a:buFont typeface="Arial" panose="020B0604020202020204" pitchFamily="34" charset="0"/>
+              <a:buChar char="•"/>
+            </a:pPr>
+            <a:r>
+              <a:rPr lang="en-US" sz="4000" dirty="0">
+                <a:solidFill>
+                  <a:schemeClr val="bg1"/>
+                </a:solidFill>
+              </a:rPr>
+              <a:t>Complexity</a:t>
+            </a:r>
+          </a:p>
+          <a:p>
+            <a:pPr marL="285750" indent="-285750">
+              <a:buFont typeface="Arial" panose="020B0604020202020204" pitchFamily="34" charset="0"/>
+              <a:buChar char="•"/>
+            </a:pPr>
+            <a:r>
+              <a:rPr lang="en-US" sz="4000" dirty="0">
+                <a:solidFill>
+                  <a:schemeClr val="bg1"/>
+                </a:solidFill>
+              </a:rPr>
+              <a:t>Operational issues </a:t>
+            </a:r>
+            <a:r>
+              <a:rPr lang="en-US" sz="3200" dirty="0">
+                <a:solidFill>
+                  <a:schemeClr val="bg1"/>
+                </a:solidFill>
+              </a:rPr>
+              <a:t>(Monitoring, logging, …)</a:t>
+            </a:r>
+          </a:p>
+          <a:p>
+            <a:pPr marL="285750" indent="-285750">
+              <a:buFont typeface="Arial" panose="020B0604020202020204" pitchFamily="34" charset="0"/>
+              <a:buChar char="•"/>
+            </a:pPr>
+            <a:r>
+              <a:rPr lang="en-US" sz="4000" dirty="0">
+                <a:solidFill>
+                  <a:schemeClr val="bg1"/>
+                </a:solidFill>
+              </a:rPr>
+              <a:t>Maintainability issues </a:t>
+            </a:r>
+            <a:r>
+              <a:rPr lang="en-US" sz="3200" dirty="0">
+                <a:solidFill>
+                  <a:schemeClr val="bg1"/>
+                </a:solidFill>
+              </a:rPr>
+              <a:t>(cause of defect, …)</a:t>
+            </a:r>
+            <a:endParaRPr lang="en-US" sz="4000" dirty="0">
+              <a:solidFill>
+                <a:schemeClr val="bg1"/>
+              </a:solidFill>
+            </a:endParaRPr>
+          </a:p>
+          <a:p>
+            <a:pPr marL="285750" indent="-285750">
+              <a:buFont typeface="Arial" panose="020B0604020202020204" pitchFamily="34" charset="0"/>
+              <a:buChar char="•"/>
+            </a:pPr>
+            <a:r>
+              <a:rPr lang="en-US" sz="4000" dirty="0">
+                <a:solidFill>
+                  <a:schemeClr val="bg1"/>
+                </a:solidFill>
+              </a:rPr>
+              <a:t>Harder development and testing </a:t>
+            </a:r>
+            <a:r>
+              <a:rPr lang="en-US" sz="3200" dirty="0">
+                <a:solidFill>
+                  <a:schemeClr val="bg1"/>
+                </a:solidFill>
+              </a:rPr>
+              <a:t>(More components, …)</a:t>
+            </a:r>
+            <a:endParaRPr lang="en-US" sz="4000" dirty="0">
+              <a:solidFill>
+                <a:schemeClr val="bg1"/>
+              </a:solidFill>
+            </a:endParaRPr>
+          </a:p>
+          <a:p>
+            <a:pPr marL="285750" indent="-285750">
+              <a:buFont typeface="Arial" panose="020B0604020202020204" pitchFamily="34" charset="0"/>
+              <a:buChar char="•"/>
+            </a:pPr>
+            <a:r>
+              <a:rPr lang="en-US" sz="4000" dirty="0">
+                <a:solidFill>
+                  <a:schemeClr val="bg1"/>
+                </a:solidFill>
+              </a:rPr>
+              <a:t>Network congestion </a:t>
+            </a:r>
+            <a:r>
+              <a:rPr lang="en-US" sz="3200" dirty="0">
+                <a:solidFill>
+                  <a:schemeClr val="bg1"/>
+                </a:solidFill>
+              </a:rPr>
+              <a:t>(More communication)</a:t>
+            </a:r>
+          </a:p>
+          <a:p>
+            <a:pPr marL="285750" indent="-285750">
+              <a:buFont typeface="Arial" panose="020B0604020202020204" pitchFamily="34" charset="0"/>
+              <a:buChar char="•"/>
+            </a:pPr>
+            <a:r>
+              <a:rPr lang="en-US" sz="4000" dirty="0">
+                <a:solidFill>
+                  <a:schemeClr val="bg1"/>
+                </a:solidFill>
+              </a:rPr>
+              <a:t>Environment cluttering </a:t>
+            </a:r>
+          </a:p>
+          <a:p>
+            <a:pPr marL="285750" indent="-285750">
+              <a:buFont typeface="Arial" panose="020B0604020202020204" pitchFamily="34" charset="0"/>
+              <a:buChar char="•"/>
+            </a:pPr>
+            <a:r>
+              <a:rPr lang="en-US" sz="4000" dirty="0">
+                <a:solidFill>
+                  <a:schemeClr val="bg1"/>
+                </a:solidFill>
+              </a:rPr>
+              <a:t>Versioning</a:t>
+            </a:r>
+          </a:p>
+          <a:p>
+            <a:pPr marL="285750" indent="-285750">
+              <a:buFont typeface="Arial" panose="020B0604020202020204" pitchFamily="34" charset="0"/>
+              <a:buChar char="•"/>
+            </a:pPr>
+            <a:r>
+              <a:rPr lang="en-US" sz="4000" dirty="0">
+                <a:solidFill>
+                  <a:schemeClr val="bg1"/>
+                </a:solidFill>
+              </a:rPr>
+              <a:t>… </a:t>
+            </a:r>
+          </a:p>
+        </p:txBody>
+      </p:sp>
+    </p:spTree>
+    <p:extLst>
+      <p:ext uri="{BB962C8B-B14F-4D97-AF65-F5344CB8AC3E}">
+        <p14:creationId xmlns:p14="http://schemas.microsoft.com/office/powerpoint/2010/main" val="1647958218"/>
       </p:ext>
     </p:extLst>
   </p:cSld>
@@ -6903,8 +7089,8 @@
         </p:nvSpPr>
         <p:spPr>
           <a:xfrm>
-            <a:off x="482884" y="1214292"/>
-            <a:ext cx="11394041" cy="5016758"/>
+            <a:off x="244573" y="742951"/>
+            <a:ext cx="11369162" cy="6124754"/>
           </a:xfrm>
           <a:prstGeom prst="rect">
             <a:avLst/>
@@ -6922,152 +7108,181 @@
               <a:buChar char="•"/>
             </a:pPr>
             <a:r>
-              <a:rPr lang="en-US" sz="4000" dirty="0">
-                <a:solidFill>
-                  <a:schemeClr val="bg1"/>
-                </a:solidFill>
-              </a:rPr>
-              <a:t>Complexity</a:t>
-            </a:r>
-          </a:p>
-          <a:p>
-            <a:pPr marL="285750" indent="-285750">
+              <a:rPr lang="en-US" sz="3200" dirty="0">
+                <a:solidFill>
+                  <a:schemeClr val="bg1"/>
+                </a:solidFill>
+              </a:rPr>
+              <a:t>Environment cluttering?</a:t>
+            </a:r>
+          </a:p>
+          <a:p>
+            <a:pPr marL="742950" lvl="1" indent="-285750">
               <a:buFont typeface="Arial" panose="020B0604020202020204" pitchFamily="34" charset="0"/>
               <a:buChar char="•"/>
             </a:pPr>
             <a:r>
-              <a:rPr lang="en-US" sz="4000" dirty="0">
-                <a:solidFill>
-                  <a:schemeClr val="bg1"/>
-                </a:solidFill>
-              </a:rPr>
-              <a:t>Operational issues </a:t>
-            </a:r>
-            <a:r>
-              <a:rPr lang="en-US" sz="3200" dirty="0">
-                <a:solidFill>
-                  <a:schemeClr val="bg1"/>
-                </a:solidFill>
-              </a:rPr>
-              <a:t>(Monitoring, logging, …)</a:t>
-            </a:r>
-          </a:p>
-          <a:p>
-            <a:pPr marL="285750" indent="-285750">
+              <a:rPr lang="en-US" sz="2800" dirty="0">
+                <a:solidFill>
+                  <a:schemeClr val="bg1"/>
+                </a:solidFill>
+              </a:rPr>
+              <a:t>Do I need Node.js v8.11.0 or is v6.12.1 good enough?</a:t>
+            </a:r>
+          </a:p>
+          <a:p>
+            <a:pPr marL="742950" lvl="1" indent="-285750">
               <a:buFont typeface="Arial" panose="020B0604020202020204" pitchFamily="34" charset="0"/>
               <a:buChar char="•"/>
             </a:pPr>
-            <a:r>
-              <a:rPr lang="en-US" sz="4000" dirty="0">
-                <a:solidFill>
-                  <a:schemeClr val="bg1"/>
-                </a:solidFill>
-              </a:rPr>
-              <a:t>Maintainability issues </a:t>
-            </a:r>
-            <a:r>
-              <a:rPr lang="en-US" sz="3200" dirty="0">
-                <a:solidFill>
-                  <a:schemeClr val="bg1"/>
-                </a:solidFill>
-              </a:rPr>
-              <a:t>(cause of defect, …)</a:t>
-            </a:r>
-            <a:endParaRPr lang="en-US" sz="4000" dirty="0">
+            <a:endParaRPr lang="en-US" sz="2800" dirty="0">
               <a:solidFill>
                 <a:schemeClr val="bg1"/>
               </a:solidFill>
             </a:endParaRPr>
           </a:p>
           <a:p>
-            <a:pPr marL="285750" indent="-285750">
+            <a:pPr marL="742950" lvl="1" indent="-285750">
               <a:buFont typeface="Arial" panose="020B0604020202020204" pitchFamily="34" charset="0"/>
               <a:buChar char="•"/>
             </a:pPr>
             <a:r>
-              <a:rPr lang="en-US" sz="4000" dirty="0">
-                <a:solidFill>
-                  <a:schemeClr val="bg1"/>
-                </a:solidFill>
-              </a:rPr>
-              <a:t>Harder development and testing </a:t>
-            </a:r>
-            <a:r>
-              <a:rPr lang="en-US" sz="3200" dirty="0">
-                <a:solidFill>
-                  <a:schemeClr val="bg1"/>
-                </a:solidFill>
-              </a:rPr>
-              <a:t>(More components, …)</a:t>
-            </a:r>
-            <a:endParaRPr lang="en-US" sz="4000" dirty="0">
+              <a:rPr lang="en-US" sz="2800" dirty="0">
+                <a:solidFill>
+                  <a:schemeClr val="bg1"/>
+                </a:solidFill>
+              </a:rPr>
+              <a:t>Does “</a:t>
+            </a:r>
+            <a:r>
+              <a:rPr lang="en-US" sz="2800" dirty="0" err="1">
+                <a:solidFill>
+                  <a:schemeClr val="bg1"/>
+                </a:solidFill>
+              </a:rPr>
+              <a:t>ServiceA</a:t>
+            </a:r>
+            <a:r>
+              <a:rPr lang="en-US" sz="2800" dirty="0">
+                <a:solidFill>
+                  <a:schemeClr val="bg1"/>
+                </a:solidFill>
+              </a:rPr>
+              <a:t>” use Python3 or Python2, because “</a:t>
+            </a:r>
+            <a:r>
+              <a:rPr lang="en-US" sz="2800" dirty="0" err="1">
+                <a:solidFill>
+                  <a:schemeClr val="bg1"/>
+                </a:solidFill>
+              </a:rPr>
+              <a:t>ServiceX</a:t>
+            </a:r>
+            <a:r>
+              <a:rPr lang="en-US" sz="2800" dirty="0">
+                <a:solidFill>
+                  <a:schemeClr val="bg1"/>
+                </a:solidFill>
+              </a:rPr>
+              <a:t>” is only working with Python3? Do I need both on the same VM?</a:t>
+            </a:r>
+          </a:p>
+          <a:p>
+            <a:pPr marL="742950" lvl="1" indent="-285750">
+              <a:buFont typeface="Arial" panose="020B0604020202020204" pitchFamily="34" charset="0"/>
+              <a:buChar char="•"/>
+            </a:pPr>
+            <a:endParaRPr lang="en-US" sz="2800" dirty="0">
               <a:solidFill>
                 <a:schemeClr val="bg1"/>
               </a:solidFill>
             </a:endParaRPr>
           </a:p>
           <a:p>
-            <a:pPr marL="285750" indent="-285750">
+            <a:pPr marL="742950" lvl="1" indent="-285750">
               <a:buFont typeface="Arial" panose="020B0604020202020204" pitchFamily="34" charset="0"/>
               <a:buChar char="•"/>
             </a:pPr>
             <a:r>
-              <a:rPr lang="en-US" sz="4000" dirty="0">
-                <a:solidFill>
-                  <a:schemeClr val="bg1"/>
-                </a:solidFill>
-              </a:rPr>
-              <a:t>Network congestion </a:t>
-            </a:r>
-            <a:r>
-              <a:rPr lang="en-US" sz="3200" dirty="0">
-                <a:solidFill>
-                  <a:schemeClr val="bg1"/>
-                </a:solidFill>
-              </a:rPr>
-              <a:t>(More communication)</a:t>
-            </a:r>
-          </a:p>
-          <a:p>
-            <a:pPr marL="285750" indent="-285750">
+              <a:rPr lang="en-US" sz="2800" dirty="0">
+                <a:solidFill>
+                  <a:schemeClr val="bg1"/>
+                </a:solidFill>
+              </a:rPr>
+              <a:t>“</a:t>
+            </a:r>
+            <a:r>
+              <a:rPr lang="en-US" sz="2800" dirty="0" err="1">
+                <a:solidFill>
+                  <a:schemeClr val="bg1"/>
+                </a:solidFill>
+              </a:rPr>
+              <a:t>ServiceXYZ</a:t>
+            </a:r>
+            <a:r>
+              <a:rPr lang="en-US" sz="2800" dirty="0">
+                <a:solidFill>
+                  <a:schemeClr val="bg1"/>
+                </a:solidFill>
+              </a:rPr>
+              <a:t>” was only tested on Ubuntu 14.04 with .NET Core 1.0.11 but a new service “BCX12” was developed on Ubuntu 18.04 with .NET Core 2.1.200. Can we have them both on a shared VM? We already have </a:t>
+            </a:r>
+            <a:r>
+              <a:rPr lang="en-US" sz="2800" dirty="0" err="1">
+                <a:solidFill>
+                  <a:schemeClr val="bg1"/>
+                </a:solidFill>
+              </a:rPr>
+              <a:t>soooo</a:t>
+            </a:r>
+            <a:r>
+              <a:rPr lang="en-US" sz="2800" dirty="0">
+                <a:solidFill>
+                  <a:schemeClr val="bg1"/>
+                </a:solidFill>
+              </a:rPr>
+              <a:t> many VMs…</a:t>
+            </a:r>
+          </a:p>
+          <a:p>
+            <a:pPr marL="742950" lvl="1" indent="-285750">
               <a:buFont typeface="Arial" panose="020B0604020202020204" pitchFamily="34" charset="0"/>
               <a:buChar char="•"/>
             </a:pPr>
-            <a:r>
-              <a:rPr lang="en-US" sz="4000" dirty="0">
-                <a:solidFill>
-                  <a:schemeClr val="bg1"/>
-                </a:solidFill>
-              </a:rPr>
-              <a:t>Environment cluttering </a:t>
-            </a:r>
-          </a:p>
-          <a:p>
-            <a:pPr marL="285750" indent="-285750">
+            <a:endParaRPr lang="en-US" sz="3200" dirty="0">
+              <a:solidFill>
+                <a:schemeClr val="bg1"/>
+              </a:solidFill>
+            </a:endParaRPr>
+          </a:p>
+          <a:p>
+            <a:pPr marL="742950" lvl="1" indent="-285750">
               <a:buFont typeface="Arial" panose="020B0604020202020204" pitchFamily="34" charset="0"/>
               <a:buChar char="•"/>
             </a:pPr>
             <a:r>
-              <a:rPr lang="en-US" sz="4000" dirty="0">
-                <a:solidFill>
-                  <a:schemeClr val="bg1"/>
-                </a:solidFill>
-              </a:rPr>
-              <a:t>Versioning</a:t>
-            </a:r>
-          </a:p>
-          <a:p>
-            <a:pPr marL="285750" indent="-285750">
-              <a:buFont typeface="Arial" panose="020B0604020202020204" pitchFamily="34" charset="0"/>
-              <a:buChar char="•"/>
-            </a:pPr>
-            <a:r>
-              <a:rPr lang="en-US" sz="4000" dirty="0">
-                <a:solidFill>
-                  <a:schemeClr val="bg1"/>
-                </a:solidFill>
-              </a:rPr>
-              <a:t>… </a:t>
+              <a:rPr lang="en-US" sz="3200" dirty="0">
+                <a:solidFill>
+                  <a:schemeClr val="bg1"/>
+                </a:solidFill>
+              </a:rPr>
+              <a:t>Why isn’t it working on “that machine”? Is incorrect </a:t>
+            </a:r>
+            <a:r>
+              <a:rPr lang="en-US" sz="3200" dirty="0" err="1">
+                <a:solidFill>
+                  <a:schemeClr val="bg1"/>
+                </a:solidFill>
+              </a:rPr>
+              <a:t>npm</a:t>
+            </a:r>
+            <a:r>
+              <a:rPr lang="en-US" sz="3200" dirty="0">
+                <a:solidFill>
+                  <a:schemeClr val="bg1"/>
+                </a:solidFill>
+              </a:rPr>
+              <a:t> version to blame?</a:t>
             </a:r>
           </a:p>
         </p:txBody>
@@ -7075,7 +7290,7 @@
     </p:spTree>
     <p:extLst>
       <p:ext uri="{BB962C8B-B14F-4D97-AF65-F5344CB8AC3E}">
-        <p14:creationId xmlns:p14="http://schemas.microsoft.com/office/powerpoint/2010/main" val="1647958218"/>
+        <p14:creationId xmlns:p14="http://schemas.microsoft.com/office/powerpoint/2010/main" val="3327242490"/>
       </p:ext>
     </p:extLst>
   </p:cSld>
@@ -7107,279 +7322,6 @@
           <p:cNvPr id="2" name="Title 1">
             <a:extLst>
               <a:ext uri="{FF2B5EF4-FFF2-40B4-BE49-F238E27FC236}">
-                <a16:creationId xmlns:a16="http://schemas.microsoft.com/office/drawing/2014/main" id="{4DF08D31-43B7-47F3-B19E-DDFC1FF1F0C1}"/>
-              </a:ext>
-            </a:extLst>
-          </p:cNvPr>
-          <p:cNvSpPr>
-            <a:spLocks noGrp="1"/>
-          </p:cNvSpPr>
-          <p:nvPr>
-            <p:ph type="title"/>
-          </p:nvPr>
-        </p:nvSpPr>
-        <p:spPr/>
-        <p:txBody>
-          <a:bodyPr>
-            <a:normAutofit/>
-          </a:bodyPr>
-          <a:lstStyle/>
-          <a:p>
-            <a:r>
-              <a:rPr lang="nb-NO" dirty="0"/>
-              <a:t>Problems with microservices?</a:t>
-            </a:r>
-            <a:endParaRPr lang="en-US" dirty="0"/>
-          </a:p>
-        </p:txBody>
-      </p:sp>
-      <p:sp>
-        <p:nvSpPr>
-          <p:cNvPr id="3" name="TextBox 2">
-            <a:extLst>
-              <a:ext uri="{FF2B5EF4-FFF2-40B4-BE49-F238E27FC236}">
-                <a16:creationId xmlns:a16="http://schemas.microsoft.com/office/drawing/2014/main" id="{9D82E6F8-6394-4852-A7AF-92AB7C8A33A3}"/>
-              </a:ext>
-            </a:extLst>
-          </p:cNvPr>
-          <p:cNvSpPr txBox="1"/>
-          <p:nvPr/>
-        </p:nvSpPr>
-        <p:spPr>
-          <a:xfrm>
-            <a:off x="244573" y="742951"/>
-            <a:ext cx="11369162" cy="6124754"/>
-          </a:xfrm>
-          <a:prstGeom prst="rect">
-            <a:avLst/>
-          </a:prstGeom>
-          <a:noFill/>
-        </p:spPr>
-        <p:txBody>
-          <a:bodyPr wrap="square" rtlCol="0">
-            <a:spAutoFit/>
-          </a:bodyPr>
-          <a:lstStyle/>
-          <a:p>
-            <a:pPr marL="285750" indent="-285750">
-              <a:buFont typeface="Arial" panose="020B0604020202020204" pitchFamily="34" charset="0"/>
-              <a:buChar char="•"/>
-            </a:pPr>
-            <a:r>
-              <a:rPr lang="en-US" sz="3200" dirty="0">
-                <a:solidFill>
-                  <a:schemeClr val="bg1"/>
-                </a:solidFill>
-              </a:rPr>
-              <a:t>Environment cluttering?</a:t>
-            </a:r>
-          </a:p>
-          <a:p>
-            <a:pPr marL="742950" lvl="1" indent="-285750">
-              <a:buFont typeface="Arial" panose="020B0604020202020204" pitchFamily="34" charset="0"/>
-              <a:buChar char="•"/>
-            </a:pPr>
-            <a:r>
-              <a:rPr lang="en-US" sz="2800" dirty="0">
-                <a:solidFill>
-                  <a:schemeClr val="bg1"/>
-                </a:solidFill>
-              </a:rPr>
-              <a:t>Do I need Node.js v8.11.0 or is v6.12.1 good enough?</a:t>
-            </a:r>
-          </a:p>
-          <a:p>
-            <a:pPr marL="742950" lvl="1" indent="-285750">
-              <a:buFont typeface="Arial" panose="020B0604020202020204" pitchFamily="34" charset="0"/>
-              <a:buChar char="•"/>
-            </a:pPr>
-            <a:endParaRPr lang="en-US" sz="2800" dirty="0">
-              <a:solidFill>
-                <a:schemeClr val="bg1"/>
-              </a:solidFill>
-            </a:endParaRPr>
-          </a:p>
-          <a:p>
-            <a:pPr marL="742950" lvl="1" indent="-285750">
-              <a:buFont typeface="Arial" panose="020B0604020202020204" pitchFamily="34" charset="0"/>
-              <a:buChar char="•"/>
-            </a:pPr>
-            <a:r>
-              <a:rPr lang="en-US" sz="2800" dirty="0">
-                <a:solidFill>
-                  <a:schemeClr val="bg1"/>
-                </a:solidFill>
-              </a:rPr>
-              <a:t>Does “</a:t>
-            </a:r>
-            <a:r>
-              <a:rPr lang="en-US" sz="2800" dirty="0" err="1">
-                <a:solidFill>
-                  <a:schemeClr val="bg1"/>
-                </a:solidFill>
-              </a:rPr>
-              <a:t>ServiceA</a:t>
-            </a:r>
-            <a:r>
-              <a:rPr lang="en-US" sz="2800" dirty="0">
-                <a:solidFill>
-                  <a:schemeClr val="bg1"/>
-                </a:solidFill>
-              </a:rPr>
-              <a:t>” use Python3 or Python2, because “</a:t>
-            </a:r>
-            <a:r>
-              <a:rPr lang="en-US" sz="2800" dirty="0" err="1">
-                <a:solidFill>
-                  <a:schemeClr val="bg1"/>
-                </a:solidFill>
-              </a:rPr>
-              <a:t>ServiceX</a:t>
-            </a:r>
-            <a:r>
-              <a:rPr lang="en-US" sz="2800" dirty="0">
-                <a:solidFill>
-                  <a:schemeClr val="bg1"/>
-                </a:solidFill>
-              </a:rPr>
-              <a:t>” is only working with Python3? Do I need both on the same VM?</a:t>
-            </a:r>
-          </a:p>
-          <a:p>
-            <a:pPr marL="742950" lvl="1" indent="-285750">
-              <a:buFont typeface="Arial" panose="020B0604020202020204" pitchFamily="34" charset="0"/>
-              <a:buChar char="•"/>
-            </a:pPr>
-            <a:endParaRPr lang="en-US" sz="2800" dirty="0">
-              <a:solidFill>
-                <a:schemeClr val="bg1"/>
-              </a:solidFill>
-            </a:endParaRPr>
-          </a:p>
-          <a:p>
-            <a:pPr marL="742950" lvl="1" indent="-285750">
-              <a:buFont typeface="Arial" panose="020B0604020202020204" pitchFamily="34" charset="0"/>
-              <a:buChar char="•"/>
-            </a:pPr>
-            <a:r>
-              <a:rPr lang="en-US" sz="2800" dirty="0">
-                <a:solidFill>
-                  <a:schemeClr val="bg1"/>
-                </a:solidFill>
-              </a:rPr>
-              <a:t>“</a:t>
-            </a:r>
-            <a:r>
-              <a:rPr lang="en-US" sz="2800" dirty="0" err="1">
-                <a:solidFill>
-                  <a:schemeClr val="bg1"/>
-                </a:solidFill>
-              </a:rPr>
-              <a:t>ServiceXYZ</a:t>
-            </a:r>
-            <a:r>
-              <a:rPr lang="en-US" sz="2800" dirty="0">
-                <a:solidFill>
-                  <a:schemeClr val="bg1"/>
-                </a:solidFill>
-              </a:rPr>
-              <a:t>” was only tested on Ubuntu 14.04 with .NET Core 1.0.11 but a new service “BCX12” was developed on Ubuntu 18.04 with .NET Core 2.1.200. Can we have them both on a shared VM? We already have </a:t>
-            </a:r>
-            <a:r>
-              <a:rPr lang="en-US" sz="2800" dirty="0" err="1">
-                <a:solidFill>
-                  <a:schemeClr val="bg1"/>
-                </a:solidFill>
-              </a:rPr>
-              <a:t>soooo</a:t>
-            </a:r>
-            <a:r>
-              <a:rPr lang="en-US" sz="2800" dirty="0">
-                <a:solidFill>
-                  <a:schemeClr val="bg1"/>
-                </a:solidFill>
-              </a:rPr>
-              <a:t> many VMs…</a:t>
-            </a:r>
-          </a:p>
-          <a:p>
-            <a:pPr marL="742950" lvl="1" indent="-285750">
-              <a:buFont typeface="Arial" panose="020B0604020202020204" pitchFamily="34" charset="0"/>
-              <a:buChar char="•"/>
-            </a:pPr>
-            <a:endParaRPr lang="en-US" sz="3200" dirty="0">
-              <a:solidFill>
-                <a:schemeClr val="bg1"/>
-              </a:solidFill>
-            </a:endParaRPr>
-          </a:p>
-          <a:p>
-            <a:pPr marL="742950" lvl="1" indent="-285750">
-              <a:buFont typeface="Arial" panose="020B0604020202020204" pitchFamily="34" charset="0"/>
-              <a:buChar char="•"/>
-            </a:pPr>
-            <a:r>
-              <a:rPr lang="en-US" sz="3200" dirty="0">
-                <a:solidFill>
-                  <a:schemeClr val="bg1"/>
-                </a:solidFill>
-              </a:rPr>
-              <a:t>Why isn’t it working on “that machine”? Is incorrect </a:t>
-            </a:r>
-            <a:r>
-              <a:rPr lang="en-US" sz="3200" dirty="0" err="1">
-                <a:solidFill>
-                  <a:schemeClr val="bg1"/>
-                </a:solidFill>
-              </a:rPr>
-              <a:t>npm</a:t>
-            </a:r>
-            <a:r>
-              <a:rPr lang="en-US" sz="3200" dirty="0">
-                <a:solidFill>
-                  <a:schemeClr val="bg1"/>
-                </a:solidFill>
-              </a:rPr>
-              <a:t> version to blame?</a:t>
-            </a:r>
-          </a:p>
-        </p:txBody>
-      </p:sp>
-    </p:spTree>
-    <p:extLst>
-      <p:ext uri="{BB962C8B-B14F-4D97-AF65-F5344CB8AC3E}">
-        <p14:creationId xmlns:p14="http://schemas.microsoft.com/office/powerpoint/2010/main" val="3327242490"/>
-      </p:ext>
-    </p:extLst>
-  </p:cSld>
-  <p:clrMapOvr>
-    <a:masterClrMapping/>
-  </p:clrMapOvr>
-</p:sld>
-</file>
-
-<file path=ppt/slides/slide18.xml><?xml version="1.0" encoding="utf-8"?>
-<p:sld xmlns:a="http://schemas.openxmlformats.org/drawingml/2006/main" xmlns:r="http://schemas.openxmlformats.org/officeDocument/2006/relationships" xmlns:p="http://schemas.openxmlformats.org/presentationml/2006/main">
-  <p:cSld>
-    <p:spTree>
-      <p:nvGrpSpPr>
-        <p:cNvPr id="1" name=""/>
-        <p:cNvGrpSpPr/>
-        <p:nvPr/>
-      </p:nvGrpSpPr>
-      <p:grpSpPr>
-        <a:xfrm>
-          <a:off x="0" y="0"/>
-          <a:ext cx="0" cy="0"/>
-          <a:chOff x="0" y="0"/>
-          <a:chExt cx="0" cy="0"/>
-        </a:xfrm>
-      </p:grpSpPr>
-      <p:sp>
-        <p:nvSpPr>
-          <p:cNvPr id="2" name="Title 1">
-            <a:extLst>
-              <a:ext uri="{FF2B5EF4-FFF2-40B4-BE49-F238E27FC236}">
                 <a16:creationId xmlns:a16="http://schemas.microsoft.com/office/drawing/2014/main" id="{049B0E80-F1CF-4B00-A8E6-7F5BE2F43970}"/>
               </a:ext>
             </a:extLst>
@@ -7433,7 +7375,7 @@
 </p:sld>
 </file>
 
-<file path=ppt/slides/slide19.xml><?xml version="1.0" encoding="utf-8"?>
+<file path=ppt/slides/slide18.xml><?xml version="1.0" encoding="utf-8"?>
 <p:sld xmlns:a="http://schemas.openxmlformats.org/drawingml/2006/main" xmlns:r="http://schemas.openxmlformats.org/officeDocument/2006/relationships" xmlns:p="http://schemas.openxmlformats.org/presentationml/2006/main">
   <p:cSld>
     <p:spTree>
@@ -7566,6 +7508,192 @@
     <p:extLst>
       <p:ext uri="{BB962C8B-B14F-4D97-AF65-F5344CB8AC3E}">
         <p14:creationId xmlns:p14="http://schemas.microsoft.com/office/powerpoint/2010/main" val="1458664343"/>
+      </p:ext>
+    </p:extLst>
+  </p:cSld>
+  <p:clrMapOvr>
+    <a:masterClrMapping/>
+  </p:clrMapOvr>
+</p:sld>
+</file>
+
+<file path=ppt/slides/slide19.xml><?xml version="1.0" encoding="utf-8"?>
+<p:sld xmlns:a="http://schemas.openxmlformats.org/drawingml/2006/main" xmlns:r="http://schemas.openxmlformats.org/officeDocument/2006/relationships" xmlns:p="http://schemas.openxmlformats.org/presentationml/2006/main">
+  <p:cSld>
+    <p:spTree>
+      <p:nvGrpSpPr>
+        <p:cNvPr id="1" name=""/>
+        <p:cNvGrpSpPr/>
+        <p:nvPr/>
+      </p:nvGrpSpPr>
+      <p:grpSpPr>
+        <a:xfrm>
+          <a:off x="0" y="0"/>
+          <a:ext cx="0" cy="0"/>
+          <a:chOff x="0" y="0"/>
+          <a:chExt cx="0" cy="0"/>
+        </a:xfrm>
+      </p:grpSpPr>
+      <p:sp>
+        <p:nvSpPr>
+          <p:cNvPr id="2" name="Title 1">
+            <a:extLst>
+              <a:ext uri="{FF2B5EF4-FFF2-40B4-BE49-F238E27FC236}">
+                <a16:creationId xmlns:a16="http://schemas.microsoft.com/office/drawing/2014/main" id="{485540E1-C002-43EF-9A26-A0303D9617B5}"/>
+              </a:ext>
+            </a:extLst>
+          </p:cNvPr>
+          <p:cNvSpPr>
+            <a:spLocks noGrp="1"/>
+          </p:cNvSpPr>
+          <p:nvPr>
+            <p:ph type="title"/>
+          </p:nvPr>
+        </p:nvSpPr>
+        <p:spPr/>
+        <p:txBody>
+          <a:bodyPr/>
+          <a:lstStyle/>
+          <a:p>
+            <a:r>
+              <a:rPr lang="en-US" dirty="0"/>
+              <a:t>What is Docker?</a:t>
+            </a:r>
+          </a:p>
+        </p:txBody>
+      </p:sp>
+      <p:sp>
+        <p:nvSpPr>
+          <p:cNvPr id="3" name="Content Placeholder 2">
+            <a:extLst>
+              <a:ext uri="{FF2B5EF4-FFF2-40B4-BE49-F238E27FC236}">
+                <a16:creationId xmlns:a16="http://schemas.microsoft.com/office/drawing/2014/main" id="{D049E349-9110-47B5-82E1-4A915ED293E6}"/>
+              </a:ext>
+            </a:extLst>
+          </p:cNvPr>
+          <p:cNvSpPr>
+            <a:spLocks noGrp="1"/>
+          </p:cNvSpPr>
+          <p:nvPr>
+            <p:ph sz="quarter" idx="10"/>
+          </p:nvPr>
+        </p:nvSpPr>
+        <p:spPr>
+          <a:xfrm>
+            <a:off x="427290" y="742951"/>
+            <a:ext cx="11647917" cy="5357812"/>
+          </a:xfrm>
+        </p:spPr>
+        <p:txBody>
+          <a:bodyPr/>
+          <a:lstStyle/>
+          <a:p>
+            <a:r>
+              <a:rPr lang="en-US" sz="2000" dirty="0"/>
+              <a:t>A computer program that performs operating-system-level virtualization also known as containerization</a:t>
+            </a:r>
+          </a:p>
+          <a:p>
+            <a:r>
+              <a:rPr lang="en-US" sz="2000" dirty="0"/>
+              <a:t>Think of it as a lightweight virtual machine, which can additionally share a great deal of resources between containers (images/machines)</a:t>
+            </a:r>
+          </a:p>
+          <a:p>
+            <a:r>
+              <a:rPr lang="en-US" sz="2000" dirty="0"/>
+              <a:t>Instead of having </a:t>
+            </a:r>
+            <a:r>
+              <a:rPr lang="en-US" sz="2000" b="1" dirty="0"/>
+              <a:t>10 services x 10 GB VMs </a:t>
+            </a:r>
+            <a:r>
+              <a:rPr lang="en-US" sz="2000" dirty="0"/>
+              <a:t>= </a:t>
+            </a:r>
+            <a:r>
+              <a:rPr lang="en-US" sz="2000" b="1" dirty="0"/>
+              <a:t>100 GB </a:t>
+            </a:r>
+            <a:r>
+              <a:rPr lang="en-US" sz="2000" dirty="0"/>
+              <a:t>you have </a:t>
+            </a:r>
+            <a:r>
+              <a:rPr lang="en-US" sz="2000" b="1" dirty="0"/>
+              <a:t>10 GB </a:t>
+            </a:r>
+            <a:r>
+              <a:rPr lang="en-US" sz="2000" dirty="0"/>
+              <a:t>machine that has 10 services, each in a container on top of this machine and each adds let’s say </a:t>
+            </a:r>
+            <a:r>
+              <a:rPr lang="en-US" sz="2000" b="1" dirty="0"/>
+              <a:t>200 MB  </a:t>
+            </a:r>
+            <a:r>
+              <a:rPr lang="en-US" sz="2000" dirty="0"/>
+              <a:t>=&gt; </a:t>
+            </a:r>
+            <a:r>
+              <a:rPr lang="en-US" sz="2000" b="1" dirty="0"/>
+              <a:t>12 GB</a:t>
+            </a:r>
+          </a:p>
+        </p:txBody>
+      </p:sp>
+      <p:pic>
+        <p:nvPicPr>
+          <p:cNvPr id="1026" name="Picture 2" descr="Image result for docker">
+            <a:extLst>
+              <a:ext uri="{FF2B5EF4-FFF2-40B4-BE49-F238E27FC236}">
+                <a16:creationId xmlns:a16="http://schemas.microsoft.com/office/drawing/2014/main" id="{A5767B15-B4A7-41F4-BE95-ECF70A807B30}"/>
+              </a:ext>
+            </a:extLst>
+          </p:cNvPr>
+          <p:cNvPicPr>
+            <a:picLocks noChangeAspect="1" noChangeArrowheads="1"/>
+          </p:cNvPicPr>
+          <p:nvPr/>
+        </p:nvPicPr>
+        <p:blipFill>
+          <a:blip r:embed="rId2">
+            <a:extLst>
+              <a:ext uri="{28A0092B-C50C-407E-A947-70E740481C1C}">
+                <a14:useLocalDpi xmlns:a14="http://schemas.microsoft.com/office/drawing/2010/main" val="0"/>
+              </a:ext>
+            </a:extLst>
+          </a:blip>
+          <a:srcRect/>
+          <a:stretch>
+            <a:fillRect/>
+          </a:stretch>
+        </p:blipFill>
+        <p:spPr bwMode="auto">
+          <a:xfrm>
+            <a:off x="1893684" y="2724150"/>
+            <a:ext cx="7334250" cy="4133850"/>
+          </a:xfrm>
+          <a:prstGeom prst="rect">
+            <a:avLst/>
+          </a:prstGeom>
+          <a:noFill/>
+          <a:extLst>
+            <a:ext uri="{909E8E84-426E-40DD-AFC4-6F175D3DCCD1}">
+              <a14:hiddenFill xmlns:a14="http://schemas.microsoft.com/office/drawing/2010/main">
+                <a:solidFill>
+                  <a:srgbClr val="FFFFFF"/>
+                </a:solidFill>
+              </a14:hiddenFill>
+            </a:ext>
+          </a:extLst>
+        </p:spPr>
+      </p:pic>
+    </p:spTree>
+    <p:extLst>
+      <p:ext uri="{BB962C8B-B14F-4D97-AF65-F5344CB8AC3E}">
+        <p14:creationId xmlns:p14="http://schemas.microsoft.com/office/powerpoint/2010/main" val="940168311"/>
       </p:ext>
     </p:extLst>
   </p:cSld>
@@ -10259,15 +10387,7 @@
           <a:p>
             <a:r>
               <a:rPr lang="en-US" dirty="0"/>
-              <a:t>What </a:t>
-            </a:r>
-            <a:r>
-              <a:rPr lang="pl-PL" dirty="0" err="1"/>
-              <a:t>are</a:t>
-            </a:r>
-            <a:r>
-              <a:rPr lang="en-US" dirty="0"/>
-              <a:t> Containers?</a:t>
+              <a:t>Containers</a:t>
             </a:r>
           </a:p>
         </p:txBody>
@@ -10290,748 +10410,6 @@
         </p:nvSpPr>
         <p:spPr>
           <a:xfrm>
-            <a:off x="427290" y="742951"/>
-            <a:ext cx="11647917" cy="1236990"/>
-          </a:xfrm>
-        </p:spPr>
-        <p:txBody>
-          <a:bodyPr/>
-          <a:lstStyle/>
-          <a:p>
-            <a:r>
-              <a:rPr lang="en-US" sz="2000" dirty="0"/>
-              <a:t>Container is an optimized alternative to a Virtual Machine</a:t>
-            </a:r>
-          </a:p>
-          <a:p>
-            <a:r>
-              <a:rPr lang="en-US" sz="2000" dirty="0"/>
-              <a:t>Virtual Machine virtualize the hardware using a Guest OS (Operative System)</a:t>
-            </a:r>
-          </a:p>
-        </p:txBody>
-      </p:sp>
-      <p:pic>
-        <p:nvPicPr>
-          <p:cNvPr id="1028" name="Picture 4" descr="Bilderesultat for vm vs container">
-            <a:extLst>
-              <a:ext uri="{FF2B5EF4-FFF2-40B4-BE49-F238E27FC236}">
-                <a16:creationId xmlns:a16="http://schemas.microsoft.com/office/drawing/2014/main" id="{9ADF551C-300F-4748-B93D-AD102142A103}"/>
-              </a:ext>
-            </a:extLst>
-          </p:cNvPr>
-          <p:cNvPicPr>
-            <a:picLocks noChangeAspect="1" noChangeArrowheads="1"/>
-          </p:cNvPicPr>
-          <p:nvPr/>
-        </p:nvPicPr>
-        <p:blipFill>
-          <a:blip r:embed="rId2">
-            <a:extLst>
-              <a:ext uri="{28A0092B-C50C-407E-A947-70E740481C1C}">
-                <a14:useLocalDpi xmlns:a14="http://schemas.microsoft.com/office/drawing/2010/main" val="0"/>
-              </a:ext>
-            </a:extLst>
-          </a:blip>
-          <a:srcRect/>
-          <a:stretch>
-            <a:fillRect/>
-          </a:stretch>
-        </p:blipFill>
-        <p:spPr bwMode="auto">
-          <a:xfrm>
-            <a:off x="606425" y="1979941"/>
-            <a:ext cx="8210550" cy="4648200"/>
-          </a:xfrm>
-          <a:prstGeom prst="rect">
-            <a:avLst/>
-          </a:prstGeom>
-          <a:noFill/>
-          <a:extLst>
-            <a:ext uri="{909E8E84-426E-40DD-AFC4-6F175D3DCCD1}">
-              <a14:hiddenFill xmlns:a14="http://schemas.microsoft.com/office/drawing/2010/main">
-                <a:solidFill>
-                  <a:srgbClr val="FFFFFF"/>
-                </a:solidFill>
-              </a14:hiddenFill>
-            </a:ext>
-          </a:extLst>
-        </p:spPr>
-      </p:pic>
-      <p:sp>
-        <p:nvSpPr>
-          <p:cNvPr id="7" name="Rectangle 6">
-            <a:extLst>
-              <a:ext uri="{FF2B5EF4-FFF2-40B4-BE49-F238E27FC236}">
-                <a16:creationId xmlns:a16="http://schemas.microsoft.com/office/drawing/2014/main" id="{A81614EC-893A-49C8-BADE-B77DB3BE6ACE}"/>
-              </a:ext>
-            </a:extLst>
-          </p:cNvPr>
-          <p:cNvSpPr/>
-          <p:nvPr/>
-        </p:nvSpPr>
-        <p:spPr>
-          <a:xfrm>
-            <a:off x="4489808" y="1979941"/>
-            <a:ext cx="4479532" cy="4770180"/>
-          </a:xfrm>
-          <a:prstGeom prst="rect">
-            <a:avLst/>
-          </a:prstGeom>
-          <a:solidFill>
-            <a:srgbClr val="00789C"/>
-          </a:solidFill>
-          <a:ln>
-            <a:noFill/>
-          </a:ln>
-        </p:spPr>
-        <p:style>
-          <a:lnRef idx="2">
-            <a:schemeClr val="accent1">
-              <a:shade val="50000"/>
-            </a:schemeClr>
-          </a:lnRef>
-          <a:fillRef idx="1">
-            <a:schemeClr val="accent1"/>
-          </a:fillRef>
-          <a:effectRef idx="0">
-            <a:schemeClr val="accent1"/>
-          </a:effectRef>
-          <a:fontRef idx="minor">
-            <a:schemeClr val="lt1"/>
-          </a:fontRef>
-        </p:style>
-        <p:txBody>
-          <a:bodyPr rtlCol="0" anchor="ctr"/>
-          <a:lstStyle/>
-          <a:p>
-            <a:pPr algn="ctr"/>
-            <a:endParaRPr lang="nb-NO"/>
-          </a:p>
-        </p:txBody>
-      </p:sp>
-    </p:spTree>
-    <p:extLst>
-      <p:ext uri="{BB962C8B-B14F-4D97-AF65-F5344CB8AC3E}">
-        <p14:creationId xmlns:p14="http://schemas.microsoft.com/office/powerpoint/2010/main" val="2672091002"/>
-      </p:ext>
-    </p:extLst>
-  </p:cSld>
-  <p:clrMapOvr>
-    <a:masterClrMapping/>
-  </p:clrMapOvr>
-</p:sld>
-</file>
-
-<file path=ppt/slides/slide21.xml><?xml version="1.0" encoding="utf-8"?>
-<p:sld xmlns:a="http://schemas.openxmlformats.org/drawingml/2006/main" xmlns:r="http://schemas.openxmlformats.org/officeDocument/2006/relationships" xmlns:p="http://schemas.openxmlformats.org/presentationml/2006/main">
-  <p:cSld>
-    <p:spTree>
-      <p:nvGrpSpPr>
-        <p:cNvPr id="1" name=""/>
-        <p:cNvGrpSpPr/>
-        <p:nvPr/>
-      </p:nvGrpSpPr>
-      <p:grpSpPr>
-        <a:xfrm>
-          <a:off x="0" y="0"/>
-          <a:ext cx="0" cy="0"/>
-          <a:chOff x="0" y="0"/>
-          <a:chExt cx="0" cy="0"/>
-        </a:xfrm>
-      </p:grpSpPr>
-      <p:sp>
-        <p:nvSpPr>
-          <p:cNvPr id="2" name="Title 1">
-            <a:extLst>
-              <a:ext uri="{FF2B5EF4-FFF2-40B4-BE49-F238E27FC236}">
-                <a16:creationId xmlns:a16="http://schemas.microsoft.com/office/drawing/2014/main" id="{485540E1-C002-43EF-9A26-A0303D9617B5}"/>
-              </a:ext>
-            </a:extLst>
-          </p:cNvPr>
-          <p:cNvSpPr>
-            <a:spLocks noGrp="1"/>
-          </p:cNvSpPr>
-          <p:nvPr>
-            <p:ph type="title"/>
-          </p:nvPr>
-        </p:nvSpPr>
-        <p:spPr/>
-        <p:txBody>
-          <a:bodyPr/>
-          <a:lstStyle/>
-          <a:p>
-            <a:r>
-              <a:rPr lang="en-US" dirty="0"/>
-              <a:t>What </a:t>
-            </a:r>
-            <a:r>
-              <a:rPr lang="pl-PL" dirty="0" err="1"/>
-              <a:t>are</a:t>
-            </a:r>
-            <a:r>
-              <a:rPr lang="en-US" dirty="0"/>
-              <a:t> Containers?</a:t>
-            </a:r>
-          </a:p>
-        </p:txBody>
-      </p:sp>
-      <p:sp>
-        <p:nvSpPr>
-          <p:cNvPr id="3" name="Content Placeholder 2">
-            <a:extLst>
-              <a:ext uri="{FF2B5EF4-FFF2-40B4-BE49-F238E27FC236}">
-                <a16:creationId xmlns:a16="http://schemas.microsoft.com/office/drawing/2014/main" id="{D049E349-9110-47B5-82E1-4A915ED293E6}"/>
-              </a:ext>
-            </a:extLst>
-          </p:cNvPr>
-          <p:cNvSpPr>
-            <a:spLocks noGrp="1"/>
-          </p:cNvSpPr>
-          <p:nvPr>
-            <p:ph sz="quarter" idx="10"/>
-          </p:nvPr>
-        </p:nvSpPr>
-        <p:spPr>
-          <a:xfrm>
-            <a:off x="427290" y="742951"/>
-            <a:ext cx="11647917" cy="757822"/>
-          </a:xfrm>
-        </p:spPr>
-        <p:txBody>
-          <a:bodyPr/>
-          <a:lstStyle/>
-          <a:p>
-            <a:r>
-              <a:rPr lang="en-US" sz="2000" dirty="0"/>
-              <a:t>Container is an optimized alternative to a Virtual Machine</a:t>
-            </a:r>
-          </a:p>
-          <a:p>
-            <a:r>
-              <a:rPr lang="en-US" sz="2000" dirty="0"/>
-              <a:t>Virtual Machine virtualize the hardware using a Guest OS (Operative System)</a:t>
-            </a:r>
-          </a:p>
-        </p:txBody>
-      </p:sp>
-      <p:pic>
-        <p:nvPicPr>
-          <p:cNvPr id="1028" name="Picture 4" descr="Bilderesultat for vm vs container">
-            <a:extLst>
-              <a:ext uri="{FF2B5EF4-FFF2-40B4-BE49-F238E27FC236}">
-                <a16:creationId xmlns:a16="http://schemas.microsoft.com/office/drawing/2014/main" id="{9ADF551C-300F-4748-B93D-AD102142A103}"/>
-              </a:ext>
-            </a:extLst>
-          </p:cNvPr>
-          <p:cNvPicPr>
-            <a:picLocks noChangeAspect="1" noChangeArrowheads="1"/>
-          </p:cNvPicPr>
-          <p:nvPr/>
-        </p:nvPicPr>
-        <p:blipFill>
-          <a:blip r:embed="rId2">
-            <a:extLst>
-              <a:ext uri="{28A0092B-C50C-407E-A947-70E740481C1C}">
-                <a14:useLocalDpi xmlns:a14="http://schemas.microsoft.com/office/drawing/2010/main" val="0"/>
-              </a:ext>
-            </a:extLst>
-          </a:blip>
-          <a:srcRect/>
-          <a:stretch>
-            <a:fillRect/>
-          </a:stretch>
-        </p:blipFill>
-        <p:spPr bwMode="auto">
-          <a:xfrm>
-            <a:off x="606425" y="1979941"/>
-            <a:ext cx="8210550" cy="4648200"/>
-          </a:xfrm>
-          <a:prstGeom prst="rect">
-            <a:avLst/>
-          </a:prstGeom>
-          <a:noFill/>
-          <a:extLst>
-            <a:ext uri="{909E8E84-426E-40DD-AFC4-6F175D3DCCD1}">
-              <a14:hiddenFill xmlns:a14="http://schemas.microsoft.com/office/drawing/2010/main">
-                <a:solidFill>
-                  <a:srgbClr val="FFFFFF"/>
-                </a:solidFill>
-              </a14:hiddenFill>
-            </a:ext>
-          </a:extLst>
-        </p:spPr>
-      </p:pic>
-      <p:sp>
-        <p:nvSpPr>
-          <p:cNvPr id="5" name="Rectangle 4">
-            <a:extLst>
-              <a:ext uri="{FF2B5EF4-FFF2-40B4-BE49-F238E27FC236}">
-                <a16:creationId xmlns:a16="http://schemas.microsoft.com/office/drawing/2014/main" id="{42D4437E-6921-4DE9-BCE5-32F72B3D6056}"/>
-              </a:ext>
-            </a:extLst>
-          </p:cNvPr>
-          <p:cNvSpPr/>
-          <p:nvPr/>
-        </p:nvSpPr>
-        <p:spPr>
-          <a:xfrm>
-            <a:off x="9074210" y="2393543"/>
-            <a:ext cx="2710248" cy="3524371"/>
-          </a:xfrm>
-          <a:prstGeom prst="rect">
-            <a:avLst/>
-          </a:prstGeom>
-        </p:spPr>
-        <p:txBody>
-          <a:bodyPr/>
-          <a:lstStyle/>
-          <a:p>
-            <a:pPr>
-              <a:lnSpc>
-                <a:spcPct val="90000"/>
-              </a:lnSpc>
-              <a:spcBef>
-                <a:spcPts val="1000"/>
-              </a:spcBef>
-            </a:pPr>
-            <a:r>
-              <a:rPr lang="en-US" sz="2000" dirty="0">
-                <a:solidFill>
-                  <a:schemeClr val="bg1"/>
-                </a:solidFill>
-                <a:latin typeface="Open Sans" charset="0"/>
-              </a:rPr>
-              <a:t>Can run 4x to 6x the number of containers as you could VMs</a:t>
-            </a:r>
-          </a:p>
-          <a:p>
-            <a:pPr>
-              <a:lnSpc>
-                <a:spcPct val="90000"/>
-              </a:lnSpc>
-              <a:spcBef>
-                <a:spcPts val="1000"/>
-              </a:spcBef>
-            </a:pPr>
-            <a:endParaRPr lang="en-US" sz="2000" dirty="0">
-              <a:solidFill>
-                <a:schemeClr val="bg1"/>
-              </a:solidFill>
-              <a:latin typeface="Open Sans" charset="0"/>
-            </a:endParaRPr>
-          </a:p>
-          <a:p>
-            <a:pPr>
-              <a:lnSpc>
-                <a:spcPct val="90000"/>
-              </a:lnSpc>
-              <a:spcBef>
-                <a:spcPts val="1000"/>
-              </a:spcBef>
-            </a:pPr>
-            <a:r>
-              <a:rPr lang="en-US" sz="2000" dirty="0">
-                <a:solidFill>
-                  <a:schemeClr val="bg1"/>
-                </a:solidFill>
-                <a:latin typeface="Open Sans" charset="0"/>
-              </a:rPr>
-              <a:t>Containers can initiate in milliseconds</a:t>
-            </a:r>
-            <a:br>
-              <a:rPr lang="en-US" sz="2000" dirty="0">
-                <a:solidFill>
-                  <a:schemeClr val="bg1"/>
-                </a:solidFill>
-                <a:latin typeface="Open Sans" charset="0"/>
-              </a:rPr>
-            </a:br>
-            <a:r>
-              <a:rPr lang="en-US" sz="2000" dirty="0">
-                <a:solidFill>
-                  <a:schemeClr val="bg1"/>
-                </a:solidFill>
-                <a:latin typeface="Open Sans" charset="0"/>
-              </a:rPr>
-              <a:t>versus</a:t>
-            </a:r>
-            <a:br>
-              <a:rPr lang="en-US" sz="2000" dirty="0">
-                <a:solidFill>
-                  <a:schemeClr val="bg1"/>
-                </a:solidFill>
-                <a:latin typeface="Open Sans" charset="0"/>
-              </a:rPr>
-            </a:br>
-            <a:r>
-              <a:rPr lang="en-US" sz="2000" dirty="0">
-                <a:solidFill>
-                  <a:schemeClr val="bg1"/>
-                </a:solidFill>
-                <a:latin typeface="Open Sans" charset="0"/>
-              </a:rPr>
-              <a:t>minutes for VMs.</a:t>
-            </a:r>
-            <a:endParaRPr lang="nb-NO" sz="2000" dirty="0">
-              <a:solidFill>
-                <a:schemeClr val="bg1"/>
-              </a:solidFill>
-              <a:latin typeface="Open Sans" charset="0"/>
-            </a:endParaRPr>
-          </a:p>
-        </p:txBody>
-      </p:sp>
-      <p:sp>
-        <p:nvSpPr>
-          <p:cNvPr id="6" name="Rectangle 5">
-            <a:extLst>
-              <a:ext uri="{FF2B5EF4-FFF2-40B4-BE49-F238E27FC236}">
-                <a16:creationId xmlns:a16="http://schemas.microsoft.com/office/drawing/2014/main" id="{B5E503A2-2218-4755-9D76-D1B8EF274B69}"/>
-              </a:ext>
-            </a:extLst>
-          </p:cNvPr>
-          <p:cNvSpPr/>
-          <p:nvPr/>
-        </p:nvSpPr>
-        <p:spPr>
-          <a:xfrm rot="5400000">
-            <a:off x="9920635" y="1839437"/>
-            <a:ext cx="590226" cy="584775"/>
-          </a:xfrm>
-          <a:prstGeom prst="rect">
-            <a:avLst/>
-          </a:prstGeom>
-        </p:spPr>
-        <p:txBody>
-          <a:bodyPr wrap="none">
-            <a:spAutoFit/>
-          </a:bodyPr>
-          <a:lstStyle/>
-          <a:p>
-            <a:r>
-              <a:rPr lang="en-US" sz="3200" dirty="0">
-                <a:solidFill>
-                  <a:schemeClr val="bg1"/>
-                </a:solidFill>
-                <a:latin typeface="Open Sans" charset="0"/>
-                <a:sym typeface="Symbol" panose="05050102010706020507" pitchFamily="18" charset="2"/>
-              </a:rPr>
-              <a:t></a:t>
-            </a:r>
-            <a:endParaRPr lang="nb-NO" sz="3200" dirty="0"/>
-          </a:p>
-        </p:txBody>
-      </p:sp>
-      <p:sp>
-        <p:nvSpPr>
-          <p:cNvPr id="4" name="Rectangle 3">
-            <a:extLst>
-              <a:ext uri="{FF2B5EF4-FFF2-40B4-BE49-F238E27FC236}">
-                <a16:creationId xmlns:a16="http://schemas.microsoft.com/office/drawing/2014/main" id="{9BDC03F5-425D-4BF8-8B11-33B87A8EF988}"/>
-              </a:ext>
-            </a:extLst>
-          </p:cNvPr>
-          <p:cNvSpPr/>
-          <p:nvPr/>
-        </p:nvSpPr>
-        <p:spPr>
-          <a:xfrm>
-            <a:off x="4711699" y="1500772"/>
-            <a:ext cx="7183315" cy="406181"/>
-          </a:xfrm>
-          <a:prstGeom prst="rect">
-            <a:avLst/>
-          </a:prstGeom>
-        </p:spPr>
-        <p:txBody>
-          <a:bodyPr/>
-          <a:lstStyle/>
-          <a:p>
-            <a:pPr marL="228600" indent="-228600">
-              <a:lnSpc>
-                <a:spcPct val="90000"/>
-              </a:lnSpc>
-              <a:spcBef>
-                <a:spcPts val="1000"/>
-              </a:spcBef>
-              <a:buFont typeface="Arial"/>
-              <a:buChar char="•"/>
-            </a:pPr>
-            <a:r>
-              <a:rPr lang="en-US" sz="2000" dirty="0">
-                <a:solidFill>
-                  <a:schemeClr val="bg1"/>
-                </a:solidFill>
-                <a:latin typeface="Open Sans" charset="0"/>
-              </a:rPr>
-              <a:t>Containers operate on top of a shared operating system</a:t>
-            </a:r>
-          </a:p>
-        </p:txBody>
-      </p:sp>
-    </p:spTree>
-    <p:extLst>
-      <p:ext uri="{BB962C8B-B14F-4D97-AF65-F5344CB8AC3E}">
-        <p14:creationId xmlns:p14="http://schemas.microsoft.com/office/powerpoint/2010/main" val="1360177616"/>
-      </p:ext>
-    </p:extLst>
-  </p:cSld>
-  <p:clrMapOvr>
-    <a:masterClrMapping/>
-  </p:clrMapOvr>
-</p:sld>
-</file>
-
-<file path=ppt/slides/slide22.xml><?xml version="1.0" encoding="utf-8"?>
-<p:sld xmlns:a="http://schemas.openxmlformats.org/drawingml/2006/main" xmlns:r="http://schemas.openxmlformats.org/officeDocument/2006/relationships" xmlns:p="http://schemas.openxmlformats.org/presentationml/2006/main">
-  <p:cSld>
-    <p:spTree>
-      <p:nvGrpSpPr>
-        <p:cNvPr id="1" name=""/>
-        <p:cNvGrpSpPr/>
-        <p:nvPr/>
-      </p:nvGrpSpPr>
-      <p:grpSpPr>
-        <a:xfrm>
-          <a:off x="0" y="0"/>
-          <a:ext cx="0" cy="0"/>
-          <a:chOff x="0" y="0"/>
-          <a:chExt cx="0" cy="0"/>
-        </a:xfrm>
-      </p:grpSpPr>
-      <p:sp>
-        <p:nvSpPr>
-          <p:cNvPr id="2" name="Title 1">
-            <a:extLst>
-              <a:ext uri="{FF2B5EF4-FFF2-40B4-BE49-F238E27FC236}">
-                <a16:creationId xmlns:a16="http://schemas.microsoft.com/office/drawing/2014/main" id="{485540E1-C002-43EF-9A26-A0303D9617B5}"/>
-              </a:ext>
-            </a:extLst>
-          </p:cNvPr>
-          <p:cNvSpPr>
-            <a:spLocks noGrp="1"/>
-          </p:cNvSpPr>
-          <p:nvPr>
-            <p:ph type="title"/>
-          </p:nvPr>
-        </p:nvSpPr>
-        <p:spPr/>
-        <p:txBody>
-          <a:bodyPr/>
-          <a:lstStyle/>
-          <a:p>
-            <a:r>
-              <a:rPr lang="en-US" dirty="0"/>
-              <a:t>What is Docker?</a:t>
-            </a:r>
-          </a:p>
-        </p:txBody>
-      </p:sp>
-      <p:sp>
-        <p:nvSpPr>
-          <p:cNvPr id="3" name="Content Placeholder 2">
-            <a:extLst>
-              <a:ext uri="{FF2B5EF4-FFF2-40B4-BE49-F238E27FC236}">
-                <a16:creationId xmlns:a16="http://schemas.microsoft.com/office/drawing/2014/main" id="{D049E349-9110-47B5-82E1-4A915ED293E6}"/>
-              </a:ext>
-            </a:extLst>
-          </p:cNvPr>
-          <p:cNvSpPr>
-            <a:spLocks noGrp="1"/>
-          </p:cNvSpPr>
-          <p:nvPr>
-            <p:ph sz="quarter" idx="10"/>
-          </p:nvPr>
-        </p:nvSpPr>
-        <p:spPr>
-          <a:xfrm>
-            <a:off x="427290" y="742951"/>
-            <a:ext cx="11647917" cy="5357812"/>
-          </a:xfrm>
-        </p:spPr>
-        <p:txBody>
-          <a:bodyPr/>
-          <a:lstStyle/>
-          <a:p>
-            <a:r>
-              <a:rPr lang="en-US" sz="2000" dirty="0"/>
-              <a:t>A computer program that performs operating-system-level virtualization also known as containerization</a:t>
-            </a:r>
-          </a:p>
-          <a:p>
-            <a:r>
-              <a:rPr lang="en-US" sz="2000" dirty="0"/>
-              <a:t>Think of it as a lightweight virtual machine, which can additionally share a great deal of resources between containers (images/machines)</a:t>
-            </a:r>
-          </a:p>
-          <a:p>
-            <a:r>
-              <a:rPr lang="en-US" sz="2000" dirty="0"/>
-              <a:t>Instead of having </a:t>
-            </a:r>
-            <a:r>
-              <a:rPr lang="en-US" sz="2000" b="1" dirty="0"/>
-              <a:t>10 services x 10 GB VMs </a:t>
-            </a:r>
-            <a:r>
-              <a:rPr lang="en-US" sz="2000" dirty="0"/>
-              <a:t>= </a:t>
-            </a:r>
-            <a:r>
-              <a:rPr lang="en-US" sz="2000" b="1" dirty="0"/>
-              <a:t>100 GB </a:t>
-            </a:r>
-            <a:r>
-              <a:rPr lang="en-US" sz="2000" dirty="0"/>
-              <a:t>you have </a:t>
-            </a:r>
-            <a:r>
-              <a:rPr lang="en-US" sz="2000" b="1" dirty="0"/>
-              <a:t>10 GB </a:t>
-            </a:r>
-            <a:r>
-              <a:rPr lang="en-US" sz="2000" dirty="0"/>
-              <a:t>machine that has 10 services, each in a container on top of this machine and each adds let’s say </a:t>
-            </a:r>
-            <a:r>
-              <a:rPr lang="en-US" sz="2000" b="1" dirty="0"/>
-              <a:t>200 MB  </a:t>
-            </a:r>
-            <a:r>
-              <a:rPr lang="en-US" sz="2000" dirty="0"/>
-              <a:t>=&gt; </a:t>
-            </a:r>
-            <a:r>
-              <a:rPr lang="en-US" sz="2000" b="1" dirty="0"/>
-              <a:t>12 GB</a:t>
-            </a:r>
-          </a:p>
-        </p:txBody>
-      </p:sp>
-      <p:pic>
-        <p:nvPicPr>
-          <p:cNvPr id="1026" name="Picture 2" descr="Image result for docker">
-            <a:extLst>
-              <a:ext uri="{FF2B5EF4-FFF2-40B4-BE49-F238E27FC236}">
-                <a16:creationId xmlns:a16="http://schemas.microsoft.com/office/drawing/2014/main" id="{A5767B15-B4A7-41F4-BE95-ECF70A807B30}"/>
-              </a:ext>
-            </a:extLst>
-          </p:cNvPr>
-          <p:cNvPicPr>
-            <a:picLocks noChangeAspect="1" noChangeArrowheads="1"/>
-          </p:cNvPicPr>
-          <p:nvPr/>
-        </p:nvPicPr>
-        <p:blipFill>
-          <a:blip r:embed="rId2">
-            <a:extLst>
-              <a:ext uri="{28A0092B-C50C-407E-A947-70E740481C1C}">
-                <a14:useLocalDpi xmlns:a14="http://schemas.microsoft.com/office/drawing/2010/main" val="0"/>
-              </a:ext>
-            </a:extLst>
-          </a:blip>
-          <a:srcRect/>
-          <a:stretch>
-            <a:fillRect/>
-          </a:stretch>
-        </p:blipFill>
-        <p:spPr bwMode="auto">
-          <a:xfrm>
-            <a:off x="1893684" y="2724150"/>
-            <a:ext cx="7334250" cy="4133850"/>
-          </a:xfrm>
-          <a:prstGeom prst="rect">
-            <a:avLst/>
-          </a:prstGeom>
-          <a:noFill/>
-          <a:extLst>
-            <a:ext uri="{909E8E84-426E-40DD-AFC4-6F175D3DCCD1}">
-              <a14:hiddenFill xmlns:a14="http://schemas.microsoft.com/office/drawing/2010/main">
-                <a:solidFill>
-                  <a:srgbClr val="FFFFFF"/>
-                </a:solidFill>
-              </a14:hiddenFill>
-            </a:ext>
-          </a:extLst>
-        </p:spPr>
-      </p:pic>
-    </p:spTree>
-    <p:extLst>
-      <p:ext uri="{BB962C8B-B14F-4D97-AF65-F5344CB8AC3E}">
-        <p14:creationId xmlns:p14="http://schemas.microsoft.com/office/powerpoint/2010/main" val="940168311"/>
-      </p:ext>
-    </p:extLst>
-  </p:cSld>
-  <p:clrMapOvr>
-    <a:masterClrMapping/>
-  </p:clrMapOvr>
-</p:sld>
-</file>
-
-<file path=ppt/slides/slide23.xml><?xml version="1.0" encoding="utf-8"?>
-<p:sld xmlns:a="http://schemas.openxmlformats.org/drawingml/2006/main" xmlns:r="http://schemas.openxmlformats.org/officeDocument/2006/relationships" xmlns:p="http://schemas.openxmlformats.org/presentationml/2006/main">
-  <p:cSld>
-    <p:spTree>
-      <p:nvGrpSpPr>
-        <p:cNvPr id="1" name=""/>
-        <p:cNvGrpSpPr/>
-        <p:nvPr/>
-      </p:nvGrpSpPr>
-      <p:grpSpPr>
-        <a:xfrm>
-          <a:off x="0" y="0"/>
-          <a:ext cx="0" cy="0"/>
-          <a:chOff x="0" y="0"/>
-          <a:chExt cx="0" cy="0"/>
-        </a:xfrm>
-      </p:grpSpPr>
-      <p:sp>
-        <p:nvSpPr>
-          <p:cNvPr id="2" name="Title 1">
-            <a:extLst>
-              <a:ext uri="{FF2B5EF4-FFF2-40B4-BE49-F238E27FC236}">
-                <a16:creationId xmlns:a16="http://schemas.microsoft.com/office/drawing/2014/main" id="{485540E1-C002-43EF-9A26-A0303D9617B5}"/>
-              </a:ext>
-            </a:extLst>
-          </p:cNvPr>
-          <p:cNvSpPr>
-            <a:spLocks noGrp="1"/>
-          </p:cNvSpPr>
-          <p:nvPr>
-            <p:ph type="title"/>
-          </p:nvPr>
-        </p:nvSpPr>
-        <p:spPr/>
-        <p:txBody>
-          <a:bodyPr/>
-          <a:lstStyle/>
-          <a:p>
-            <a:r>
-              <a:rPr lang="en-US" dirty="0"/>
-              <a:t>Containers</a:t>
-            </a:r>
-          </a:p>
-        </p:txBody>
-      </p:sp>
-      <p:sp>
-        <p:nvSpPr>
-          <p:cNvPr id="3" name="Content Placeholder 2">
-            <a:extLst>
-              <a:ext uri="{FF2B5EF4-FFF2-40B4-BE49-F238E27FC236}">
-                <a16:creationId xmlns:a16="http://schemas.microsoft.com/office/drawing/2014/main" id="{D049E349-9110-47B5-82E1-4A915ED293E6}"/>
-              </a:ext>
-            </a:extLst>
-          </p:cNvPr>
-          <p:cNvSpPr>
-            <a:spLocks noGrp="1"/>
-          </p:cNvSpPr>
-          <p:nvPr>
-            <p:ph sz="quarter" idx="10"/>
-          </p:nvPr>
-        </p:nvSpPr>
-        <p:spPr>
-          <a:xfrm>
             <a:off x="614363" y="1243013"/>
             <a:ext cx="10965656" cy="5399414"/>
           </a:xfrm>
@@ -11108,7 +10486,7 @@
 </p:sld>
 </file>
 
-<file path=ppt/slides/slide24.xml><?xml version="1.0" encoding="utf-8"?>
+<file path=ppt/slides/slide21.xml><?xml version="1.0" encoding="utf-8"?>
 <p:sld xmlns:a="http://schemas.openxmlformats.org/drawingml/2006/main" xmlns:r="http://schemas.openxmlformats.org/officeDocument/2006/relationships" xmlns:p="http://schemas.openxmlformats.org/presentationml/2006/main">
   <p:cSld>
     <p:spTree>
@@ -11324,7 +10702,7 @@
 </p:sld>
 </file>
 
-<file path=ppt/slides/slide25.xml><?xml version="1.0" encoding="utf-8"?>
+<file path=ppt/slides/slide22.xml><?xml version="1.0" encoding="utf-8"?>
 <p:sld xmlns:a="http://schemas.openxmlformats.org/drawingml/2006/main" xmlns:r="http://schemas.openxmlformats.org/officeDocument/2006/relationships" xmlns:p="http://schemas.openxmlformats.org/presentationml/2006/main">
   <p:cSld>
     <p:spTree>
@@ -11511,7 +10889,7 @@
 </p:sld>
 </file>
 
-<file path=ppt/slides/slide26.xml><?xml version="1.0" encoding="utf-8"?>
+<file path=ppt/slides/slide23.xml><?xml version="1.0" encoding="utf-8"?>
 <p:sld xmlns:a="http://schemas.openxmlformats.org/drawingml/2006/main" xmlns:r="http://schemas.openxmlformats.org/officeDocument/2006/relationships" xmlns:p="http://schemas.openxmlformats.org/presentationml/2006/main">
   <p:cSld>
     <p:spTree>
@@ -11607,7 +10985,7 @@
 </p:sld>
 </file>
 
-<file path=ppt/slides/slide27.xml><?xml version="1.0" encoding="utf-8"?>
+<file path=ppt/slides/slide24.xml><?xml version="1.0" encoding="utf-8"?>
 <p:sld xmlns:a="http://schemas.openxmlformats.org/drawingml/2006/main" xmlns:r="http://schemas.openxmlformats.org/officeDocument/2006/relationships" xmlns:p="http://schemas.openxmlformats.org/presentationml/2006/main">
   <p:cSld>
     <p:spTree>
@@ -11782,7 +11160,7 @@
 </p:sld>
 </file>
 
-<file path=ppt/slides/slide28.xml><?xml version="1.0" encoding="utf-8"?>
+<file path=ppt/slides/slide25.xml><?xml version="1.0" encoding="utf-8"?>
 <p:sld xmlns:a="http://schemas.openxmlformats.org/drawingml/2006/main" xmlns:r="http://schemas.openxmlformats.org/officeDocument/2006/relationships" xmlns:p="http://schemas.openxmlformats.org/presentationml/2006/main">
   <p:cSld>
     <p:spTree>
@@ -12431,7 +11809,7 @@
 </p:sld>
 </file>
 
-<file path=ppt/slides/slide29.xml><?xml version="1.0" encoding="utf-8"?>
+<file path=ppt/slides/slide26.xml><?xml version="1.0" encoding="utf-8"?>
 <p:sld xmlns:a="http://schemas.openxmlformats.org/drawingml/2006/main" xmlns:r="http://schemas.openxmlformats.org/officeDocument/2006/relationships" xmlns:p="http://schemas.openxmlformats.org/presentationml/2006/main">
   <p:cSld>
     <p:spTree>
@@ -12572,142 +11950,7 @@
 </p:sld>
 </file>
 
-<file path=ppt/slides/slide3.xml><?xml version="1.0" encoding="utf-8"?>
-<p:sld xmlns:a="http://schemas.openxmlformats.org/drawingml/2006/main" xmlns:r="http://schemas.openxmlformats.org/officeDocument/2006/relationships" xmlns:p="http://schemas.openxmlformats.org/presentationml/2006/main">
-  <p:cSld>
-    <p:spTree>
-      <p:nvGrpSpPr>
-        <p:cNvPr id="1" name=""/>
-        <p:cNvGrpSpPr/>
-        <p:nvPr/>
-      </p:nvGrpSpPr>
-      <p:grpSpPr>
-        <a:xfrm>
-          <a:off x="0" y="0"/>
-          <a:ext cx="0" cy="0"/>
-          <a:chOff x="0" y="0"/>
-          <a:chExt cx="0" cy="0"/>
-        </a:xfrm>
-      </p:grpSpPr>
-      <p:sp>
-        <p:nvSpPr>
-          <p:cNvPr id="4" name="Title 3"/>
-          <p:cNvSpPr>
-            <a:spLocks noGrp="1"/>
-          </p:cNvSpPr>
-          <p:nvPr>
-            <p:ph type="title"/>
-          </p:nvPr>
-        </p:nvSpPr>
-        <p:spPr/>
-        <p:txBody>
-          <a:bodyPr>
-            <a:normAutofit fontScale="90000"/>
-          </a:bodyPr>
-          <a:lstStyle/>
-          <a:p>
-            <a:r>
-              <a:rPr lang="en-US" sz="4900" dirty="0"/>
-              <a:t>Scalability</a:t>
-            </a:r>
-            <a:endParaRPr lang="en-US" dirty="0"/>
-          </a:p>
-        </p:txBody>
-      </p:sp>
-      <p:sp>
-        <p:nvSpPr>
-          <p:cNvPr id="3" name="Content Placeholder 2"/>
-          <p:cNvSpPr>
-            <a:spLocks noGrp="1"/>
-          </p:cNvSpPr>
-          <p:nvPr>
-            <p:ph sz="quarter" idx="10"/>
-          </p:nvPr>
-        </p:nvSpPr>
-        <p:spPr>
-          <a:xfrm>
-            <a:off x="2496000" y="2251709"/>
-            <a:ext cx="7200000" cy="3960000"/>
-          </a:xfrm>
-        </p:spPr>
-        <p:txBody>
-          <a:bodyPr/>
-          <a:lstStyle/>
-          <a:p>
-            <a:endParaRPr lang="en-US" sz="4000" dirty="0"/>
-          </a:p>
-          <a:p>
-            <a:pPr marL="457189" lvl="1" indent="0" algn="ctr">
-              <a:buNone/>
-            </a:pPr>
-            <a:r>
-              <a:rPr lang="en-US" sz="3600" dirty="0"/>
-              <a:t>The </a:t>
-            </a:r>
-            <a:r>
-              <a:rPr lang="en-US" sz="3600" b="1" dirty="0"/>
-              <a:t>ability</a:t>
-            </a:r>
-            <a:r>
-              <a:rPr lang="en-US" sz="3600" dirty="0"/>
-              <a:t> of a </a:t>
-            </a:r>
-            <a:r>
-              <a:rPr lang="en-US" sz="3600" b="1" dirty="0"/>
-              <a:t>service</a:t>
-            </a:r>
-            <a:r>
-              <a:rPr lang="en-US" sz="3600" dirty="0"/>
-              <a:t> to </a:t>
-            </a:r>
-            <a:r>
-              <a:rPr lang="en-US" sz="3600" b="1" dirty="0"/>
-              <a:t>increase</a:t>
-            </a:r>
-            <a:r>
-              <a:rPr lang="en-US" sz="3600" dirty="0"/>
-              <a:t> its </a:t>
-            </a:r>
-            <a:r>
-              <a:rPr lang="en-US" sz="3600" b="1" dirty="0"/>
-              <a:t>capacity </a:t>
-            </a:r>
-            <a:r>
-              <a:rPr lang="en-US" sz="3600" dirty="0"/>
-              <a:t>by </a:t>
-            </a:r>
-            <a:r>
-              <a:rPr lang="en-US" sz="3600" b="1" dirty="0"/>
-              <a:t>consuming more resources</a:t>
-            </a:r>
-          </a:p>
-          <a:p>
-            <a:endParaRPr lang="en-US" sz="4000" dirty="0"/>
-          </a:p>
-        </p:txBody>
-      </p:sp>
-    </p:spTree>
-    <p:extLst>
-      <p:ext uri="{BB962C8B-B14F-4D97-AF65-F5344CB8AC3E}">
-        <p14:creationId xmlns:p14="http://schemas.microsoft.com/office/powerpoint/2010/main" val="851801576"/>
-      </p:ext>
-    </p:extLst>
-  </p:cSld>
-  <p:clrMapOvr>
-    <a:masterClrMapping/>
-  </p:clrMapOvr>
-  <mc:AlternateContent xmlns:mc="http://schemas.openxmlformats.org/markup-compatibility/2006" xmlns:p14="http://schemas.microsoft.com/office/powerpoint/2010/main">
-    <mc:Choice Requires="p14">
-      <p:transition spd="slow" p14:dur="2000" advTm="2224"/>
-    </mc:Choice>
-    <mc:Fallback xmlns="">
-      <p:transition spd="slow" advTm="2224"/>
-    </mc:Fallback>
-  </mc:AlternateContent>
-</p:sld>
-</file>
-
-<file path=ppt/slides/slide30.xml><?xml version="1.0" encoding="utf-8"?>
+<file path=ppt/slides/slide27.xml><?xml version="1.0" encoding="utf-8"?>
 <p:sld xmlns:a="http://schemas.openxmlformats.org/drawingml/2006/main" xmlns:r="http://schemas.openxmlformats.org/officeDocument/2006/relationships" xmlns:p="http://schemas.openxmlformats.org/presentationml/2006/main">
   <p:cSld>
     <p:spTree>
@@ -12923,7 +12166,7 @@
 </p:sld>
 </file>
 
-<file path=ppt/slides/slide31.xml><?xml version="1.0" encoding="utf-8"?>
+<file path=ppt/slides/slide28.xml><?xml version="1.0" encoding="utf-8"?>
 <p:sld xmlns:a="http://schemas.openxmlformats.org/drawingml/2006/main" xmlns:r="http://schemas.openxmlformats.org/officeDocument/2006/relationships" xmlns:p="http://schemas.openxmlformats.org/presentationml/2006/main">
   <p:cSld>
     <p:spTree>
@@ -13132,7 +12375,7 @@
 </p:sld>
 </file>
 
-<file path=ppt/slides/slide32.xml><?xml version="1.0" encoding="utf-8"?>
+<file path=ppt/slides/slide29.xml><?xml version="1.0" encoding="utf-8"?>
 <p:sld xmlns:a="http://schemas.openxmlformats.org/drawingml/2006/main" xmlns:r="http://schemas.openxmlformats.org/officeDocument/2006/relationships" xmlns:p="http://schemas.openxmlformats.org/presentationml/2006/main">
   <p:cSld>
     <p:spTree>
@@ -13309,7 +12552,142 @@
 </p:sld>
 </file>
 
-<file path=ppt/slides/slide33.xml><?xml version="1.0" encoding="utf-8"?>
+<file path=ppt/slides/slide3.xml><?xml version="1.0" encoding="utf-8"?>
+<p:sld xmlns:a="http://schemas.openxmlformats.org/drawingml/2006/main" xmlns:r="http://schemas.openxmlformats.org/officeDocument/2006/relationships" xmlns:p="http://schemas.openxmlformats.org/presentationml/2006/main">
+  <p:cSld>
+    <p:spTree>
+      <p:nvGrpSpPr>
+        <p:cNvPr id="1" name=""/>
+        <p:cNvGrpSpPr/>
+        <p:nvPr/>
+      </p:nvGrpSpPr>
+      <p:grpSpPr>
+        <a:xfrm>
+          <a:off x="0" y="0"/>
+          <a:ext cx="0" cy="0"/>
+          <a:chOff x="0" y="0"/>
+          <a:chExt cx="0" cy="0"/>
+        </a:xfrm>
+      </p:grpSpPr>
+      <p:sp>
+        <p:nvSpPr>
+          <p:cNvPr id="4" name="Title 3"/>
+          <p:cNvSpPr>
+            <a:spLocks noGrp="1"/>
+          </p:cNvSpPr>
+          <p:nvPr>
+            <p:ph type="title"/>
+          </p:nvPr>
+        </p:nvSpPr>
+        <p:spPr/>
+        <p:txBody>
+          <a:bodyPr>
+            <a:normAutofit fontScale="90000"/>
+          </a:bodyPr>
+          <a:lstStyle/>
+          <a:p>
+            <a:r>
+              <a:rPr lang="en-US" sz="4900" dirty="0"/>
+              <a:t>Scalability</a:t>
+            </a:r>
+            <a:endParaRPr lang="en-US" dirty="0"/>
+          </a:p>
+        </p:txBody>
+      </p:sp>
+      <p:sp>
+        <p:nvSpPr>
+          <p:cNvPr id="3" name="Content Placeholder 2"/>
+          <p:cNvSpPr>
+            <a:spLocks noGrp="1"/>
+          </p:cNvSpPr>
+          <p:nvPr>
+            <p:ph sz="quarter" idx="10"/>
+          </p:nvPr>
+        </p:nvSpPr>
+        <p:spPr>
+          <a:xfrm>
+            <a:off x="2496000" y="2251709"/>
+            <a:ext cx="7200000" cy="3960000"/>
+          </a:xfrm>
+        </p:spPr>
+        <p:txBody>
+          <a:bodyPr/>
+          <a:lstStyle/>
+          <a:p>
+            <a:endParaRPr lang="en-US" sz="4000" dirty="0"/>
+          </a:p>
+          <a:p>
+            <a:pPr marL="457189" lvl="1" indent="0" algn="ctr">
+              <a:buNone/>
+            </a:pPr>
+            <a:r>
+              <a:rPr lang="en-US" sz="3600" dirty="0"/>
+              <a:t>The </a:t>
+            </a:r>
+            <a:r>
+              <a:rPr lang="en-US" sz="3600" b="1" dirty="0"/>
+              <a:t>ability</a:t>
+            </a:r>
+            <a:r>
+              <a:rPr lang="en-US" sz="3600" dirty="0"/>
+              <a:t> of a </a:t>
+            </a:r>
+            <a:r>
+              <a:rPr lang="en-US" sz="3600" b="1" dirty="0"/>
+              <a:t>service</a:t>
+            </a:r>
+            <a:r>
+              <a:rPr lang="en-US" sz="3600" dirty="0"/>
+              <a:t> to </a:t>
+            </a:r>
+            <a:r>
+              <a:rPr lang="en-US" sz="3600" b="1" dirty="0"/>
+              <a:t>increase</a:t>
+            </a:r>
+            <a:r>
+              <a:rPr lang="en-US" sz="3600" dirty="0"/>
+              <a:t> its </a:t>
+            </a:r>
+            <a:r>
+              <a:rPr lang="en-US" sz="3600" b="1" dirty="0"/>
+              <a:t>capacity </a:t>
+            </a:r>
+            <a:r>
+              <a:rPr lang="en-US" sz="3600" dirty="0"/>
+              <a:t>by </a:t>
+            </a:r>
+            <a:r>
+              <a:rPr lang="en-US" sz="3600" b="1" dirty="0"/>
+              <a:t>consuming more resources</a:t>
+            </a:r>
+          </a:p>
+          <a:p>
+            <a:endParaRPr lang="en-US" sz="4000" dirty="0"/>
+          </a:p>
+        </p:txBody>
+      </p:sp>
+    </p:spTree>
+    <p:extLst>
+      <p:ext uri="{BB962C8B-B14F-4D97-AF65-F5344CB8AC3E}">
+        <p14:creationId xmlns:p14="http://schemas.microsoft.com/office/powerpoint/2010/main" val="851801576"/>
+      </p:ext>
+    </p:extLst>
+  </p:cSld>
+  <p:clrMapOvr>
+    <a:masterClrMapping/>
+  </p:clrMapOvr>
+  <mc:AlternateContent xmlns:mc="http://schemas.openxmlformats.org/markup-compatibility/2006" xmlns:p14="http://schemas.microsoft.com/office/powerpoint/2010/main">
+    <mc:Choice Requires="p14">
+      <p:transition spd="slow" p14:dur="2000" advTm="2224"/>
+    </mc:Choice>
+    <mc:Fallback xmlns="">
+      <p:transition spd="slow" advTm="2224"/>
+    </mc:Fallback>
+  </mc:AlternateContent>
+</p:sld>
+</file>
+
+<file path=ppt/slides/slide30.xml><?xml version="1.0" encoding="utf-8"?>
 <p:sld xmlns:a="http://schemas.openxmlformats.org/drawingml/2006/main" xmlns:r="http://schemas.openxmlformats.org/officeDocument/2006/relationships" xmlns:p="http://schemas.openxmlformats.org/presentationml/2006/main">
   <p:cSld>
     <p:bg>
@@ -13418,7 +12796,7 @@
 </p:sld>
 </file>
 
-<file path=ppt/slides/slide34.xml><?xml version="1.0" encoding="utf-8"?>
+<file path=ppt/slides/slide31.xml><?xml version="1.0" encoding="utf-8"?>
 <p:sld xmlns:a="http://schemas.openxmlformats.org/drawingml/2006/main" xmlns:r="http://schemas.openxmlformats.org/officeDocument/2006/relationships" xmlns:p="http://schemas.openxmlformats.org/presentationml/2006/main">
   <p:cSld>
     <p:spTree>
@@ -14031,7 +13409,7 @@
 </p:sld>
 </file>
 
-<file path=ppt/slides/slide35.xml><?xml version="1.0" encoding="utf-8"?>
+<file path=ppt/slides/slide32.xml><?xml version="1.0" encoding="utf-8"?>
 <p:sld xmlns:a="http://schemas.openxmlformats.org/drawingml/2006/main" xmlns:r="http://schemas.openxmlformats.org/officeDocument/2006/relationships" xmlns:p="http://schemas.openxmlformats.org/presentationml/2006/main">
   <p:cSld>
     <p:spTree>
@@ -14247,7 +13625,7 @@
 </p:sld>
 </file>
 
-<file path=ppt/slides/slide36.xml><?xml version="1.0" encoding="utf-8"?>
+<file path=ppt/slides/slide33.xml><?xml version="1.0" encoding="utf-8"?>
 <p:sld xmlns:a="http://schemas.openxmlformats.org/drawingml/2006/main" xmlns:r="http://schemas.openxmlformats.org/officeDocument/2006/relationships" xmlns:p="http://schemas.openxmlformats.org/presentationml/2006/main">
   <p:cSld>
     <p:spTree>
@@ -14307,7 +13685,7 @@
 </p:sld>
 </file>
 
-<file path=ppt/slides/slide37.xml><?xml version="1.0" encoding="utf-8"?>
+<file path=ppt/slides/slide34.xml><?xml version="1.0" encoding="utf-8"?>
 <p:sld xmlns:a="http://schemas.openxmlformats.org/drawingml/2006/main" xmlns:r="http://schemas.openxmlformats.org/officeDocument/2006/relationships" xmlns:p="http://schemas.openxmlformats.org/presentationml/2006/main">
   <p:cSld>
     <p:spTree>
@@ -14564,7 +13942,7 @@
 </p:sld>
 </file>
 
-<file path=ppt/slides/slide38.xml><?xml version="1.0" encoding="utf-8"?>
+<file path=ppt/slides/slide35.xml><?xml version="1.0" encoding="utf-8"?>
 <p:sld xmlns:a="http://schemas.openxmlformats.org/drawingml/2006/main" xmlns:r="http://schemas.openxmlformats.org/officeDocument/2006/relationships" xmlns:p="http://schemas.openxmlformats.org/presentationml/2006/main">
   <p:cSld>
     <p:spTree>
@@ -15528,7 +14906,7 @@
           <p:nvPr/>
         </p:nvPicPr>
         <p:blipFill>
-          <a:blip r:embed="rId2">
+          <a:blip r:embed="rId3">
             <a:extLst>
               <a:ext uri="{28A0092B-C50C-407E-A947-70E740481C1C}">
                 <a14:useLocalDpi xmlns:a14="http://schemas.microsoft.com/office/drawing/2010/main" val="0"/>
@@ -15634,7 +15012,7 @@
         <p:spPr>
           <a:xfrm>
             <a:off x="723088" y="1076224"/>
-            <a:ext cx="10522086" cy="5509200"/>
+            <a:ext cx="10522086" cy="5016758"/>
           </a:xfrm>
           <a:prstGeom prst="rect">
             <a:avLst/>
@@ -15711,7 +15089,7 @@
                 <a:latin typeface="Calibri" panose="020F0502020204030204" pitchFamily="34" charset="0"/>
                 <a:ea typeface="Calibri" panose="020F0502020204030204" pitchFamily="34" charset="0"/>
               </a:rPr>
-              <a:t>Often vendor-locked – using multiple features of given cloud provider – no possibility or really hard to move to other provider</a:t>
+              <a:t>Often vendor-locked – using multiple features of given cloud provider – no possibility or hard to move to other provider</a:t>
             </a:r>
           </a:p>
           <a:p>

</xml_diff>